<commit_message>
updated slides, also updated the Recursion example
</commit_message>
<xml_diff>
--- a/fnprogfun1.pptx
+++ b/fnprogfun1.pptx
@@ -12,9 +12,10 @@
     <p:sldId id="258" r:id="rId6"/>
     <p:sldId id="268" r:id="rId7"/>
     <p:sldId id="259" r:id="rId8"/>
-    <p:sldId id="260" r:id="rId9"/>
-    <p:sldId id="263" r:id="rId10"/>
-    <p:sldId id="267" r:id="rId11"/>
+    <p:sldId id="269" r:id="rId9"/>
+    <p:sldId id="260" r:id="rId10"/>
+    <p:sldId id="263" r:id="rId11"/>
+    <p:sldId id="267" r:id="rId12"/>
   </p:sldIdLst>
   <p:sldSz cx="9144000" cy="6858000" type="screen4x3"/>
   <p:notesSz cx="6858000" cy="9144000"/>
@@ -142,7 +143,7 @@
           <p:nvPr/>
         </p:nvPicPr>
         <p:blipFill>
-          <a:blip r:embed="rId2"/>
+          <a:blip r:embed="rId2" cstate="print"/>
           <a:srcRect t="-93973"/>
           <a:stretch>
             <a:fillRect/>
@@ -340,7 +341,8 @@
           <a:p>
             <a:fld id="{7CE38E4D-051A-41E1-86A4-E56916468FD0}" type="datetimeFigureOut">
               <a:rPr lang="en-US" smtClean="0"/>
-              <a:t>2012-10-15</a:t>
+              <a:pPr/>
+              <a:t>10/16/2012</a:t>
             </a:fld>
             <a:endParaRPr lang="en-US"/>
           </a:p>
@@ -387,6 +389,7 @@
           <a:p>
             <a:fld id="{886BB73A-582F-4420-9A14-CB10A2B2E5E8}" type="slidenum">
               <a:rPr lang="en-US" smtClean="0"/>
+              <a:pPr/>
               <a:t>‹#›</a:t>
             </a:fld>
             <a:endParaRPr lang="en-US"/>
@@ -427,7 +430,7 @@
           <p:nvPr/>
         </p:nvPicPr>
         <p:blipFill>
-          <a:blip r:embed="rId2"/>
+          <a:blip r:embed="rId2" cstate="print"/>
           <a:stretch>
             <a:fillRect/>
           </a:stretch>
@@ -650,7 +653,8 @@
           <a:p>
             <a:fld id="{7CE38E4D-051A-41E1-86A4-E56916468FD0}" type="datetimeFigureOut">
               <a:rPr lang="en-US" smtClean="0"/>
-              <a:t>2012-10-15</a:t>
+              <a:pPr/>
+              <a:t>10/16/2012</a:t>
             </a:fld>
             <a:endParaRPr lang="en-US"/>
           </a:p>
@@ -692,6 +696,7 @@
           <a:p>
             <a:fld id="{886BB73A-582F-4420-9A14-CB10A2B2E5E8}" type="slidenum">
               <a:rPr lang="en-US" smtClean="0"/>
+              <a:pPr/>
               <a:t>‹#›</a:t>
             </a:fld>
             <a:endParaRPr lang="en-US"/>
@@ -732,7 +737,7 @@
           <p:nvPr/>
         </p:nvPicPr>
         <p:blipFill>
-          <a:blip r:embed="rId2"/>
+          <a:blip r:embed="rId2" cstate="print"/>
           <a:srcRect b="-123309"/>
           <a:stretch>
             <a:fillRect/>
@@ -889,7 +894,8 @@
           <a:p>
             <a:fld id="{7CE38E4D-051A-41E1-86A4-E56916468FD0}" type="datetimeFigureOut">
               <a:rPr lang="en-US" smtClean="0"/>
-              <a:t>2012-10-15</a:t>
+              <a:pPr/>
+              <a:t>10/16/2012</a:t>
             </a:fld>
             <a:endParaRPr lang="en-US"/>
           </a:p>
@@ -1189,7 +1195,8 @@
           <a:p>
             <a:fld id="{7CE38E4D-051A-41E1-86A4-E56916468FD0}" type="datetimeFigureOut">
               <a:rPr lang="en-US" smtClean="0"/>
-              <a:t>2012-10-15</a:t>
+              <a:pPr/>
+              <a:t>10/16/2012</a:t>
             </a:fld>
             <a:endParaRPr lang="en-US"/>
           </a:p>
@@ -1248,7 +1255,7 @@
           <p:nvPr/>
         </p:nvPicPr>
         <p:blipFill>
-          <a:blip r:embed="rId2"/>
+          <a:blip r:embed="rId2" cstate="print"/>
           <a:srcRect b="-123309"/>
           <a:stretch>
             <a:fillRect/>
@@ -1405,7 +1412,8 @@
           <a:p>
             <a:fld id="{7CE38E4D-051A-41E1-86A4-E56916468FD0}" type="datetimeFigureOut">
               <a:rPr lang="en-US" smtClean="0"/>
-              <a:t>2012-10-15</a:t>
+              <a:pPr/>
+              <a:t>10/16/2012</a:t>
             </a:fld>
             <a:endParaRPr lang="en-US"/>
           </a:p>
@@ -1551,6 +1559,7 @@
           <a:p>
             <a:fld id="{886BB73A-582F-4420-9A14-CB10A2B2E5E8}" type="slidenum">
               <a:rPr lang="en-US" smtClean="0"/>
+              <a:pPr/>
               <a:t>‹#›</a:t>
             </a:fld>
             <a:endParaRPr lang="en-US"/>
@@ -1591,7 +1600,7 @@
           <p:nvPr/>
         </p:nvPicPr>
         <p:blipFill>
-          <a:blip r:embed="rId2"/>
+          <a:blip r:embed="rId2" cstate="print"/>
           <a:stretch>
             <a:fillRect/>
           </a:stretch>
@@ -1765,7 +1774,8 @@
           <a:p>
             <a:fld id="{7CE38E4D-051A-41E1-86A4-E56916468FD0}" type="datetimeFigureOut">
               <a:rPr lang="en-US" smtClean="0"/>
-              <a:t>2012-10-15</a:t>
+              <a:pPr/>
+              <a:t>10/16/2012</a:t>
             </a:fld>
             <a:endParaRPr lang="en-US"/>
           </a:p>
@@ -1807,6 +1817,7 @@
           <a:p>
             <a:fld id="{886BB73A-582F-4420-9A14-CB10A2B2E5E8}" type="slidenum">
               <a:rPr lang="en-US" smtClean="0"/>
+              <a:pPr/>
               <a:t>‹#›</a:t>
             </a:fld>
             <a:endParaRPr lang="en-US"/>
@@ -1847,7 +1858,7 @@
           <p:nvPr/>
         </p:nvPicPr>
         <p:blipFill>
-          <a:blip r:embed="rId2"/>
+          <a:blip r:embed="rId2" cstate="print"/>
           <a:srcRect t="-93650"/>
           <a:stretch>
             <a:fillRect/>
@@ -2032,7 +2043,8 @@
           <a:p>
             <a:fld id="{7CE38E4D-051A-41E1-86A4-E56916468FD0}" type="datetimeFigureOut">
               <a:rPr lang="en-US" smtClean="0"/>
-              <a:t>2012-10-15</a:t>
+              <a:pPr/>
+              <a:t>10/16/2012</a:t>
             </a:fld>
             <a:endParaRPr lang="en-US"/>
           </a:p>
@@ -2074,6 +2086,7 @@
           <a:p>
             <a:fld id="{886BB73A-582F-4420-9A14-CB10A2B2E5E8}" type="slidenum">
               <a:rPr lang="en-US" smtClean="0"/>
+              <a:pPr/>
               <a:t>‹#›</a:t>
             </a:fld>
             <a:endParaRPr lang="en-US"/>
@@ -2122,7 +2135,8 @@
           <a:p>
             <a:fld id="{7CE38E4D-051A-41E1-86A4-E56916468FD0}" type="datetimeFigureOut">
               <a:rPr lang="en-US" smtClean="0"/>
-              <a:t>2012-10-15</a:t>
+              <a:pPr/>
+              <a:t>10/16/2012</a:t>
             </a:fld>
             <a:endParaRPr lang="en-US"/>
           </a:p>
@@ -2164,6 +2178,7 @@
           <a:p>
             <a:fld id="{886BB73A-582F-4420-9A14-CB10A2B2E5E8}" type="slidenum">
               <a:rPr lang="en-US" smtClean="0"/>
+              <a:pPr/>
               <a:t>‹#›</a:t>
             </a:fld>
             <a:endParaRPr lang="en-US"/>
@@ -2233,7 +2248,7 @@
           <p:nvPr/>
         </p:nvPicPr>
         <p:blipFill>
-          <a:blip r:embed="rId2"/>
+          <a:blip r:embed="rId2" cstate="print"/>
           <a:stretch>
             <a:fillRect/>
           </a:stretch>
@@ -2282,7 +2297,7 @@
           <p:nvPr/>
         </p:nvPicPr>
         <p:blipFill>
-          <a:blip r:embed="rId2"/>
+          <a:blip r:embed="rId2" cstate="print"/>
           <a:stretch>
             <a:fillRect/>
           </a:stretch>
@@ -2423,6 +2438,7 @@
           <a:p>
             <a:fld id="{886BB73A-582F-4420-9A14-CB10A2B2E5E8}" type="slidenum">
               <a:rPr lang="en-US" smtClean="0"/>
+              <a:pPr/>
               <a:t>‹#›</a:t>
             </a:fld>
             <a:endParaRPr lang="en-US"/>
@@ -2438,10 +2454,10 @@
           <p:nvPr userDrawn="1"/>
         </p:nvPicPr>
         <p:blipFill>
-          <a:blip r:embed="rId3">
+          <a:blip r:embed="rId3" cstate="print">
             <a:extLst>
               <a:ext uri="{28A0092B-C50C-407E-A947-70E740481C1C}">
-                <a14:useLocalDpi xmlns:a14="http://schemas.microsoft.com/office/drawing/2010/main" val="0"/>
+                <a14:useLocalDpi xmlns="" xmlns:a14="http://schemas.microsoft.com/office/drawing/2010/main" val="0"/>
               </a:ext>
             </a:extLst>
           </a:blip>
@@ -2493,7 +2509,7 @@
           <p:nvPr/>
         </p:nvPicPr>
         <p:blipFill>
-          <a:blip r:embed="rId2"/>
+          <a:blip r:embed="rId2" cstate="print"/>
           <a:srcRect l="-198711"/>
           <a:stretch>
             <a:fillRect/>
@@ -2717,7 +2733,8 @@
           <a:p>
             <a:fld id="{7CE38E4D-051A-41E1-86A4-E56916468FD0}" type="datetimeFigureOut">
               <a:rPr lang="en-US" smtClean="0"/>
-              <a:t>2012-10-15</a:t>
+              <a:pPr/>
+              <a:t>10/16/2012</a:t>
             </a:fld>
             <a:endParaRPr lang="en-US"/>
           </a:p>
@@ -2759,6 +2776,7 @@
           <a:p>
             <a:fld id="{886BB73A-582F-4420-9A14-CB10A2B2E5E8}" type="slidenum">
               <a:rPr lang="en-US" smtClean="0"/>
+              <a:pPr/>
               <a:t>‹#›</a:t>
             </a:fld>
             <a:endParaRPr lang="en-US"/>
@@ -2799,7 +2817,7 @@
           <p:nvPr/>
         </p:nvPicPr>
         <p:blipFill>
-          <a:blip r:embed="rId2"/>
+          <a:blip r:embed="rId2" cstate="print"/>
           <a:srcRect r="-91875"/>
           <a:stretch>
             <a:fillRect/>
@@ -2997,7 +3015,8 @@
           <a:p>
             <a:fld id="{7CE38E4D-051A-41E1-86A4-E56916468FD0}" type="datetimeFigureOut">
               <a:rPr lang="en-US" smtClean="0"/>
-              <a:t>2012-10-15</a:t>
+              <a:pPr/>
+              <a:t>10/16/2012</a:t>
             </a:fld>
             <a:endParaRPr lang="en-US"/>
           </a:p>
@@ -3039,6 +3058,7 @@
           <a:p>
             <a:fld id="{886BB73A-582F-4420-9A14-CB10A2B2E5E8}" type="slidenum">
               <a:rPr lang="en-US" smtClean="0"/>
+              <a:pPr/>
               <a:t>‹#›</a:t>
             </a:fld>
             <a:endParaRPr lang="en-US"/>
@@ -3079,7 +3099,7 @@
           <p:nvPr/>
         </p:nvPicPr>
         <p:blipFill>
-          <a:blip r:embed="rId2"/>
+          <a:blip r:embed="rId2" cstate="print"/>
           <a:stretch>
             <a:fillRect/>
           </a:stretch>
@@ -3405,7 +3425,8 @@
           <a:p>
             <a:fld id="{7CE38E4D-051A-41E1-86A4-E56916468FD0}" type="datetimeFigureOut">
               <a:rPr lang="en-US" smtClean="0"/>
-              <a:t>2012-10-15</a:t>
+              <a:pPr/>
+              <a:t>10/16/2012</a:t>
             </a:fld>
             <a:endParaRPr lang="en-US"/>
           </a:p>
@@ -3447,6 +3468,7 @@
           <a:p>
             <a:fld id="{886BB73A-582F-4420-9A14-CB10A2B2E5E8}" type="slidenum">
               <a:rPr lang="en-US" smtClean="0"/>
+              <a:pPr/>
               <a:t>‹#›</a:t>
             </a:fld>
             <a:endParaRPr lang="en-US"/>
@@ -3487,7 +3509,7 @@
           <p:nvPr/>
         </p:nvPicPr>
         <p:blipFill>
-          <a:blip r:embed="rId2"/>
+          <a:blip r:embed="rId2" cstate="print"/>
           <a:stretch>
             <a:fillRect/>
           </a:stretch>
@@ -3965,7 +3987,8 @@
           <a:p>
             <a:fld id="{7CE38E4D-051A-41E1-86A4-E56916468FD0}" type="datetimeFigureOut">
               <a:rPr lang="en-US" smtClean="0"/>
-              <a:t>2012-10-15</a:t>
+              <a:pPr/>
+              <a:t>10/16/2012</a:t>
             </a:fld>
             <a:endParaRPr lang="en-US"/>
           </a:p>
@@ -4007,6 +4030,7 @@
           <a:p>
             <a:fld id="{886BB73A-582F-4420-9A14-CB10A2B2E5E8}" type="slidenum">
               <a:rPr lang="en-US" smtClean="0"/>
+              <a:pPr/>
               <a:t>‹#›</a:t>
             </a:fld>
             <a:endParaRPr lang="en-US"/>
@@ -4047,7 +4071,7 @@
           <p:nvPr/>
         </p:nvPicPr>
         <p:blipFill>
-          <a:blip r:embed="rId2"/>
+          <a:blip r:embed="rId2" cstate="print"/>
           <a:stretch>
             <a:fillRect/>
           </a:stretch>
@@ -4113,7 +4137,8 @@
           <a:p>
             <a:fld id="{7CE38E4D-051A-41E1-86A4-E56916468FD0}" type="datetimeFigureOut">
               <a:rPr lang="en-US" smtClean="0"/>
-              <a:t>2012-10-15</a:t>
+              <a:pPr/>
+              <a:t>10/16/2012</a:t>
             </a:fld>
             <a:endParaRPr lang="en-US"/>
           </a:p>
@@ -4155,6 +4180,7 @@
           <a:p>
             <a:fld id="{886BB73A-582F-4420-9A14-CB10A2B2E5E8}" type="slidenum">
               <a:rPr lang="en-US" smtClean="0"/>
+              <a:pPr/>
               <a:t>‹#›</a:t>
             </a:fld>
             <a:endParaRPr lang="en-US"/>
@@ -4203,7 +4229,8 @@
           <a:p>
             <a:fld id="{7CE38E4D-051A-41E1-86A4-E56916468FD0}" type="datetimeFigureOut">
               <a:rPr lang="en-US" smtClean="0"/>
-              <a:t>2012-10-15</a:t>
+              <a:pPr/>
+              <a:t>10/16/2012</a:t>
             </a:fld>
             <a:endParaRPr lang="en-US"/>
           </a:p>
@@ -4245,6 +4272,7 @@
           <a:p>
             <a:fld id="{886BB73A-582F-4420-9A14-CB10A2B2E5E8}" type="slidenum">
               <a:rPr lang="en-US" smtClean="0"/>
+              <a:pPr/>
               <a:t>‹#›</a:t>
             </a:fld>
             <a:endParaRPr lang="en-US"/>
@@ -4285,7 +4313,7 @@
           <p:nvPr/>
         </p:nvPicPr>
         <p:blipFill>
-          <a:blip r:embed="rId2"/>
+          <a:blip r:embed="rId2" cstate="print"/>
           <a:srcRect b="-135871"/>
           <a:stretch>
             <a:fillRect/>
@@ -4545,7 +4573,8 @@
           <a:p>
             <a:fld id="{7CE38E4D-051A-41E1-86A4-E56916468FD0}" type="datetimeFigureOut">
               <a:rPr lang="en-US" smtClean="0"/>
-              <a:t>2012-10-15</a:t>
+              <a:pPr/>
+              <a:t>10/16/2012</a:t>
             </a:fld>
             <a:endParaRPr lang="en-US"/>
           </a:p>
@@ -4587,6 +4616,7 @@
           <a:p>
             <a:fld id="{886BB73A-582F-4420-9A14-CB10A2B2E5E8}" type="slidenum">
               <a:rPr lang="en-US" smtClean="0"/>
+              <a:pPr/>
               <a:t>‹#›</a:t>
             </a:fld>
             <a:endParaRPr lang="en-US"/>
@@ -4754,7 +4784,8 @@
           <a:p>
             <a:fld id="{7CE38E4D-051A-41E1-86A4-E56916468FD0}" type="datetimeFigureOut">
               <a:rPr lang="en-US" smtClean="0"/>
-              <a:t>2012-10-15</a:t>
+              <a:pPr/>
+              <a:t>10/16/2012</a:t>
             </a:fld>
             <a:endParaRPr lang="en-US"/>
           </a:p>
@@ -4831,6 +4862,7 @@
           <a:p>
             <a:fld id="{886BB73A-582F-4420-9A14-CB10A2B2E5E8}" type="slidenum">
               <a:rPr lang="en-US" smtClean="0"/>
+              <a:pPr/>
               <a:t>‹#›</a:t>
             </a:fld>
             <a:endParaRPr lang="en-US"/>
@@ -5272,10 +5304,10 @@
           <p:nvPr/>
         </p:nvPicPr>
         <p:blipFill>
-          <a:blip r:embed="rId2">
+          <a:blip r:embed="rId2" cstate="print">
             <a:extLst>
               <a:ext uri="{28A0092B-C50C-407E-A947-70E740481C1C}">
-                <a14:useLocalDpi xmlns:a14="http://schemas.microsoft.com/office/drawing/2010/main" val="0"/>
+                <a14:useLocalDpi xmlns="" xmlns:a14="http://schemas.microsoft.com/office/drawing/2010/main" val="0"/>
               </a:ext>
             </a:extLst>
           </a:blip>
@@ -5296,7 +5328,7 @@
     </p:spTree>
     <p:extLst>
       <p:ext uri="{BB962C8B-B14F-4D97-AF65-F5344CB8AC3E}">
-        <p14:creationId xmlns:p14="http://schemas.microsoft.com/office/powerpoint/2010/main" val="1873691422"/>
+        <p14:creationId xmlns="" xmlns:p14="http://schemas.microsoft.com/office/powerpoint/2010/main" val="1873691422"/>
       </p:ext>
     </p:extLst>
   </p:cSld>
@@ -5306,7 +5338,7 @@
   <p:timing>
     <p:tnLst>
       <p:par>
-        <p:cTn xmlns:p14="http://schemas.microsoft.com/office/powerpoint/2010/main" id="1" dur="indefinite" restart="never" nodeType="tmRoot"/>
+        <p:cTn id="1" dur="indefinite" restart="never" nodeType="tmRoot"/>
       </p:par>
     </p:tnLst>
   </p:timing>
@@ -5347,7 +5379,7 @@
           <a:p>
             <a:r>
               <a:rPr lang="en-US" dirty="0" smtClean="0"/>
-              <a:t>Questions?</a:t>
+              <a:t>Want to try Haskell?</a:t>
             </a:r>
             <a:endParaRPr lang="en-US" dirty="0"/>
           </a:p>
@@ -5365,29 +5397,225 @@
         </p:nvSpPr>
         <p:spPr/>
         <p:txBody>
-          <a:bodyPr/>
+          <a:bodyPr>
+            <a:normAutofit fontScale="92500" lnSpcReduction="20000"/>
+          </a:bodyPr>
           <a:lstStyle/>
           <a:p>
             <a:r>
               <a:rPr lang="en-US" dirty="0" smtClean="0"/>
-              <a:t>My example code has been posted to our Mercurial site at:</a:t>
+              <a:t>Free eBooks!</a:t>
             </a:r>
           </a:p>
           <a:p>
             <a:pPr lvl="1"/>
             <a:r>
-              <a:rPr lang="en-US" dirty="0" smtClean="0">
+              <a:rPr lang="en-US" dirty="0" smtClean="0"/>
+              <a:t>Learn you a Haskell for Great Good!</a:t>
+            </a:r>
+          </a:p>
+          <a:p>
+            <a:pPr lvl="2"/>
+            <a:r>
+              <a:rPr lang="en-US" dirty="0">
+                <a:solidFill>
+                  <a:srgbClr val="FF0000"/>
+                </a:solidFill>
                 <a:hlinkClick r:id="rId2"/>
               </a:rPr>
-              <a:t>http://scm.rsc.eng.shaw.ca/shawfp/shawfp1</a:t>
+              <a:t>http://learnyouahaskell.com/</a:t>
+            </a:r>
+            <a:r>
+              <a:rPr lang="en-US" dirty="0" smtClean="0">
+                <a:solidFill>
+                  <a:srgbClr val="FF0000"/>
+                </a:solidFill>
+                <a:hlinkClick r:id="rId2"/>
+              </a:rPr>
+              <a:t>chapters</a:t>
+            </a:r>
+            <a:endParaRPr lang="en-US" dirty="0" smtClean="0">
+              <a:solidFill>
+                <a:srgbClr val="FF0000"/>
+              </a:solidFill>
+            </a:endParaRPr>
+          </a:p>
+          <a:p>
+            <a:pPr lvl="1"/>
+            <a:r>
+              <a:rPr lang="en-US" dirty="0" smtClean="0"/>
+              <a:t>Real World Haskell</a:t>
+            </a:r>
+          </a:p>
+          <a:p>
+            <a:pPr lvl="2"/>
+            <a:r>
+              <a:rPr lang="en-US" dirty="0">
+                <a:hlinkClick r:id="rId3"/>
+              </a:rPr>
+              <a:t>http://book.realworldhaskell.org/read</a:t>
+            </a:r>
+            <a:r>
+              <a:rPr lang="en-US" dirty="0" smtClean="0">
+                <a:hlinkClick r:id="rId3"/>
+              </a:rPr>
+              <a:t>/</a:t>
             </a:r>
             <a:endParaRPr lang="en-US" dirty="0" smtClean="0"/>
           </a:p>
           <a:p>
+            <a:pPr lvl="1"/>
             <a:r>
               <a:rPr lang="en-US" dirty="0" smtClean="0"/>
-              <a:t>Thanks for coming.  We hope to see you again next month!</a:t>
-            </a:r>
+              <a:t>Get Haskell Platform easily for your machine</a:t>
+            </a:r>
+          </a:p>
+          <a:p>
+            <a:pPr lvl="1"/>
+            <a:r>
+              <a:rPr lang="en-US" dirty="0" smtClean="0"/>
+              <a:t>Linux:</a:t>
+            </a:r>
+          </a:p>
+          <a:p>
+            <a:pPr lvl="2"/>
+            <a:r>
+              <a:rPr lang="en-US" sz="1600" dirty="0" smtClean="0">
+                <a:latin typeface="Consolas"/>
+                <a:cs typeface="Consolas"/>
+              </a:rPr>
+              <a:t>$ </a:t>
+            </a:r>
+            <a:r>
+              <a:rPr lang="en-US" sz="1600" dirty="0" err="1" smtClean="0">
+                <a:latin typeface="Consolas"/>
+                <a:cs typeface="Consolas"/>
+              </a:rPr>
+              <a:t>sudo</a:t>
+            </a:r>
+            <a:r>
+              <a:rPr lang="en-US" sz="1600" dirty="0" smtClean="0">
+                <a:latin typeface="Consolas"/>
+                <a:cs typeface="Consolas"/>
+              </a:rPr>
+              <a:t> apt-get install </a:t>
+            </a:r>
+            <a:r>
+              <a:rPr lang="en-US" sz="1600" dirty="0" err="1" smtClean="0">
+                <a:latin typeface="Consolas"/>
+                <a:cs typeface="Consolas"/>
+              </a:rPr>
+              <a:t>haskell</a:t>
+            </a:r>
+            <a:r>
+              <a:rPr lang="en-US" sz="1600" dirty="0" smtClean="0">
+                <a:latin typeface="Consolas"/>
+                <a:cs typeface="Consolas"/>
+              </a:rPr>
+              <a:t>-platform</a:t>
+            </a:r>
+          </a:p>
+          <a:p>
+            <a:pPr lvl="2"/>
+            <a:r>
+              <a:rPr lang="en-US" sz="1600" dirty="0" smtClean="0">
+                <a:latin typeface="Consolas"/>
+                <a:cs typeface="Consolas"/>
+              </a:rPr>
+              <a:t>$ </a:t>
+            </a:r>
+            <a:r>
+              <a:rPr lang="en-US" sz="1600" dirty="0" err="1" smtClean="0">
+                <a:latin typeface="Consolas"/>
+                <a:cs typeface="Consolas"/>
+              </a:rPr>
+              <a:t>sudo</a:t>
+            </a:r>
+            <a:r>
+              <a:rPr lang="en-US" sz="1600" dirty="0" smtClean="0">
+                <a:latin typeface="Consolas"/>
+                <a:cs typeface="Consolas"/>
+              </a:rPr>
+              <a:t> yum install </a:t>
+            </a:r>
+            <a:r>
+              <a:rPr lang="en-US" sz="1600" dirty="0" err="1" smtClean="0">
+                <a:latin typeface="Consolas"/>
+                <a:cs typeface="Consolas"/>
+              </a:rPr>
+              <a:t>haskell</a:t>
+            </a:r>
+            <a:r>
+              <a:rPr lang="en-US" sz="1600" dirty="0" smtClean="0">
+                <a:latin typeface="Consolas"/>
+                <a:cs typeface="Consolas"/>
+              </a:rPr>
+              <a:t>-platform</a:t>
+            </a:r>
+          </a:p>
+          <a:p>
+            <a:pPr lvl="1"/>
+            <a:r>
+              <a:rPr lang="en-US" dirty="0" smtClean="0"/>
+              <a:t>Windows or Mac:</a:t>
+            </a:r>
+          </a:p>
+          <a:p>
+            <a:pPr lvl="2"/>
+            <a:r>
+              <a:rPr lang="en-US" dirty="0" smtClean="0"/>
+              <a:t>Get </a:t>
+            </a:r>
+            <a:r>
+              <a:rPr lang="en-US" dirty="0"/>
+              <a:t>the platform here: </a:t>
+            </a:r>
+            <a:r>
+              <a:rPr lang="en-US" dirty="0">
+                <a:hlinkClick r:id="rId4"/>
+              </a:rPr>
+              <a:t>http://www.haskell.org/platform</a:t>
+            </a:r>
+            <a:r>
+              <a:rPr lang="en-US" dirty="0" smtClean="0">
+                <a:hlinkClick r:id="rId4"/>
+              </a:rPr>
+              <a:t>/</a:t>
+            </a:r>
+            <a:endParaRPr lang="en-US" dirty="0" smtClean="0"/>
+          </a:p>
+          <a:p>
+            <a:pPr lvl="1"/>
+            <a:r>
+              <a:rPr lang="en-US" dirty="0" smtClean="0"/>
+              <a:t>Cool video introduction: </a:t>
+            </a:r>
+          </a:p>
+          <a:p>
+            <a:pPr lvl="2"/>
+            <a:r>
+              <a:rPr lang="en-US" dirty="0">
+                <a:hlinkClick r:id="rId5"/>
+              </a:rPr>
+              <a:t>http://www.youtube.com/watch?v=</a:t>
+            </a:r>
+            <a:r>
+              <a:rPr lang="en-US" dirty="0" smtClean="0">
+                <a:hlinkClick r:id="rId5"/>
+              </a:rPr>
+              <a:t>b9FagOVqxmI</a:t>
+            </a:r>
+            <a:endParaRPr lang="en-US" dirty="0" smtClean="0"/>
+          </a:p>
+          <a:p>
+            <a:pPr lvl="1"/>
+            <a:endParaRPr lang="en-US" dirty="0"/>
+          </a:p>
+          <a:p>
+            <a:pPr lvl="1"/>
+            <a:endParaRPr lang="en-US" dirty="0" smtClean="0"/>
+          </a:p>
+          <a:p>
             <a:endParaRPr lang="en-US" dirty="0"/>
           </a:p>
         </p:txBody>
@@ -5395,7 +5623,7 @@
     </p:spTree>
     <p:extLst>
       <p:ext uri="{BB962C8B-B14F-4D97-AF65-F5344CB8AC3E}">
-        <p14:creationId xmlns:p14="http://schemas.microsoft.com/office/powerpoint/2010/main" val="1090242725"/>
+        <p14:creationId xmlns="" xmlns:p14="http://schemas.microsoft.com/office/powerpoint/2010/main" val="2526408885"/>
       </p:ext>
     </p:extLst>
   </p:cSld>
@@ -5405,7 +5633,152 @@
   <p:timing>
     <p:tnLst>
       <p:par>
-        <p:cTn xmlns:p14="http://schemas.microsoft.com/office/powerpoint/2010/main" id="1" dur="indefinite" restart="never" nodeType="tmRoot"/>
+        <p:cTn id="1" dur="indefinite" restart="never" nodeType="tmRoot"/>
+      </p:par>
+    </p:tnLst>
+  </p:timing>
+</p:sld>
+</file>
+
+<file path=ppt/slides/slide11.xml><?xml version="1.0" encoding="utf-8"?>
+<p:sld xmlns:a="http://schemas.openxmlformats.org/drawingml/2006/main" xmlns:r="http://schemas.openxmlformats.org/officeDocument/2006/relationships" xmlns:p="http://schemas.openxmlformats.org/presentationml/2006/main">
+  <p:cSld>
+    <p:spTree>
+      <p:nvGrpSpPr>
+        <p:cNvPr id="1" name=""/>
+        <p:cNvGrpSpPr/>
+        <p:nvPr/>
+      </p:nvGrpSpPr>
+      <p:grpSpPr>
+        <a:xfrm>
+          <a:off x="0" y="0"/>
+          <a:ext cx="0" cy="0"/>
+          <a:chOff x="0" y="0"/>
+          <a:chExt cx="0" cy="0"/>
+        </a:xfrm>
+      </p:grpSpPr>
+      <p:sp>
+        <p:nvSpPr>
+          <p:cNvPr id="2" name="Title 1"/>
+          <p:cNvSpPr>
+            <a:spLocks noGrp="1"/>
+          </p:cNvSpPr>
+          <p:nvPr>
+            <p:ph type="title"/>
+          </p:nvPr>
+        </p:nvSpPr>
+        <p:spPr/>
+        <p:txBody>
+          <a:bodyPr/>
+          <a:lstStyle/>
+          <a:p>
+            <a:r>
+              <a:rPr lang="en-US" dirty="0" smtClean="0"/>
+              <a:t>Questions?</a:t>
+            </a:r>
+            <a:endParaRPr lang="en-US" dirty="0"/>
+          </a:p>
+        </p:txBody>
+      </p:sp>
+      <p:sp>
+        <p:nvSpPr>
+          <p:cNvPr id="3" name="Content Placeholder 2"/>
+          <p:cNvSpPr>
+            <a:spLocks noGrp="1"/>
+          </p:cNvSpPr>
+          <p:nvPr>
+            <p:ph idx="1"/>
+          </p:nvPr>
+        </p:nvSpPr>
+        <p:spPr/>
+        <p:txBody>
+          <a:bodyPr/>
+          <a:lstStyle/>
+          <a:p>
+            <a:r>
+              <a:rPr lang="en-US" dirty="0" smtClean="0"/>
+              <a:t>My example code </a:t>
+            </a:r>
+            <a:r>
+              <a:rPr lang="en-US" dirty="0" smtClean="0"/>
+              <a:t>(along with this slide deck) has </a:t>
+            </a:r>
+            <a:r>
+              <a:rPr lang="en-US" dirty="0" smtClean="0"/>
+              <a:t>been posted to </a:t>
+            </a:r>
+            <a:r>
+              <a:rPr lang="en-US" dirty="0" err="1" smtClean="0"/>
+              <a:t>Github</a:t>
+            </a:r>
+            <a:r>
+              <a:rPr lang="en-US" dirty="0" smtClean="0"/>
+              <a:t> </a:t>
+            </a:r>
+            <a:r>
+              <a:rPr lang="en-US" dirty="0" smtClean="0"/>
+              <a:t>at:</a:t>
+            </a:r>
+          </a:p>
+          <a:p>
+            <a:pPr lvl="1"/>
+            <a:r>
+              <a:rPr lang="en-US" dirty="0" smtClean="0">
+                <a:hlinkClick r:id="rId2"/>
+              </a:rPr>
+              <a:t>https://github.com/Nebulaeus/fnprogfun1</a:t>
+            </a:r>
+            <a:endParaRPr lang="en-US" dirty="0" smtClean="0"/>
+          </a:p>
+          <a:p>
+            <a:r>
+              <a:rPr lang="en-US" dirty="0" smtClean="0"/>
+              <a:t>Thanks for coming.  We hope to see you again next month!</a:t>
+            </a:r>
+            <a:endParaRPr lang="en-US" dirty="0"/>
+          </a:p>
+        </p:txBody>
+      </p:sp>
+      <p:pic>
+        <p:nvPicPr>
+          <p:cNvPr id="1030" name="Picture 6" descr="C:\Users\cdunphy\AppData\Local\Microsoft\Windows\Temporary Internet Files\Content.IE5\5YFOUQSJ\MC900441498[1].png"/>
+          <p:cNvPicPr>
+            <a:picLocks noChangeAspect="1" noChangeArrowheads="1"/>
+          </p:cNvPicPr>
+          <p:nvPr/>
+        </p:nvPicPr>
+        <p:blipFill>
+          <a:blip r:embed="rId3" cstate="print"/>
+          <a:srcRect/>
+          <a:stretch>
+            <a:fillRect/>
+          </a:stretch>
+        </p:blipFill>
+        <p:spPr bwMode="auto">
+          <a:xfrm>
+            <a:off x="6681216" y="246628"/>
+            <a:ext cx="1828102" cy="1828102"/>
+          </a:xfrm>
+          <a:prstGeom prst="rect">
+            <a:avLst/>
+          </a:prstGeom>
+          <a:noFill/>
+        </p:spPr>
+      </p:pic>
+    </p:spTree>
+    <p:extLst>
+      <p:ext uri="{BB962C8B-B14F-4D97-AF65-F5344CB8AC3E}">
+        <p14:creationId xmlns="" xmlns:p14="http://schemas.microsoft.com/office/powerpoint/2010/main" val="1090242725"/>
+      </p:ext>
+    </p:extLst>
+  </p:cSld>
+  <p:clrMapOvr>
+    <a:masterClrMapping/>
+  </p:clrMapOvr>
+  <p:timing>
+    <p:tnLst>
+      <p:par>
+        <p:cTn id="1" dur="indefinite" restart="never" nodeType="tmRoot"/>
       </p:par>
     </p:tnLst>
   </p:timing>
@@ -5504,7 +5877,7 @@
     </p:spTree>
     <p:extLst>
       <p:ext uri="{BB962C8B-B14F-4D97-AF65-F5344CB8AC3E}">
-        <p14:creationId xmlns:p14="http://schemas.microsoft.com/office/powerpoint/2010/main" val="3206459144"/>
+        <p14:creationId xmlns="" xmlns:p14="http://schemas.microsoft.com/office/powerpoint/2010/main" val="3206459144"/>
       </p:ext>
     </p:extLst>
   </p:cSld>
@@ -5514,7 +5887,7 @@
   <p:timing>
     <p:tnLst>
       <p:par>
-        <p:cTn xmlns:p14="http://schemas.microsoft.com/office/powerpoint/2010/main" id="1" dur="indefinite" restart="never" nodeType="tmRoot"/>
+        <p:cTn id="1" dur="indefinite" restart="never" nodeType="tmRoot"/>
       </p:par>
     </p:tnLst>
   </p:timing>
@@ -5682,7 +6055,7 @@
           <a:blip r:embed="rId2" cstate="print">
             <a:extLst>
               <a:ext uri="{28A0092B-C50C-407E-A947-70E740481C1C}">
-                <a14:useLocalDpi xmlns:a14="http://schemas.microsoft.com/office/drawing/2010/main" val="0"/>
+                <a14:useLocalDpi xmlns="" xmlns:a14="http://schemas.microsoft.com/office/drawing/2010/main" val="0"/>
               </a:ext>
             </a:extLst>
           </a:blip>
@@ -5703,7 +6076,7 @@
     </p:spTree>
     <p:extLst>
       <p:ext uri="{BB962C8B-B14F-4D97-AF65-F5344CB8AC3E}">
-        <p14:creationId xmlns:p14="http://schemas.microsoft.com/office/powerpoint/2010/main" val="885906404"/>
+        <p14:creationId xmlns="" xmlns:p14="http://schemas.microsoft.com/office/powerpoint/2010/main" val="885906404"/>
       </p:ext>
     </p:extLst>
   </p:cSld>
@@ -5713,7 +6086,7 @@
   <p:timing>
     <p:tnLst>
       <p:par>
-        <p:cTn xmlns:p14="http://schemas.microsoft.com/office/powerpoint/2010/main" id="1" dur="indefinite" restart="never" nodeType="tmRoot"/>
+        <p:cTn id="1" dur="indefinite" restart="never" nodeType="tmRoot"/>
       </p:par>
     </p:tnLst>
   </p:timing>
@@ -5822,10 +6195,36 @@
           </a:p>
         </p:txBody>
       </p:sp>
+      <p:pic>
+        <p:nvPicPr>
+          <p:cNvPr id="3074" name="Picture 2" descr="C:\Users\cdunphy\AppData\Local\Microsoft\Windows\Temporary Internet Files\Content.IE5\5YFOUQSJ\MC900279226[1].wmf"/>
+          <p:cNvPicPr>
+            <a:picLocks noChangeAspect="1" noChangeArrowheads="1"/>
+          </p:cNvPicPr>
+          <p:nvPr/>
+        </p:nvPicPr>
+        <p:blipFill>
+          <a:blip r:embed="rId2" cstate="print"/>
+          <a:srcRect/>
+          <a:stretch>
+            <a:fillRect/>
+          </a:stretch>
+        </p:blipFill>
+        <p:spPr bwMode="auto">
+          <a:xfrm>
+            <a:off x="6859588" y="298450"/>
+            <a:ext cx="1520825" cy="1817688"/>
+          </a:xfrm>
+          <a:prstGeom prst="rect">
+            <a:avLst/>
+          </a:prstGeom>
+          <a:noFill/>
+        </p:spPr>
+      </p:pic>
     </p:spTree>
     <p:extLst>
       <p:ext uri="{BB962C8B-B14F-4D97-AF65-F5344CB8AC3E}">
-        <p14:creationId xmlns:p14="http://schemas.microsoft.com/office/powerpoint/2010/main" val="2190666559"/>
+        <p14:creationId xmlns="" xmlns:p14="http://schemas.microsoft.com/office/powerpoint/2010/main" val="2190666559"/>
       </p:ext>
     </p:extLst>
   </p:cSld>
@@ -5835,7 +6234,7 @@
   <p:timing>
     <p:tnLst>
       <p:par>
-        <p:cTn xmlns:p14="http://schemas.microsoft.com/office/powerpoint/2010/main" id="1" dur="indefinite" restart="never" nodeType="tmRoot"/>
+        <p:cTn id="1" dur="indefinite" restart="never" nodeType="tmRoot"/>
       </p:par>
     </p:tnLst>
   </p:timing>
@@ -5926,7 +6325,7 @@
     </p:spTree>
     <p:extLst>
       <p:ext uri="{BB962C8B-B14F-4D97-AF65-F5344CB8AC3E}">
-        <p14:creationId xmlns:p14="http://schemas.microsoft.com/office/powerpoint/2010/main" val="311778715"/>
+        <p14:creationId xmlns="" xmlns:p14="http://schemas.microsoft.com/office/powerpoint/2010/main" val="311778715"/>
       </p:ext>
     </p:extLst>
   </p:cSld>
@@ -5936,7 +6335,7 @@
   <p:timing>
     <p:tnLst>
       <p:par>
-        <p:cTn xmlns:p14="http://schemas.microsoft.com/office/powerpoint/2010/main" id="1" dur="indefinite" restart="never" nodeType="tmRoot">
+        <p:cTn id="1" dur="indefinite" restart="never" nodeType="tmRoot">
           <p:childTnLst>
             <p:seq concurrent="1" nextAc="seek">
               <p:cTn id="2" dur="indefinite" nodeType="mainSeq">
@@ -6267,38 +6666,34 @@
       </p:sp>
       <p:pic>
         <p:nvPicPr>
-          <p:cNvPr id="4" name="Picture 3" descr="j0289054.jpg"/>
+          <p:cNvPr id="4099" name="Picture 3" descr="C:\Users\cdunphy\AppData\Local\Microsoft\Windows\Temporary Internet Files\Content.IE5\5YFOUQSJ\MC900322449[1].wmf"/>
           <p:cNvPicPr>
-            <a:picLocks noChangeAspect="1"/>
+            <a:picLocks noChangeAspect="1" noChangeArrowheads="1"/>
           </p:cNvPicPr>
           <p:nvPr/>
         </p:nvPicPr>
         <p:blipFill>
-          <a:blip r:embed="rId2">
-            <a:extLst>
-              <a:ext uri="{28A0092B-C50C-407E-A947-70E740481C1C}">
-                <a14:useLocalDpi xmlns:a14="http://schemas.microsoft.com/office/drawing/2010/main" val="0"/>
-              </a:ext>
-            </a:extLst>
-          </a:blip>
+          <a:blip r:embed="rId2" cstate="print"/>
+          <a:srcRect/>
           <a:stretch>
             <a:fillRect/>
           </a:stretch>
         </p:blipFill>
-        <p:spPr>
+        <p:spPr bwMode="auto">
           <a:xfrm>
-            <a:off x="6106583" y="476250"/>
-            <a:ext cx="2241550" cy="1475687"/>
+            <a:off x="6461760" y="326220"/>
+            <a:ext cx="2063242" cy="1748510"/>
           </a:xfrm>
           <a:prstGeom prst="rect">
             <a:avLst/>
           </a:prstGeom>
+          <a:noFill/>
         </p:spPr>
       </p:pic>
     </p:spTree>
     <p:extLst>
       <p:ext uri="{BB962C8B-B14F-4D97-AF65-F5344CB8AC3E}">
-        <p14:creationId xmlns:p14="http://schemas.microsoft.com/office/powerpoint/2010/main" val="67570856"/>
+        <p14:creationId xmlns="" xmlns:p14="http://schemas.microsoft.com/office/powerpoint/2010/main" val="67570856"/>
       </p:ext>
     </p:extLst>
   </p:cSld>
@@ -6308,7 +6703,7 @@
   <p:timing>
     <p:tnLst>
       <p:par>
-        <p:cTn xmlns:p14="http://schemas.microsoft.com/office/powerpoint/2010/main" id="1" dur="indefinite" restart="never" nodeType="tmRoot"/>
+        <p:cTn id="1" dur="indefinite" restart="never" nodeType="tmRoot"/>
       </p:par>
     </p:tnLst>
   </p:timing>
@@ -6364,10 +6759,10 @@
           <p:nvPr/>
         </p:nvPicPr>
         <p:blipFill>
-          <a:blip r:embed="rId2">
+          <a:blip r:embed="rId2" cstate="print">
             <a:extLst>
               <a:ext uri="{28A0092B-C50C-407E-A947-70E740481C1C}">
-                <a14:useLocalDpi xmlns:a14="http://schemas.microsoft.com/office/drawing/2010/main" val="0"/>
+                <a14:useLocalDpi xmlns="" xmlns:a14="http://schemas.microsoft.com/office/drawing/2010/main" val="0"/>
               </a:ext>
             </a:extLst>
           </a:blip>
@@ -6377,7 +6772,7 @@
         </p:blipFill>
         <p:spPr>
           <a:xfrm>
-            <a:off x="5246707" y="3627070"/>
+            <a:off x="5039443" y="2318008"/>
             <a:ext cx="2754032" cy="806736"/>
           </a:xfrm>
           <a:prstGeom prst="rect">
@@ -6394,10 +6789,10 @@
           <p:nvPr/>
         </p:nvPicPr>
         <p:blipFill>
-          <a:blip r:embed="rId3">
+          <a:blip r:embed="rId3" cstate="print">
             <a:extLst>
               <a:ext uri="{28A0092B-C50C-407E-A947-70E740481C1C}">
-                <a14:useLocalDpi xmlns:a14="http://schemas.microsoft.com/office/drawing/2010/main" val="0"/>
+                <a14:useLocalDpi xmlns="" xmlns:a14="http://schemas.microsoft.com/office/drawing/2010/main" val="0"/>
               </a:ext>
             </a:extLst>
           </a:blip>
@@ -6407,7 +6802,7 @@
         </p:blipFill>
         <p:spPr>
           <a:xfrm>
-            <a:off x="2691064" y="2563568"/>
+            <a:off x="1306351" y="2331920"/>
             <a:ext cx="3096969" cy="792824"/>
           </a:xfrm>
           <a:prstGeom prst="rect">
@@ -6424,10 +6819,10 @@
           <p:nvPr/>
         </p:nvPicPr>
         <p:blipFill>
-          <a:blip r:embed="rId4">
+          <a:blip r:embed="rId4" cstate="print">
             <a:extLst>
               <a:ext uri="{28A0092B-C50C-407E-A947-70E740481C1C}">
-                <a14:useLocalDpi xmlns:a14="http://schemas.microsoft.com/office/drawing/2010/main" val="0"/>
+                <a14:useLocalDpi xmlns="" xmlns:a14="http://schemas.microsoft.com/office/drawing/2010/main" val="0"/>
               </a:ext>
             </a:extLst>
           </a:blip>
@@ -6437,7 +6832,7 @@
         </p:blipFill>
         <p:spPr>
           <a:xfrm>
-            <a:off x="952572" y="3644195"/>
+            <a:off x="744369" y="3627070"/>
             <a:ext cx="2659744" cy="789611"/>
           </a:xfrm>
           <a:prstGeom prst="rect">
@@ -6454,10 +6849,10 @@
           <p:nvPr/>
         </p:nvPicPr>
         <p:blipFill>
-          <a:blip r:embed="rId5">
+          <a:blip r:embed="rId5" cstate="print">
             <a:extLst>
               <a:ext uri="{28A0092B-C50C-407E-A947-70E740481C1C}">
-                <a14:useLocalDpi xmlns:a14="http://schemas.microsoft.com/office/drawing/2010/main" val="0"/>
+                <a14:useLocalDpi xmlns="" xmlns:a14="http://schemas.microsoft.com/office/drawing/2010/main" val="0"/>
               </a:ext>
             </a:extLst>
           </a:blip>
@@ -6484,10 +6879,10 @@
           <p:nvPr/>
         </p:nvPicPr>
         <p:blipFill>
-          <a:blip r:embed="rId6">
+          <a:blip r:embed="rId6" cstate="print">
             <a:extLst>
               <a:ext uri="{28A0092B-C50C-407E-A947-70E740481C1C}">
-                <a14:useLocalDpi xmlns:a14="http://schemas.microsoft.com/office/drawing/2010/main" val="0"/>
+                <a14:useLocalDpi xmlns="" xmlns:a14="http://schemas.microsoft.com/office/drawing/2010/main" val="0"/>
               </a:ext>
             </a:extLst>
           </a:blip>
@@ -6497,7 +6892,7 @@
         </p:blipFill>
         <p:spPr>
           <a:xfrm>
-            <a:off x="5246707" y="4762759"/>
+            <a:off x="4817848" y="4762759"/>
             <a:ext cx="2202719" cy="1321631"/>
           </a:xfrm>
           <a:prstGeom prst="rect">
@@ -6505,10 +6900,111 @@
           </a:prstGeom>
         </p:spPr>
       </p:pic>
+      <p:sp>
+        <p:nvSpPr>
+          <p:cNvPr id="8" name="Rectangle 7"/>
+          <p:cNvSpPr/>
+          <p:nvPr/>
+        </p:nvSpPr>
+        <p:spPr>
+          <a:xfrm>
+            <a:off x="5504680" y="3493351"/>
+            <a:ext cx="2925802" cy="923330"/>
+          </a:xfrm>
+          <a:prstGeom prst="rect">
+            <a:avLst/>
+          </a:prstGeom>
+          <a:noFill/>
+        </p:spPr>
+        <p:txBody>
+          <a:bodyPr wrap="none" lIns="91440" tIns="45720" rIns="91440" bIns="45720">
+            <a:spAutoFit/>
+          </a:bodyPr>
+          <a:lstStyle/>
+          <a:p>
+            <a:pPr algn="ctr"/>
+            <a:r>
+              <a:rPr lang="el-GR" sz="5400" b="1" cap="none" spc="0" dirty="0" smtClean="0">
+                <a:ln w="12700">
+                  <a:solidFill>
+                    <a:schemeClr val="tx2">
+                      <a:satMod val="155000"/>
+                    </a:schemeClr>
+                  </a:solidFill>
+                  <a:prstDash val="solid"/>
+                </a:ln>
+                <a:solidFill>
+                  <a:schemeClr val="bg2">
+                    <a:tint val="85000"/>
+                    <a:satMod val="155000"/>
+                  </a:schemeClr>
+                </a:solidFill>
+                <a:effectLst>
+                  <a:outerShdw blurRad="41275" dist="20320" dir="1800000" algn="tl" rotWithShape="0">
+                    <a:srgbClr val="000000">
+                      <a:alpha val="40000"/>
+                    </a:srgbClr>
+                  </a:outerShdw>
+                </a:effectLst>
+              </a:rPr>
+              <a:t>λ</a:t>
+            </a:r>
+            <a:r>
+              <a:rPr lang="en-US" sz="5400" b="1" cap="none" spc="0" dirty="0" smtClean="0">
+                <a:ln w="12700">
+                  <a:solidFill>
+                    <a:schemeClr val="tx2">
+                      <a:satMod val="155000"/>
+                    </a:schemeClr>
+                  </a:solidFill>
+                  <a:prstDash val="solid"/>
+                </a:ln>
+                <a:solidFill>
+                  <a:schemeClr val="bg2">
+                    <a:tint val="85000"/>
+                    <a:satMod val="155000"/>
+                  </a:schemeClr>
+                </a:solidFill>
+                <a:effectLst>
+                  <a:outerShdw blurRad="41275" dist="20320" dir="1800000" algn="tl" rotWithShape="0">
+                    <a:srgbClr val="000000">
+                      <a:alpha val="40000"/>
+                    </a:srgbClr>
+                  </a:outerShdw>
+                </a:effectLst>
+              </a:rPr>
+              <a:t> Scheme</a:t>
+            </a:r>
+            <a:endParaRPr lang="en-US" sz="5400" b="1" cap="none" spc="0" dirty="0">
+              <a:ln w="12700">
+                <a:solidFill>
+                  <a:schemeClr val="tx2">
+                    <a:satMod val="155000"/>
+                  </a:schemeClr>
+                </a:solidFill>
+                <a:prstDash val="solid"/>
+              </a:ln>
+              <a:solidFill>
+                <a:schemeClr val="bg2">
+                  <a:tint val="85000"/>
+                  <a:satMod val="155000"/>
+                </a:schemeClr>
+              </a:solidFill>
+              <a:effectLst>
+                <a:outerShdw blurRad="41275" dist="20320" dir="1800000" algn="tl" rotWithShape="0">
+                  <a:srgbClr val="000000">
+                    <a:alpha val="40000"/>
+                  </a:srgbClr>
+                </a:outerShdw>
+              </a:effectLst>
+            </a:endParaRPr>
+          </a:p>
+        </p:txBody>
+      </p:sp>
     </p:spTree>
     <p:extLst>
       <p:ext uri="{BB962C8B-B14F-4D97-AF65-F5344CB8AC3E}">
-        <p14:creationId xmlns:p14="http://schemas.microsoft.com/office/powerpoint/2010/main" val="3380746537"/>
+        <p14:creationId xmlns="" xmlns:p14="http://schemas.microsoft.com/office/powerpoint/2010/main" val="3380746537"/>
       </p:ext>
     </p:extLst>
   </p:cSld>
@@ -6518,7 +7014,7 @@
   <p:timing>
     <p:tnLst>
       <p:par>
-        <p:cTn xmlns:p14="http://schemas.microsoft.com/office/powerpoint/2010/main" id="1" dur="indefinite" restart="never" nodeType="tmRoot"/>
+        <p:cTn id="1" dur="indefinite" restart="never" nodeType="tmRoot"/>
       </p:par>
     </p:tnLst>
   </p:timing>
@@ -6559,71 +7055,136 @@
           <a:p>
             <a:r>
               <a:rPr lang="en-US" dirty="0" smtClean="0"/>
-              <a:t>Quick Overview of FP</a:t>
+              <a:t>Influenced by FP</a:t>
             </a:r>
             <a:endParaRPr lang="en-US" dirty="0"/>
           </a:p>
         </p:txBody>
       </p:sp>
-      <p:sp>
-        <p:nvSpPr>
-          <p:cNvPr id="3" name="Content Placeholder 2"/>
-          <p:cNvSpPr>
-            <a:spLocks noGrp="1"/>
-          </p:cNvSpPr>
-          <p:nvPr>
-            <p:ph idx="1"/>
-          </p:nvPr>
-        </p:nvSpPr>
-        <p:spPr/>
-        <p:txBody>
-          <a:bodyPr/>
-          <a:lstStyle/>
-          <a:p>
-            <a:r>
-              <a:rPr lang="en-US" dirty="0" smtClean="0"/>
-              <a:t>Immutable state</a:t>
-            </a:r>
-          </a:p>
-          <a:p>
-            <a:r>
-              <a:rPr lang="en-US" dirty="0" smtClean="0"/>
-              <a:t>Recursion</a:t>
-            </a:r>
-          </a:p>
-          <a:p>
-            <a:r>
-              <a:rPr lang="en-US" dirty="0" smtClean="0"/>
-              <a:t>Higher order functions</a:t>
-            </a:r>
-          </a:p>
-          <a:p>
-            <a:r>
-              <a:rPr lang="en-US" dirty="0" smtClean="0"/>
-              <a:t>Currying</a:t>
-            </a:r>
-          </a:p>
-          <a:p>
-            <a:r>
-              <a:rPr lang="en-US" dirty="0" smtClean="0"/>
-              <a:t>Pattern Matching</a:t>
-            </a:r>
-          </a:p>
-          <a:p>
-            <a:endParaRPr lang="en-US" dirty="0" smtClean="0"/>
-          </a:p>
-          <a:p>
-            <a:endParaRPr lang="en-US" dirty="0" smtClean="0"/>
-          </a:p>
-          <a:p>
-            <a:endParaRPr lang="en-US" dirty="0"/>
-          </a:p>
-        </p:txBody>
-      </p:sp>
+      <p:pic>
+        <p:nvPicPr>
+          <p:cNvPr id="15" name="Picture 14" descr="CSharp.jpg"/>
+          <p:cNvPicPr>
+            <a:picLocks noChangeAspect="1"/>
+          </p:cNvPicPr>
+          <p:nvPr/>
+        </p:nvPicPr>
+        <p:blipFill>
+          <a:blip r:embed="rId2" cstate="print"/>
+          <a:stretch>
+            <a:fillRect/>
+          </a:stretch>
+        </p:blipFill>
+        <p:spPr>
+          <a:xfrm>
+            <a:off x="6710298" y="3539109"/>
+            <a:ext cx="1579375" cy="1999488"/>
+          </a:xfrm>
+          <a:prstGeom prst="rect">
+            <a:avLst/>
+          </a:prstGeom>
+        </p:spPr>
+      </p:pic>
+      <p:pic>
+        <p:nvPicPr>
+          <p:cNvPr id="16" name="Picture 15" descr="ruby.png"/>
+          <p:cNvPicPr>
+            <a:picLocks noChangeAspect="1"/>
+          </p:cNvPicPr>
+          <p:nvPr/>
+        </p:nvPicPr>
+        <p:blipFill>
+          <a:blip r:embed="rId3" cstate="print"/>
+          <a:stretch>
+            <a:fillRect/>
+          </a:stretch>
+        </p:blipFill>
+        <p:spPr>
+          <a:xfrm>
+            <a:off x="888111" y="4402455"/>
+            <a:ext cx="1352550" cy="1552575"/>
+          </a:xfrm>
+          <a:prstGeom prst="rect">
+            <a:avLst/>
+          </a:prstGeom>
+        </p:spPr>
+      </p:pic>
+      <p:pic>
+        <p:nvPicPr>
+          <p:cNvPr id="17" name="Picture 16" descr="d.jpg"/>
+          <p:cNvPicPr>
+            <a:picLocks noChangeAspect="1"/>
+          </p:cNvPicPr>
+          <p:nvPr/>
+        </p:nvPicPr>
+        <p:blipFill>
+          <a:blip r:embed="rId4" cstate="print"/>
+          <a:stretch>
+            <a:fillRect/>
+          </a:stretch>
+        </p:blipFill>
+        <p:spPr>
+          <a:xfrm>
+            <a:off x="1590850" y="2234184"/>
+            <a:ext cx="1714500" cy="1304925"/>
+          </a:xfrm>
+          <a:prstGeom prst="rect">
+            <a:avLst/>
+          </a:prstGeom>
+        </p:spPr>
+      </p:pic>
+      <p:pic>
+        <p:nvPicPr>
+          <p:cNvPr id="18" name="Picture 17" descr="614px-Groovy-logo.svg.png"/>
+          <p:cNvPicPr>
+            <a:picLocks noChangeAspect="1"/>
+          </p:cNvPicPr>
+          <p:nvPr/>
+        </p:nvPicPr>
+        <p:blipFill>
+          <a:blip r:embed="rId5" cstate="print"/>
+          <a:stretch>
+            <a:fillRect/>
+          </a:stretch>
+        </p:blipFill>
+        <p:spPr>
+          <a:xfrm>
+            <a:off x="2875232" y="4402455"/>
+            <a:ext cx="3188890" cy="1578864"/>
+          </a:xfrm>
+          <a:prstGeom prst="rect">
+            <a:avLst/>
+          </a:prstGeom>
+        </p:spPr>
+      </p:pic>
+      <p:pic>
+        <p:nvPicPr>
+          <p:cNvPr id="19" name="Picture 18" descr="486px-Python_logo.svg.png"/>
+          <p:cNvPicPr>
+            <a:picLocks noChangeAspect="1"/>
+          </p:cNvPicPr>
+          <p:nvPr/>
+        </p:nvPicPr>
+        <p:blipFill>
+          <a:blip r:embed="rId6" cstate="print"/>
+          <a:stretch>
+            <a:fillRect/>
+          </a:stretch>
+        </p:blipFill>
+        <p:spPr>
+          <a:xfrm>
+            <a:off x="4577650" y="2302764"/>
+            <a:ext cx="2972943" cy="880872"/>
+          </a:xfrm>
+          <a:prstGeom prst="rect">
+            <a:avLst/>
+          </a:prstGeom>
+        </p:spPr>
+      </p:pic>
     </p:spTree>
     <p:extLst>
       <p:ext uri="{BB962C8B-B14F-4D97-AF65-F5344CB8AC3E}">
-        <p14:creationId xmlns:p14="http://schemas.microsoft.com/office/powerpoint/2010/main" val="1963701257"/>
+        <p14:creationId xmlns="" xmlns:p14="http://schemas.microsoft.com/office/powerpoint/2010/main" val="3380746537"/>
       </p:ext>
     </p:extLst>
   </p:cSld>
@@ -6633,7 +7194,122 @@
   <p:timing>
     <p:tnLst>
       <p:par>
-        <p:cTn xmlns:p14="http://schemas.microsoft.com/office/powerpoint/2010/main" id="1" dur="indefinite" restart="never" nodeType="tmRoot">
+        <p:cTn id="1" dur="indefinite" restart="never" nodeType="tmRoot"/>
+      </p:par>
+    </p:tnLst>
+  </p:timing>
+</p:sld>
+</file>
+
+<file path=ppt/slides/slide9.xml><?xml version="1.0" encoding="utf-8"?>
+<p:sld xmlns:a="http://schemas.openxmlformats.org/drawingml/2006/main" xmlns:r="http://schemas.openxmlformats.org/officeDocument/2006/relationships" xmlns:p="http://schemas.openxmlformats.org/presentationml/2006/main">
+  <p:cSld>
+    <p:spTree>
+      <p:nvGrpSpPr>
+        <p:cNvPr id="1" name=""/>
+        <p:cNvGrpSpPr/>
+        <p:nvPr/>
+      </p:nvGrpSpPr>
+      <p:grpSpPr>
+        <a:xfrm>
+          <a:off x="0" y="0"/>
+          <a:ext cx="0" cy="0"/>
+          <a:chOff x="0" y="0"/>
+          <a:chExt cx="0" cy="0"/>
+        </a:xfrm>
+      </p:grpSpPr>
+      <p:sp>
+        <p:nvSpPr>
+          <p:cNvPr id="2" name="Title 1"/>
+          <p:cNvSpPr>
+            <a:spLocks noGrp="1"/>
+          </p:cNvSpPr>
+          <p:nvPr>
+            <p:ph type="title"/>
+          </p:nvPr>
+        </p:nvSpPr>
+        <p:spPr/>
+        <p:txBody>
+          <a:bodyPr/>
+          <a:lstStyle/>
+          <a:p>
+            <a:r>
+              <a:rPr lang="en-US" dirty="0" smtClean="0"/>
+              <a:t>Quick Overview of FP</a:t>
+            </a:r>
+            <a:endParaRPr lang="en-US" dirty="0"/>
+          </a:p>
+        </p:txBody>
+      </p:sp>
+      <p:sp>
+        <p:nvSpPr>
+          <p:cNvPr id="3" name="Content Placeholder 2"/>
+          <p:cNvSpPr>
+            <a:spLocks noGrp="1"/>
+          </p:cNvSpPr>
+          <p:nvPr>
+            <p:ph idx="1"/>
+          </p:nvPr>
+        </p:nvSpPr>
+        <p:spPr/>
+        <p:txBody>
+          <a:bodyPr/>
+          <a:lstStyle/>
+          <a:p>
+            <a:r>
+              <a:rPr lang="en-US" dirty="0" smtClean="0"/>
+              <a:t>Immutable state</a:t>
+            </a:r>
+          </a:p>
+          <a:p>
+            <a:r>
+              <a:rPr lang="en-US" dirty="0" smtClean="0"/>
+              <a:t>Recursion</a:t>
+            </a:r>
+          </a:p>
+          <a:p>
+            <a:r>
+              <a:rPr lang="en-US" dirty="0" smtClean="0"/>
+              <a:t>Higher order functions</a:t>
+            </a:r>
+          </a:p>
+          <a:p>
+            <a:r>
+              <a:rPr lang="en-US" dirty="0" smtClean="0"/>
+              <a:t>Currying</a:t>
+            </a:r>
+          </a:p>
+          <a:p>
+            <a:r>
+              <a:rPr lang="en-US" dirty="0" smtClean="0"/>
+              <a:t>Pattern Matching</a:t>
+            </a:r>
+          </a:p>
+          <a:p>
+            <a:endParaRPr lang="en-US" dirty="0" smtClean="0"/>
+          </a:p>
+          <a:p>
+            <a:endParaRPr lang="en-US" dirty="0" smtClean="0"/>
+          </a:p>
+          <a:p>
+            <a:endParaRPr lang="en-US" dirty="0"/>
+          </a:p>
+        </p:txBody>
+      </p:sp>
+    </p:spTree>
+    <p:extLst>
+      <p:ext uri="{BB962C8B-B14F-4D97-AF65-F5344CB8AC3E}">
+        <p14:creationId xmlns="" xmlns:p14="http://schemas.microsoft.com/office/powerpoint/2010/main" val="1963701257"/>
+      </p:ext>
+    </p:extLst>
+  </p:cSld>
+  <p:clrMapOvr>
+    <a:masterClrMapping/>
+  </p:clrMapOvr>
+  <p:timing>
+    <p:tnLst>
+      <p:par>
+        <p:cTn id="1" dur="indefinite" restart="never" nodeType="tmRoot">
           <p:childTnLst>
             <p:seq concurrent="1" nextAc="seek">
               <p:cTn id="2" dur="indefinite" nodeType="mainSeq">
@@ -7181,305 +7857,10 @@
 </p:sld>
 </file>
 
-<file path=ppt/slides/slide9.xml><?xml version="1.0" encoding="utf-8"?>
-<p:sld xmlns:a="http://schemas.openxmlformats.org/drawingml/2006/main" xmlns:r="http://schemas.openxmlformats.org/officeDocument/2006/relationships" xmlns:p="http://schemas.openxmlformats.org/presentationml/2006/main">
-  <p:cSld>
-    <p:spTree>
-      <p:nvGrpSpPr>
-        <p:cNvPr id="1" name=""/>
-        <p:cNvGrpSpPr/>
-        <p:nvPr/>
-      </p:nvGrpSpPr>
-      <p:grpSpPr>
-        <a:xfrm>
-          <a:off x="0" y="0"/>
-          <a:ext cx="0" cy="0"/>
-          <a:chOff x="0" y="0"/>
-          <a:chExt cx="0" cy="0"/>
-        </a:xfrm>
-      </p:grpSpPr>
-      <p:sp>
-        <p:nvSpPr>
-          <p:cNvPr id="2" name="Title 1"/>
-          <p:cNvSpPr>
-            <a:spLocks noGrp="1"/>
-          </p:cNvSpPr>
-          <p:nvPr>
-            <p:ph type="title"/>
-          </p:nvPr>
-        </p:nvSpPr>
-        <p:spPr/>
-        <p:txBody>
-          <a:bodyPr/>
-          <a:lstStyle/>
-          <a:p>
-            <a:r>
-              <a:rPr lang="en-US" dirty="0" smtClean="0"/>
-              <a:t>Want to try Haskell?</a:t>
-            </a:r>
-            <a:endParaRPr lang="en-US" dirty="0"/>
-          </a:p>
-        </p:txBody>
-      </p:sp>
-      <p:sp>
-        <p:nvSpPr>
-          <p:cNvPr id="3" name="Content Placeholder 2"/>
-          <p:cNvSpPr>
-            <a:spLocks noGrp="1"/>
-          </p:cNvSpPr>
-          <p:nvPr>
-            <p:ph idx="1"/>
-          </p:nvPr>
-        </p:nvSpPr>
-        <p:spPr/>
-        <p:txBody>
-          <a:bodyPr>
-            <a:normAutofit fontScale="92500" lnSpcReduction="20000"/>
-          </a:bodyPr>
-          <a:lstStyle/>
-          <a:p>
-            <a:r>
-              <a:rPr lang="en-US" dirty="0" smtClean="0"/>
-              <a:t>Free eBooks!</a:t>
-            </a:r>
-          </a:p>
-          <a:p>
-            <a:pPr lvl="1"/>
-            <a:r>
-              <a:rPr lang="en-US" dirty="0" smtClean="0"/>
-              <a:t>Learn you a Haskell for Great Good!</a:t>
-            </a:r>
-          </a:p>
-          <a:p>
-            <a:pPr lvl="2"/>
-            <a:r>
-              <a:rPr lang="en-US" dirty="0">
-                <a:solidFill>
-                  <a:srgbClr val="105CA4"/>
-                </a:solidFill>
-                <a:hlinkClick r:id="rId2"/>
-              </a:rPr>
-              <a:t>http://learnyouahaskell.com/</a:t>
-            </a:r>
-            <a:r>
-              <a:rPr lang="en-US" dirty="0" smtClean="0">
-                <a:solidFill>
-                  <a:srgbClr val="105CA4"/>
-                </a:solidFill>
-                <a:hlinkClick r:id="rId2"/>
-              </a:rPr>
-              <a:t>chapters</a:t>
-            </a:r>
-            <a:endParaRPr lang="en-US" dirty="0" smtClean="0">
-              <a:solidFill>
-                <a:srgbClr val="105CA4"/>
-              </a:solidFill>
-            </a:endParaRPr>
-          </a:p>
-          <a:p>
-            <a:pPr lvl="1"/>
-            <a:r>
-              <a:rPr lang="en-US" dirty="0" smtClean="0"/>
-              <a:t>Real World Haskell</a:t>
-            </a:r>
-          </a:p>
-          <a:p>
-            <a:pPr lvl="2"/>
-            <a:r>
-              <a:rPr lang="en-US" dirty="0">
-                <a:hlinkClick r:id="rId3"/>
-              </a:rPr>
-              <a:t>http://book.realworldhaskell.org/read</a:t>
-            </a:r>
-            <a:r>
-              <a:rPr lang="en-US" dirty="0" smtClean="0">
-                <a:hlinkClick r:id="rId3"/>
-              </a:rPr>
-              <a:t>/</a:t>
-            </a:r>
-            <a:endParaRPr lang="en-US" dirty="0" smtClean="0"/>
-          </a:p>
-          <a:p>
-            <a:pPr lvl="1"/>
-            <a:r>
-              <a:rPr lang="en-US" dirty="0" smtClean="0"/>
-              <a:t>Get Haskell Platform easily for your machine</a:t>
-            </a:r>
-          </a:p>
-          <a:p>
-            <a:pPr lvl="1"/>
-            <a:r>
-              <a:rPr lang="en-US" dirty="0" smtClean="0"/>
-              <a:t>Linux:</a:t>
-            </a:r>
-          </a:p>
-          <a:p>
-            <a:pPr lvl="2"/>
-            <a:r>
-              <a:rPr lang="en-US" sz="1600" dirty="0" smtClean="0">
-                <a:latin typeface="Consolas"/>
-                <a:cs typeface="Consolas"/>
-              </a:rPr>
-              <a:t>$ </a:t>
-            </a:r>
-            <a:r>
-              <a:rPr lang="en-US" sz="1600" dirty="0" err="1" smtClean="0">
-                <a:latin typeface="Consolas"/>
-                <a:cs typeface="Consolas"/>
-              </a:rPr>
-              <a:t>sudo</a:t>
-            </a:r>
-            <a:r>
-              <a:rPr lang="en-US" sz="1600" dirty="0" smtClean="0">
-                <a:latin typeface="Consolas"/>
-                <a:cs typeface="Consolas"/>
-              </a:rPr>
-              <a:t> apt-get install </a:t>
-            </a:r>
-            <a:r>
-              <a:rPr lang="en-US" sz="1600" dirty="0" err="1" smtClean="0">
-                <a:latin typeface="Consolas"/>
-                <a:cs typeface="Consolas"/>
-              </a:rPr>
-              <a:t>haskell</a:t>
-            </a:r>
-            <a:r>
-              <a:rPr lang="en-US" sz="1600" dirty="0" smtClean="0">
-                <a:latin typeface="Consolas"/>
-                <a:cs typeface="Consolas"/>
-              </a:rPr>
-              <a:t>-platform</a:t>
-            </a:r>
-          </a:p>
-          <a:p>
-            <a:pPr lvl="2"/>
-            <a:r>
-              <a:rPr lang="en-US" sz="1600" dirty="0" smtClean="0">
-                <a:latin typeface="Consolas"/>
-                <a:cs typeface="Consolas"/>
-              </a:rPr>
-              <a:t>$ </a:t>
-            </a:r>
-            <a:r>
-              <a:rPr lang="en-US" sz="1600" dirty="0" err="1" smtClean="0">
-                <a:latin typeface="Consolas"/>
-                <a:cs typeface="Consolas"/>
-              </a:rPr>
-              <a:t>sudo</a:t>
-            </a:r>
-            <a:r>
-              <a:rPr lang="en-US" sz="1600" dirty="0" smtClean="0">
-                <a:latin typeface="Consolas"/>
-                <a:cs typeface="Consolas"/>
-              </a:rPr>
-              <a:t> yum install </a:t>
-            </a:r>
-            <a:r>
-              <a:rPr lang="en-US" sz="1600" dirty="0" err="1" smtClean="0">
-                <a:latin typeface="Consolas"/>
-                <a:cs typeface="Consolas"/>
-              </a:rPr>
-              <a:t>haskell</a:t>
-            </a:r>
-            <a:r>
-              <a:rPr lang="en-US" sz="1600" dirty="0" smtClean="0">
-                <a:latin typeface="Consolas"/>
-                <a:cs typeface="Consolas"/>
-              </a:rPr>
-              <a:t>-platform</a:t>
-            </a:r>
-          </a:p>
-          <a:p>
-            <a:pPr lvl="1"/>
-            <a:r>
-              <a:rPr lang="en-US" dirty="0" smtClean="0"/>
-              <a:t>Windows or Mac:</a:t>
-            </a:r>
-          </a:p>
-          <a:p>
-            <a:pPr lvl="2"/>
-            <a:r>
-              <a:rPr lang="en-US" dirty="0" smtClean="0"/>
-              <a:t>Get </a:t>
-            </a:r>
-            <a:r>
-              <a:rPr lang="en-US" dirty="0"/>
-              <a:t>the platform here: </a:t>
-            </a:r>
-            <a:r>
-              <a:rPr lang="en-US" dirty="0">
-                <a:hlinkClick r:id="rId4"/>
-              </a:rPr>
-              <a:t>http://www.haskell.org/platform</a:t>
-            </a:r>
-            <a:r>
-              <a:rPr lang="en-US" dirty="0" smtClean="0">
-                <a:hlinkClick r:id="rId4"/>
-              </a:rPr>
-              <a:t>/</a:t>
-            </a:r>
-            <a:endParaRPr lang="en-US" dirty="0" smtClean="0"/>
-          </a:p>
-          <a:p>
-            <a:pPr lvl="1"/>
-            <a:r>
-              <a:rPr lang="en-US" dirty="0" smtClean="0"/>
-              <a:t>Cool video introduction: </a:t>
-            </a:r>
-          </a:p>
-          <a:p>
-            <a:pPr lvl="2"/>
-            <a:r>
-              <a:rPr lang="en-US" dirty="0">
-                <a:hlinkClick r:id="rId5"/>
-              </a:rPr>
-              <a:t>http://www.youtube.com/watch?v=</a:t>
-            </a:r>
-            <a:r>
-              <a:rPr lang="en-US" dirty="0" smtClean="0">
-                <a:hlinkClick r:id="rId5"/>
-              </a:rPr>
-              <a:t>b9FagOVqxmI</a:t>
-            </a:r>
-            <a:endParaRPr lang="en-US" dirty="0" smtClean="0"/>
-          </a:p>
-          <a:p>
-            <a:pPr lvl="1"/>
-            <a:endParaRPr lang="en-US" dirty="0"/>
-          </a:p>
-          <a:p>
-            <a:pPr lvl="1"/>
-            <a:endParaRPr lang="en-US" dirty="0" smtClean="0"/>
-          </a:p>
-          <a:p>
-            <a:endParaRPr lang="en-US" dirty="0"/>
-          </a:p>
-        </p:txBody>
-      </p:sp>
-    </p:spTree>
-    <p:extLst>
-      <p:ext uri="{BB962C8B-B14F-4D97-AF65-F5344CB8AC3E}">
-        <p14:creationId xmlns:p14="http://schemas.microsoft.com/office/powerpoint/2010/main" val="2526408885"/>
-      </p:ext>
-    </p:extLst>
-  </p:cSld>
-  <p:clrMapOvr>
-    <a:masterClrMapping/>
-  </p:clrMapOvr>
-  <p:timing>
-    <p:tnLst>
-      <p:par>
-        <p:cTn xmlns:p14="http://schemas.microsoft.com/office/powerpoint/2010/main" id="1" dur="indefinite" restart="never" nodeType="tmRoot"/>
-      </p:par>
-    </p:tnLst>
-  </p:timing>
-</p:sld>
-</file>
-
 <file path=ppt/theme/theme1.xml><?xml version="1.0" encoding="utf-8"?>
 <a:theme xmlns:a="http://schemas.openxmlformats.org/drawingml/2006/main" name="Expo">
   <a:themeElements>
-    <a:clrScheme name="Expo">
+    <a:clrScheme name="Civic">
       <a:dk1>
         <a:sysClr val="windowText" lastClr="000000"/>
       </a:dk1>
@@ -7487,34 +7868,34 @@
         <a:sysClr val="window" lastClr="FFFFFF"/>
       </a:lt1>
       <a:dk2>
-        <a:srgbClr val="263B86"/>
+        <a:srgbClr val="646B86"/>
       </a:dk2>
       <a:lt2>
-        <a:srgbClr val="76B6F2"/>
+        <a:srgbClr val="C5D1D7"/>
       </a:lt2>
       <a:accent1>
-        <a:srgbClr val="FBC01E"/>
+        <a:srgbClr val="D16349"/>
       </a:accent1>
       <a:accent2>
-        <a:srgbClr val="EFE1A2"/>
+        <a:srgbClr val="CCB400"/>
       </a:accent2>
       <a:accent3>
-        <a:srgbClr val="FA8716"/>
+        <a:srgbClr val="8CADAE"/>
       </a:accent3>
       <a:accent4>
-        <a:srgbClr val="BE0204"/>
+        <a:srgbClr val="8C7B70"/>
       </a:accent4>
       <a:accent5>
-        <a:srgbClr val="640F10"/>
+        <a:srgbClr val="8FB08C"/>
       </a:accent5>
       <a:accent6>
-        <a:srgbClr val="7E13E3"/>
+        <a:srgbClr val="D19049"/>
       </a:accent6>
       <a:hlink>
-        <a:srgbClr val="D2D200"/>
+        <a:srgbClr val="00A3D6"/>
       </a:hlink>
       <a:folHlink>
-        <a:srgbClr val="D0B9F8"/>
+        <a:srgbClr val="694F07"/>
       </a:folHlink>
     </a:clrScheme>
     <a:fontScheme name="Expo">

</xml_diff>

<commit_message>
added main functions to each example
</commit_message>
<xml_diff>
--- a/fnprogfun1.pptx
+++ b/fnprogfun1.pptx
@@ -2457,7 +2457,7 @@
           <a:blip r:embed="rId3" cstate="print">
             <a:extLst>
               <a:ext uri="{28A0092B-C50C-407E-A947-70E740481C1C}">
-                <a14:useLocalDpi xmlns="" xmlns:a14="http://schemas.microsoft.com/office/drawing/2010/main" val="0"/>
+                <a14:useLocalDpi xmlns:a14="http://schemas.microsoft.com/office/drawing/2010/main" xmlns="" val="0"/>
               </a:ext>
             </a:extLst>
           </a:blip>
@@ -5307,7 +5307,7 @@
           <a:blip r:embed="rId2" cstate="print">
             <a:extLst>
               <a:ext uri="{28A0092B-C50C-407E-A947-70E740481C1C}">
-                <a14:useLocalDpi xmlns="" xmlns:a14="http://schemas.microsoft.com/office/drawing/2010/main" val="0"/>
+                <a14:useLocalDpi xmlns:a14="http://schemas.microsoft.com/office/drawing/2010/main" xmlns="" val="0"/>
               </a:ext>
             </a:extLst>
           </a:blip>
@@ -5328,7 +5328,7 @@
     </p:spTree>
     <p:extLst>
       <p:ext uri="{BB962C8B-B14F-4D97-AF65-F5344CB8AC3E}">
-        <p14:creationId xmlns="" xmlns:p14="http://schemas.microsoft.com/office/powerpoint/2010/main" val="1873691422"/>
+        <p14:creationId xmlns:p14="http://schemas.microsoft.com/office/powerpoint/2010/main" xmlns="" val="1873691422"/>
       </p:ext>
     </p:extLst>
   </p:cSld>
@@ -5623,7 +5623,7 @@
     </p:spTree>
     <p:extLst>
       <p:ext uri="{BB962C8B-B14F-4D97-AF65-F5344CB8AC3E}">
-        <p14:creationId xmlns="" xmlns:p14="http://schemas.microsoft.com/office/powerpoint/2010/main" val="2526408885"/>
+        <p14:creationId xmlns:p14="http://schemas.microsoft.com/office/powerpoint/2010/main" xmlns="" val="2526408885"/>
       </p:ext>
     </p:extLst>
   </p:cSld>
@@ -5697,15 +5697,7 @@
           <a:p>
             <a:r>
               <a:rPr lang="en-US" dirty="0" smtClean="0"/>
-              <a:t>My example code </a:t>
-            </a:r>
-            <a:r>
-              <a:rPr lang="en-US" dirty="0" smtClean="0"/>
-              <a:t>(along with this slide deck) has </a:t>
-            </a:r>
-            <a:r>
-              <a:rPr lang="en-US" dirty="0" smtClean="0"/>
-              <a:t>been posted to </a:t>
+              <a:t>My example code (along with this slide deck) has been posted to </a:t>
             </a:r>
             <a:r>
               <a:rPr lang="en-US" dirty="0" err="1" smtClean="0"/>
@@ -5713,11 +5705,7 @@
             </a:r>
             <a:r>
               <a:rPr lang="en-US" dirty="0" smtClean="0"/>
-              <a:t> </a:t>
-            </a:r>
-            <a:r>
-              <a:rPr lang="en-US" dirty="0" smtClean="0"/>
-              <a:t>at:</a:t>
+              <a:t> at:</a:t>
             </a:r>
           </a:p>
           <a:p>
@@ -5768,7 +5756,7 @@
     </p:spTree>
     <p:extLst>
       <p:ext uri="{BB962C8B-B14F-4D97-AF65-F5344CB8AC3E}">
-        <p14:creationId xmlns="" xmlns:p14="http://schemas.microsoft.com/office/powerpoint/2010/main" val="1090242725"/>
+        <p14:creationId xmlns:p14="http://schemas.microsoft.com/office/powerpoint/2010/main" xmlns="" val="1090242725"/>
       </p:ext>
     </p:extLst>
   </p:cSld>
@@ -5877,7 +5865,7 @@
     </p:spTree>
     <p:extLst>
       <p:ext uri="{BB962C8B-B14F-4D97-AF65-F5344CB8AC3E}">
-        <p14:creationId xmlns="" xmlns:p14="http://schemas.microsoft.com/office/powerpoint/2010/main" val="3206459144"/>
+        <p14:creationId xmlns:p14="http://schemas.microsoft.com/office/powerpoint/2010/main" xmlns="" val="3206459144"/>
       </p:ext>
     </p:extLst>
   </p:cSld>
@@ -6055,7 +6043,7 @@
           <a:blip r:embed="rId2" cstate="print">
             <a:extLst>
               <a:ext uri="{28A0092B-C50C-407E-A947-70E740481C1C}">
-                <a14:useLocalDpi xmlns="" xmlns:a14="http://schemas.microsoft.com/office/drawing/2010/main" val="0"/>
+                <a14:useLocalDpi xmlns:a14="http://schemas.microsoft.com/office/drawing/2010/main" xmlns="" val="0"/>
               </a:ext>
             </a:extLst>
           </a:blip>
@@ -6076,7 +6064,7 @@
     </p:spTree>
     <p:extLst>
       <p:ext uri="{BB962C8B-B14F-4D97-AF65-F5344CB8AC3E}">
-        <p14:creationId xmlns="" xmlns:p14="http://schemas.microsoft.com/office/powerpoint/2010/main" val="885906404"/>
+        <p14:creationId xmlns:p14="http://schemas.microsoft.com/office/powerpoint/2010/main" xmlns="" val="885906404"/>
       </p:ext>
     </p:extLst>
   </p:cSld>
@@ -6086,7 +6074,388 @@
   <p:timing>
     <p:tnLst>
       <p:par>
-        <p:cTn id="1" dur="indefinite" restart="never" nodeType="tmRoot"/>
+        <p:cTn id="1" dur="indefinite" restart="never" nodeType="tmRoot">
+          <p:childTnLst>
+            <p:seq concurrent="1" nextAc="seek">
+              <p:cTn id="2" dur="indefinite" nodeType="mainSeq">
+                <p:childTnLst>
+                  <p:par>
+                    <p:cTn id="3" fill="hold">
+                      <p:stCondLst>
+                        <p:cond delay="indefinite"/>
+                      </p:stCondLst>
+                      <p:childTnLst>
+                        <p:par>
+                          <p:cTn id="4" fill="hold">
+                            <p:stCondLst>
+                              <p:cond delay="0"/>
+                            </p:stCondLst>
+                            <p:childTnLst>
+                              <p:par>
+                                <p:cTn id="5" presetID="2" presetClass="entr" presetSubtype="8" fill="hold" nodeType="clickEffect">
+                                  <p:stCondLst>
+                                    <p:cond delay="0"/>
+                                  </p:stCondLst>
+                                  <p:childTnLst>
+                                    <p:set>
+                                      <p:cBhvr>
+                                        <p:cTn id="6" dur="1" fill="hold">
+                                          <p:stCondLst>
+                                            <p:cond delay="0"/>
+                                          </p:stCondLst>
+                                        </p:cTn>
+                                        <p:tgtEl>
+                                          <p:spTgt spid="3">
+                                            <p:txEl>
+                                              <p:pRg st="3" end="3"/>
+                                            </p:txEl>
+                                          </p:spTgt>
+                                        </p:tgtEl>
+                                        <p:attrNameLst>
+                                          <p:attrName>style.visibility</p:attrName>
+                                        </p:attrNameLst>
+                                      </p:cBhvr>
+                                      <p:to>
+                                        <p:strVal val="visible"/>
+                                      </p:to>
+                                    </p:set>
+                                    <p:anim calcmode="lin" valueType="num">
+                                      <p:cBhvr additive="base">
+                                        <p:cTn id="7" dur="500" fill="hold"/>
+                                        <p:tgtEl>
+                                          <p:spTgt spid="3">
+                                            <p:txEl>
+                                              <p:pRg st="3" end="3"/>
+                                            </p:txEl>
+                                          </p:spTgt>
+                                        </p:tgtEl>
+                                        <p:attrNameLst>
+                                          <p:attrName>ppt_x</p:attrName>
+                                        </p:attrNameLst>
+                                      </p:cBhvr>
+                                      <p:tavLst>
+                                        <p:tav tm="0">
+                                          <p:val>
+                                            <p:strVal val="0-#ppt_w/2"/>
+                                          </p:val>
+                                        </p:tav>
+                                        <p:tav tm="100000">
+                                          <p:val>
+                                            <p:strVal val="#ppt_x"/>
+                                          </p:val>
+                                        </p:tav>
+                                      </p:tavLst>
+                                    </p:anim>
+                                    <p:anim calcmode="lin" valueType="num">
+                                      <p:cBhvr additive="base">
+                                        <p:cTn id="8" dur="500" fill="hold"/>
+                                        <p:tgtEl>
+                                          <p:spTgt spid="3">
+                                            <p:txEl>
+                                              <p:pRg st="3" end="3"/>
+                                            </p:txEl>
+                                          </p:spTgt>
+                                        </p:tgtEl>
+                                        <p:attrNameLst>
+                                          <p:attrName>ppt_y</p:attrName>
+                                        </p:attrNameLst>
+                                      </p:cBhvr>
+                                      <p:tavLst>
+                                        <p:tav tm="0">
+                                          <p:val>
+                                            <p:strVal val="#ppt_y"/>
+                                          </p:val>
+                                        </p:tav>
+                                        <p:tav tm="100000">
+                                          <p:val>
+                                            <p:strVal val="#ppt_y"/>
+                                          </p:val>
+                                        </p:tav>
+                                      </p:tavLst>
+                                    </p:anim>
+                                  </p:childTnLst>
+                                </p:cTn>
+                              </p:par>
+                              <p:par>
+                                <p:cTn id="9" presetID="2" presetClass="entr" presetSubtype="8" fill="hold" nodeType="withEffect">
+                                  <p:stCondLst>
+                                    <p:cond delay="0"/>
+                                  </p:stCondLst>
+                                  <p:childTnLst>
+                                    <p:set>
+                                      <p:cBhvr>
+                                        <p:cTn id="10" dur="1" fill="hold">
+                                          <p:stCondLst>
+                                            <p:cond delay="0"/>
+                                          </p:stCondLst>
+                                        </p:cTn>
+                                        <p:tgtEl>
+                                          <p:spTgt spid="3">
+                                            <p:txEl>
+                                              <p:pRg st="4" end="4"/>
+                                            </p:txEl>
+                                          </p:spTgt>
+                                        </p:tgtEl>
+                                        <p:attrNameLst>
+                                          <p:attrName>style.visibility</p:attrName>
+                                        </p:attrNameLst>
+                                      </p:cBhvr>
+                                      <p:to>
+                                        <p:strVal val="visible"/>
+                                      </p:to>
+                                    </p:set>
+                                    <p:anim calcmode="lin" valueType="num">
+                                      <p:cBhvr additive="base">
+                                        <p:cTn id="11" dur="500" fill="hold"/>
+                                        <p:tgtEl>
+                                          <p:spTgt spid="3">
+                                            <p:txEl>
+                                              <p:pRg st="4" end="4"/>
+                                            </p:txEl>
+                                          </p:spTgt>
+                                        </p:tgtEl>
+                                        <p:attrNameLst>
+                                          <p:attrName>ppt_x</p:attrName>
+                                        </p:attrNameLst>
+                                      </p:cBhvr>
+                                      <p:tavLst>
+                                        <p:tav tm="0">
+                                          <p:val>
+                                            <p:strVal val="0-#ppt_w/2"/>
+                                          </p:val>
+                                        </p:tav>
+                                        <p:tav tm="100000">
+                                          <p:val>
+                                            <p:strVal val="#ppt_x"/>
+                                          </p:val>
+                                        </p:tav>
+                                      </p:tavLst>
+                                    </p:anim>
+                                    <p:anim calcmode="lin" valueType="num">
+                                      <p:cBhvr additive="base">
+                                        <p:cTn id="12" dur="500" fill="hold"/>
+                                        <p:tgtEl>
+                                          <p:spTgt spid="3">
+                                            <p:txEl>
+                                              <p:pRg st="4" end="4"/>
+                                            </p:txEl>
+                                          </p:spTgt>
+                                        </p:tgtEl>
+                                        <p:attrNameLst>
+                                          <p:attrName>ppt_y</p:attrName>
+                                        </p:attrNameLst>
+                                      </p:cBhvr>
+                                      <p:tavLst>
+                                        <p:tav tm="0">
+                                          <p:val>
+                                            <p:strVal val="#ppt_y"/>
+                                          </p:val>
+                                        </p:tav>
+                                        <p:tav tm="100000">
+                                          <p:val>
+                                            <p:strVal val="#ppt_y"/>
+                                          </p:val>
+                                        </p:tav>
+                                      </p:tavLst>
+                                    </p:anim>
+                                  </p:childTnLst>
+                                </p:cTn>
+                              </p:par>
+                              <p:par>
+                                <p:cTn id="13" presetID="2" presetClass="entr" presetSubtype="8" fill="hold" nodeType="withEffect">
+                                  <p:stCondLst>
+                                    <p:cond delay="0"/>
+                                  </p:stCondLst>
+                                  <p:childTnLst>
+                                    <p:set>
+                                      <p:cBhvr>
+                                        <p:cTn id="14" dur="1" fill="hold">
+                                          <p:stCondLst>
+                                            <p:cond delay="0"/>
+                                          </p:stCondLst>
+                                        </p:cTn>
+                                        <p:tgtEl>
+                                          <p:spTgt spid="3">
+                                            <p:txEl>
+                                              <p:pRg st="6" end="6"/>
+                                            </p:txEl>
+                                          </p:spTgt>
+                                        </p:tgtEl>
+                                        <p:attrNameLst>
+                                          <p:attrName>style.visibility</p:attrName>
+                                        </p:attrNameLst>
+                                      </p:cBhvr>
+                                      <p:to>
+                                        <p:strVal val="visible"/>
+                                      </p:to>
+                                    </p:set>
+                                    <p:anim calcmode="lin" valueType="num">
+                                      <p:cBhvr additive="base">
+                                        <p:cTn id="15" dur="500" fill="hold"/>
+                                        <p:tgtEl>
+                                          <p:spTgt spid="3">
+                                            <p:txEl>
+                                              <p:pRg st="6" end="6"/>
+                                            </p:txEl>
+                                          </p:spTgt>
+                                        </p:tgtEl>
+                                        <p:attrNameLst>
+                                          <p:attrName>ppt_x</p:attrName>
+                                        </p:attrNameLst>
+                                      </p:cBhvr>
+                                      <p:tavLst>
+                                        <p:tav tm="0">
+                                          <p:val>
+                                            <p:strVal val="0-#ppt_w/2"/>
+                                          </p:val>
+                                        </p:tav>
+                                        <p:tav tm="100000">
+                                          <p:val>
+                                            <p:strVal val="#ppt_x"/>
+                                          </p:val>
+                                        </p:tav>
+                                      </p:tavLst>
+                                    </p:anim>
+                                    <p:anim calcmode="lin" valueType="num">
+                                      <p:cBhvr additive="base">
+                                        <p:cTn id="16" dur="500" fill="hold"/>
+                                        <p:tgtEl>
+                                          <p:spTgt spid="3">
+                                            <p:txEl>
+                                              <p:pRg st="6" end="6"/>
+                                            </p:txEl>
+                                          </p:spTgt>
+                                        </p:tgtEl>
+                                        <p:attrNameLst>
+                                          <p:attrName>ppt_y</p:attrName>
+                                        </p:attrNameLst>
+                                      </p:cBhvr>
+                                      <p:tavLst>
+                                        <p:tav tm="0">
+                                          <p:val>
+                                            <p:strVal val="#ppt_y"/>
+                                          </p:val>
+                                        </p:tav>
+                                        <p:tav tm="100000">
+                                          <p:val>
+                                            <p:strVal val="#ppt_y"/>
+                                          </p:val>
+                                        </p:tav>
+                                      </p:tavLst>
+                                    </p:anim>
+                                  </p:childTnLst>
+                                </p:cTn>
+                              </p:par>
+                              <p:par>
+                                <p:cTn id="17" presetID="2" presetClass="entr" presetSubtype="8" fill="hold" nodeType="withEffect">
+                                  <p:stCondLst>
+                                    <p:cond delay="0"/>
+                                  </p:stCondLst>
+                                  <p:childTnLst>
+                                    <p:set>
+                                      <p:cBhvr>
+                                        <p:cTn id="18" dur="1" fill="hold">
+                                          <p:stCondLst>
+                                            <p:cond delay="0"/>
+                                          </p:stCondLst>
+                                        </p:cTn>
+                                        <p:tgtEl>
+                                          <p:spTgt spid="3">
+                                            <p:txEl>
+                                              <p:pRg st="7" end="7"/>
+                                            </p:txEl>
+                                          </p:spTgt>
+                                        </p:tgtEl>
+                                        <p:attrNameLst>
+                                          <p:attrName>style.visibility</p:attrName>
+                                        </p:attrNameLst>
+                                      </p:cBhvr>
+                                      <p:to>
+                                        <p:strVal val="visible"/>
+                                      </p:to>
+                                    </p:set>
+                                    <p:anim calcmode="lin" valueType="num">
+                                      <p:cBhvr additive="base">
+                                        <p:cTn id="19" dur="500" fill="hold"/>
+                                        <p:tgtEl>
+                                          <p:spTgt spid="3">
+                                            <p:txEl>
+                                              <p:pRg st="7" end="7"/>
+                                            </p:txEl>
+                                          </p:spTgt>
+                                        </p:tgtEl>
+                                        <p:attrNameLst>
+                                          <p:attrName>ppt_x</p:attrName>
+                                        </p:attrNameLst>
+                                      </p:cBhvr>
+                                      <p:tavLst>
+                                        <p:tav tm="0">
+                                          <p:val>
+                                            <p:strVal val="0-#ppt_w/2"/>
+                                          </p:val>
+                                        </p:tav>
+                                        <p:tav tm="100000">
+                                          <p:val>
+                                            <p:strVal val="#ppt_x"/>
+                                          </p:val>
+                                        </p:tav>
+                                      </p:tavLst>
+                                    </p:anim>
+                                    <p:anim calcmode="lin" valueType="num">
+                                      <p:cBhvr additive="base">
+                                        <p:cTn id="20" dur="500" fill="hold"/>
+                                        <p:tgtEl>
+                                          <p:spTgt spid="3">
+                                            <p:txEl>
+                                              <p:pRg st="7" end="7"/>
+                                            </p:txEl>
+                                          </p:spTgt>
+                                        </p:tgtEl>
+                                        <p:attrNameLst>
+                                          <p:attrName>ppt_y</p:attrName>
+                                        </p:attrNameLst>
+                                      </p:cBhvr>
+                                      <p:tavLst>
+                                        <p:tav tm="0">
+                                          <p:val>
+                                            <p:strVal val="#ppt_y"/>
+                                          </p:val>
+                                        </p:tav>
+                                        <p:tav tm="100000">
+                                          <p:val>
+                                            <p:strVal val="#ppt_y"/>
+                                          </p:val>
+                                        </p:tav>
+                                      </p:tavLst>
+                                    </p:anim>
+                                  </p:childTnLst>
+                                </p:cTn>
+                              </p:par>
+                            </p:childTnLst>
+                          </p:cTn>
+                        </p:par>
+                      </p:childTnLst>
+                    </p:cTn>
+                  </p:par>
+                </p:childTnLst>
+              </p:cTn>
+              <p:prevCondLst>
+                <p:cond evt="onPrev" delay="0">
+                  <p:tgtEl>
+                    <p:sldTgt/>
+                  </p:tgtEl>
+                </p:cond>
+              </p:prevCondLst>
+              <p:nextCondLst>
+                <p:cond evt="onNext" delay="0">
+                  <p:tgtEl>
+                    <p:sldTgt/>
+                  </p:tgtEl>
+                </p:cond>
+              </p:nextCondLst>
+            </p:seq>
+          </p:childTnLst>
+        </p:cTn>
       </p:par>
     </p:tnLst>
   </p:timing>
@@ -6224,7 +6593,7 @@
     </p:spTree>
     <p:extLst>
       <p:ext uri="{BB962C8B-B14F-4D97-AF65-F5344CB8AC3E}">
-        <p14:creationId xmlns="" xmlns:p14="http://schemas.microsoft.com/office/powerpoint/2010/main" val="2190666559"/>
+        <p14:creationId xmlns:p14="http://schemas.microsoft.com/office/powerpoint/2010/main" xmlns="" val="2190666559"/>
       </p:ext>
     </p:extLst>
   </p:cSld>
@@ -6325,7 +6694,7 @@
     </p:spTree>
     <p:extLst>
       <p:ext uri="{BB962C8B-B14F-4D97-AF65-F5344CB8AC3E}">
-        <p14:creationId xmlns="" xmlns:p14="http://schemas.microsoft.com/office/powerpoint/2010/main" val="311778715"/>
+        <p14:creationId xmlns:p14="http://schemas.microsoft.com/office/powerpoint/2010/main" xmlns="" val="311778715"/>
       </p:ext>
     </p:extLst>
   </p:cSld>
@@ -6603,17 +6972,23 @@
             <p:ph idx="1"/>
           </p:nvPr>
         </p:nvSpPr>
-        <p:spPr/>
+        <p:spPr>
+          <a:xfrm>
+            <a:off x="539189" y="2074730"/>
+            <a:ext cx="8185711" cy="3999499"/>
+          </a:xfrm>
+        </p:spPr>
         <p:txBody>
           <a:bodyPr>
-            <a:normAutofit fontScale="85000" lnSpcReduction="20000"/>
+            <a:normAutofit fontScale="70000" lnSpcReduction="20000"/>
           </a:bodyPr>
           <a:lstStyle/>
           <a:p>
             <a:r>
-              <a:rPr lang="en-US" dirty="0" smtClean="0"/>
-              <a:t>Concurrency!</a:t>
-            </a:r>
+              <a:rPr lang="en-US" b="1" dirty="0" smtClean="0"/>
+              <a:t>Concurrency</a:t>
+            </a:r>
+            <a:endParaRPr lang="en-US" b="1" dirty="0" smtClean="0"/>
           </a:p>
           <a:p>
             <a:pPr lvl="1"/>
@@ -6624,9 +6999,10 @@
           </a:p>
           <a:p>
             <a:r>
-              <a:rPr lang="en-US" dirty="0" smtClean="0"/>
-              <a:t>Conciseness!</a:t>
-            </a:r>
+              <a:rPr lang="en-US" b="1" dirty="0" smtClean="0"/>
+              <a:t>Conciseness</a:t>
+            </a:r>
+            <a:endParaRPr lang="en-US" b="1" dirty="0" smtClean="0"/>
           </a:p>
           <a:p>
             <a:pPr lvl="1"/>
@@ -6637,9 +7013,10 @@
           </a:p>
           <a:p>
             <a:r>
-              <a:rPr lang="en-US" dirty="0" smtClean="0"/>
-              <a:t>Correctness!</a:t>
-            </a:r>
+              <a:rPr lang="en-US" b="1" dirty="0" smtClean="0"/>
+              <a:t>Correctness</a:t>
+            </a:r>
+            <a:endParaRPr lang="en-US" b="1" dirty="0" smtClean="0"/>
           </a:p>
           <a:p>
             <a:pPr lvl="1"/>
@@ -6650,15 +7027,37 @@
           </a:p>
           <a:p>
             <a:r>
+              <a:rPr lang="en-US" b="1" dirty="0" smtClean="0"/>
+              <a:t>It’s </a:t>
+            </a:r>
+            <a:r>
+              <a:rPr lang="en-US" b="1" dirty="0" smtClean="0"/>
+              <a:t>Different</a:t>
+            </a:r>
+            <a:endParaRPr lang="en-US" b="1" dirty="0" smtClean="0"/>
+          </a:p>
+          <a:p>
+            <a:pPr lvl="1"/>
+            <a:r>
               <a:rPr lang="en-US" dirty="0" smtClean="0"/>
-              <a:t>It’s Different!</a:t>
+              <a:t>If you are like me, you’ll like the fact that programming with FP is very different.  You have to approach things very differently.  This stretches your mind and helps you to approach your craft from a fresh angle</a:t>
+            </a:r>
+            <a:r>
+              <a:rPr lang="en-US" dirty="0" smtClean="0"/>
+              <a:t>.</a:t>
+            </a:r>
+          </a:p>
+          <a:p>
+            <a:r>
+              <a:rPr lang="en-US" b="1" dirty="0" smtClean="0"/>
+              <a:t>It’s Fun!</a:t>
             </a:r>
           </a:p>
           <a:p>
             <a:pPr lvl="1"/>
             <a:r>
               <a:rPr lang="en-US" dirty="0" smtClean="0"/>
-              <a:t>If you are like me, you’ll like the fact that programming with FP is very different.  You have to approach things very differently.  This stretches your mind and helps you to approach your craft from a fresh angle.</a:t>
+              <a:t>I haven’t had this much fun playing with code in a long time.</a:t>
             </a:r>
             <a:endParaRPr lang="en-US" dirty="0"/>
           </a:p>
@@ -6693,7 +7092,7 @@
     </p:spTree>
     <p:extLst>
       <p:ext uri="{BB962C8B-B14F-4D97-AF65-F5344CB8AC3E}">
-        <p14:creationId xmlns="" xmlns:p14="http://schemas.microsoft.com/office/powerpoint/2010/main" val="67570856"/>
+        <p14:creationId xmlns:p14="http://schemas.microsoft.com/office/powerpoint/2010/main" xmlns="" val="67570856"/>
       </p:ext>
     </p:extLst>
   </p:cSld>
@@ -6762,7 +7161,7 @@
           <a:blip r:embed="rId2" cstate="print">
             <a:extLst>
               <a:ext uri="{28A0092B-C50C-407E-A947-70E740481C1C}">
-                <a14:useLocalDpi xmlns="" xmlns:a14="http://schemas.microsoft.com/office/drawing/2010/main" val="0"/>
+                <a14:useLocalDpi xmlns:a14="http://schemas.microsoft.com/office/drawing/2010/main" xmlns="" val="0"/>
               </a:ext>
             </a:extLst>
           </a:blip>
@@ -6792,7 +7191,7 @@
           <a:blip r:embed="rId3" cstate="print">
             <a:extLst>
               <a:ext uri="{28A0092B-C50C-407E-A947-70E740481C1C}">
-                <a14:useLocalDpi xmlns="" xmlns:a14="http://schemas.microsoft.com/office/drawing/2010/main" val="0"/>
+                <a14:useLocalDpi xmlns:a14="http://schemas.microsoft.com/office/drawing/2010/main" xmlns="" val="0"/>
               </a:ext>
             </a:extLst>
           </a:blip>
@@ -6822,7 +7221,7 @@
           <a:blip r:embed="rId4" cstate="print">
             <a:extLst>
               <a:ext uri="{28A0092B-C50C-407E-A947-70E740481C1C}">
-                <a14:useLocalDpi xmlns="" xmlns:a14="http://schemas.microsoft.com/office/drawing/2010/main" val="0"/>
+                <a14:useLocalDpi xmlns:a14="http://schemas.microsoft.com/office/drawing/2010/main" xmlns="" val="0"/>
               </a:ext>
             </a:extLst>
           </a:blip>
@@ -6852,7 +7251,7 @@
           <a:blip r:embed="rId5" cstate="print">
             <a:extLst>
               <a:ext uri="{28A0092B-C50C-407E-A947-70E740481C1C}">
-                <a14:useLocalDpi xmlns="" xmlns:a14="http://schemas.microsoft.com/office/drawing/2010/main" val="0"/>
+                <a14:useLocalDpi xmlns:a14="http://schemas.microsoft.com/office/drawing/2010/main" xmlns="" val="0"/>
               </a:ext>
             </a:extLst>
           </a:blip>
@@ -6882,7 +7281,7 @@
           <a:blip r:embed="rId6" cstate="print">
             <a:extLst>
               <a:ext uri="{28A0092B-C50C-407E-A947-70E740481C1C}">
-                <a14:useLocalDpi xmlns="" xmlns:a14="http://schemas.microsoft.com/office/drawing/2010/main" val="0"/>
+                <a14:useLocalDpi xmlns:a14="http://schemas.microsoft.com/office/drawing/2010/main" xmlns="" val="0"/>
               </a:ext>
             </a:extLst>
           </a:blip>
@@ -7004,7 +7403,7 @@
     </p:spTree>
     <p:extLst>
       <p:ext uri="{BB962C8B-B14F-4D97-AF65-F5344CB8AC3E}">
-        <p14:creationId xmlns="" xmlns:p14="http://schemas.microsoft.com/office/powerpoint/2010/main" val="3380746537"/>
+        <p14:creationId xmlns:p14="http://schemas.microsoft.com/office/powerpoint/2010/main" xmlns="" val="3380746537"/>
       </p:ext>
     </p:extLst>
   </p:cSld>
@@ -7184,7 +7583,7 @@
     </p:spTree>
     <p:extLst>
       <p:ext uri="{BB962C8B-B14F-4D97-AF65-F5344CB8AC3E}">
-        <p14:creationId xmlns="" xmlns:p14="http://schemas.microsoft.com/office/powerpoint/2010/main" val="3380746537"/>
+        <p14:creationId xmlns:p14="http://schemas.microsoft.com/office/powerpoint/2010/main" xmlns="" val="3380746537"/>
       </p:ext>
     </p:extLst>
   </p:cSld>
@@ -7299,7 +7698,7 @@
     </p:spTree>
     <p:extLst>
       <p:ext uri="{BB962C8B-B14F-4D97-AF65-F5344CB8AC3E}">
-        <p14:creationId xmlns="" xmlns:p14="http://schemas.microsoft.com/office/powerpoint/2010/main" val="1963701257"/>
+        <p14:creationId xmlns:p14="http://schemas.microsoft.com/office/powerpoint/2010/main" xmlns="" val="1963701257"/>
       </p:ext>
     </p:extLst>
   </p:cSld>

</xml_diff>

<commit_message>
Expanded some examples, also updated the slide deck
</commit_message>
<xml_diff>
--- a/fnprogfun1.pptx
+++ b/fnprogfun1.pptx
@@ -14,8 +14,10 @@
     <p:sldId id="259" r:id="rId8"/>
     <p:sldId id="269" r:id="rId9"/>
     <p:sldId id="260" r:id="rId10"/>
-    <p:sldId id="263" r:id="rId11"/>
-    <p:sldId id="267" r:id="rId12"/>
+    <p:sldId id="270" r:id="rId11"/>
+    <p:sldId id="263" r:id="rId12"/>
+    <p:sldId id="271" r:id="rId13"/>
+    <p:sldId id="267" r:id="rId14"/>
   </p:sldIdLst>
   <p:sldSz cx="9144000" cy="6858000" type="screen4x3"/>
   <p:notesSz cx="6858000" cy="9144000"/>
@@ -2457,7 +2459,7 @@
           <a:blip r:embed="rId3" cstate="print">
             <a:extLst>
               <a:ext uri="{28A0092B-C50C-407E-A947-70E740481C1C}">
-                <a14:useLocalDpi xmlns:a14="http://schemas.microsoft.com/office/drawing/2010/main" xmlns="" val="0"/>
+                <a14:useLocalDpi xmlns="" xmlns:a14="http://schemas.microsoft.com/office/drawing/2010/main" val="0"/>
               </a:ext>
             </a:extLst>
           </a:blip>
@@ -5307,7 +5309,7 @@
           <a:blip r:embed="rId2" cstate="print">
             <a:extLst>
               <a:ext uri="{28A0092B-C50C-407E-A947-70E740481C1C}">
-                <a14:useLocalDpi xmlns:a14="http://schemas.microsoft.com/office/drawing/2010/main" xmlns="" val="0"/>
+                <a14:useLocalDpi xmlns="" xmlns:a14="http://schemas.microsoft.com/office/drawing/2010/main" val="0"/>
               </a:ext>
             </a:extLst>
           </a:blip>
@@ -5328,7 +5330,7 @@
     </p:spTree>
     <p:extLst>
       <p:ext uri="{BB962C8B-B14F-4D97-AF65-F5344CB8AC3E}">
-        <p14:creationId xmlns:p14="http://schemas.microsoft.com/office/powerpoint/2010/main" xmlns="" val="1873691422"/>
+        <p14:creationId xmlns="" xmlns:p14="http://schemas.microsoft.com/office/powerpoint/2010/main" val="1873691422"/>
       </p:ext>
     </p:extLst>
   </p:cSld>
@@ -5379,7 +5381,7 @@
           <a:p>
             <a:r>
               <a:rPr lang="en-US" dirty="0" smtClean="0"/>
-              <a:t>Want to try Haskell?</a:t>
+              <a:t>Interesting facts about Haskell</a:t>
             </a:r>
             <a:endParaRPr lang="en-US" dirty="0"/>
           </a:p>
@@ -5398,245 +5400,46 @@
         <p:spPr/>
         <p:txBody>
           <a:bodyPr>
-            <a:normAutofit fontScale="92500" lnSpcReduction="20000"/>
+            <a:normAutofit/>
           </a:bodyPr>
           <a:lstStyle/>
           <a:p>
             <a:r>
               <a:rPr lang="en-US" dirty="0" smtClean="0"/>
-              <a:t>Free eBooks!</a:t>
-            </a:r>
-          </a:p>
-          <a:p>
-            <a:pPr lvl="1"/>
+              <a:t>Haskell is statically typed, but because its type inference is so powerful you almost never have to type the types!</a:t>
+            </a:r>
+          </a:p>
+          <a:p>
             <a:r>
               <a:rPr lang="en-US" dirty="0" smtClean="0"/>
-              <a:t>Learn you a Haskell for Great Good!</a:t>
-            </a:r>
-          </a:p>
-          <a:p>
-            <a:pPr lvl="2"/>
-            <a:r>
-              <a:rPr lang="en-US" dirty="0">
-                <a:solidFill>
-                  <a:srgbClr val="FF0000"/>
-                </a:solidFill>
-                <a:hlinkClick r:id="rId2"/>
-              </a:rPr>
-              <a:t>http://learnyouahaskell.com/</a:t>
-            </a:r>
-            <a:r>
-              <a:rPr lang="en-US" dirty="0" smtClean="0">
-                <a:solidFill>
-                  <a:srgbClr val="FF0000"/>
-                </a:solidFill>
-                <a:hlinkClick r:id="rId2"/>
-              </a:rPr>
-              <a:t>chapters</a:t>
-            </a:r>
-            <a:endParaRPr lang="en-US" dirty="0" smtClean="0">
-              <a:solidFill>
-                <a:srgbClr val="FF0000"/>
-              </a:solidFill>
-            </a:endParaRPr>
-          </a:p>
-          <a:p>
-            <a:pPr lvl="1"/>
+              <a:t>Haskell has lazy evaluation which is really neat (e.g. give me the first 10 elements of an infinite list)</a:t>
+            </a:r>
+          </a:p>
+          <a:p>
             <a:r>
               <a:rPr lang="en-US" dirty="0" smtClean="0"/>
-              <a:t>Real World Haskell</a:t>
-            </a:r>
-          </a:p>
-          <a:p>
-            <a:pPr lvl="2"/>
-            <a:r>
-              <a:rPr lang="en-US" dirty="0">
-                <a:hlinkClick r:id="rId3"/>
-              </a:rPr>
-              <a:t>http://book.realworldhaskell.org/read</a:t>
-            </a:r>
-            <a:r>
-              <a:rPr lang="en-US" dirty="0" smtClean="0">
-                <a:hlinkClick r:id="rId3"/>
-              </a:rPr>
-              <a:t>/</a:t>
-            </a:r>
+              <a:t>Haskell is pretty fast.  Close to Java, certainly faster than dynamic languages like Python or Ruby.  It compiles to machine code like C or C++.  The compiler is seeing a lot of improvements lately as interest grows.</a:t>
+            </a:r>
+          </a:p>
+          <a:p>
+            <a:r>
+              <a:rPr lang="en-US" dirty="0" smtClean="0"/>
+              <a:t>Haskell also has a REPL that allows you to play with the language easily and try new things.</a:t>
+            </a:r>
+          </a:p>
+          <a:p>
             <a:endParaRPr lang="en-US" dirty="0" smtClean="0"/>
           </a:p>
           <a:p>
-            <a:pPr lvl="1"/>
-            <a:r>
-              <a:rPr lang="en-US" dirty="0" smtClean="0"/>
-              <a:t>Get Haskell Platform easily for your machine</a:t>
-            </a:r>
-          </a:p>
-          <a:p>
-            <a:pPr lvl="1"/>
-            <a:r>
-              <a:rPr lang="en-US" dirty="0" smtClean="0"/>
-              <a:t>Linux:</a:t>
-            </a:r>
-          </a:p>
-          <a:p>
-            <a:pPr lvl="2"/>
-            <a:r>
-              <a:rPr lang="en-US" sz="1600" dirty="0" smtClean="0">
-                <a:latin typeface="Consolas"/>
-                <a:cs typeface="Consolas"/>
-              </a:rPr>
-              <a:t>$ </a:t>
-            </a:r>
-            <a:r>
-              <a:rPr lang="en-US" sz="1600" dirty="0" err="1" smtClean="0">
-                <a:latin typeface="Consolas"/>
-                <a:cs typeface="Consolas"/>
-              </a:rPr>
-              <a:t>sudo</a:t>
-            </a:r>
-            <a:r>
-              <a:rPr lang="en-US" sz="1600" dirty="0" smtClean="0">
-                <a:latin typeface="Consolas"/>
-                <a:cs typeface="Consolas"/>
-              </a:rPr>
-              <a:t> apt-get install </a:t>
-            </a:r>
-            <a:r>
-              <a:rPr lang="en-US" sz="1600" dirty="0" err="1" smtClean="0">
-                <a:latin typeface="Consolas"/>
-                <a:cs typeface="Consolas"/>
-              </a:rPr>
-              <a:t>haskell</a:t>
-            </a:r>
-            <a:r>
-              <a:rPr lang="en-US" sz="1600" dirty="0" smtClean="0">
-                <a:latin typeface="Consolas"/>
-                <a:cs typeface="Consolas"/>
-              </a:rPr>
-              <a:t>-platform</a:t>
-            </a:r>
-          </a:p>
-          <a:p>
-            <a:pPr lvl="2"/>
-            <a:r>
-              <a:rPr lang="en-US" sz="1600" dirty="0" smtClean="0">
-                <a:latin typeface="Consolas"/>
-                <a:cs typeface="Consolas"/>
-              </a:rPr>
-              <a:t>$ </a:t>
-            </a:r>
-            <a:r>
-              <a:rPr lang="en-US" sz="1600" dirty="0" err="1" smtClean="0">
-                <a:latin typeface="Consolas"/>
-                <a:cs typeface="Consolas"/>
-              </a:rPr>
-              <a:t>sudo</a:t>
-            </a:r>
-            <a:r>
-              <a:rPr lang="en-US" sz="1600" dirty="0" smtClean="0">
-                <a:latin typeface="Consolas"/>
-                <a:cs typeface="Consolas"/>
-              </a:rPr>
-              <a:t> yum install </a:t>
-            </a:r>
-            <a:r>
-              <a:rPr lang="en-US" sz="1600" dirty="0" err="1" smtClean="0">
-                <a:latin typeface="Consolas"/>
-                <a:cs typeface="Consolas"/>
-              </a:rPr>
-              <a:t>haskell</a:t>
-            </a:r>
-            <a:r>
-              <a:rPr lang="en-US" sz="1600" dirty="0" smtClean="0">
-                <a:latin typeface="Consolas"/>
-                <a:cs typeface="Consolas"/>
-              </a:rPr>
-              <a:t>-platform</a:t>
-            </a:r>
-          </a:p>
-          <a:p>
-            <a:pPr lvl="1"/>
-            <a:r>
-              <a:rPr lang="en-US" dirty="0" smtClean="0"/>
-              <a:t>Windows or Mac:</a:t>
-            </a:r>
-          </a:p>
-          <a:p>
-            <a:pPr lvl="2"/>
-            <a:r>
-              <a:rPr lang="en-US" dirty="0" smtClean="0"/>
-              <a:t>Get </a:t>
-            </a:r>
-            <a:r>
-              <a:rPr lang="en-US" dirty="0"/>
-              <a:t>the platform here: </a:t>
-            </a:r>
-            <a:r>
-              <a:rPr lang="en-US" dirty="0">
-                <a:hlinkClick r:id="rId4"/>
-              </a:rPr>
-              <a:t>http://www.haskell.org/platform</a:t>
-            </a:r>
-            <a:r>
-              <a:rPr lang="en-US" dirty="0" smtClean="0">
-                <a:hlinkClick r:id="rId4"/>
-              </a:rPr>
-              <a:t>/</a:t>
-            </a:r>
-            <a:endParaRPr lang="en-US" dirty="0" smtClean="0"/>
-          </a:p>
-          <a:p>
-            <a:pPr lvl="1"/>
-            <a:r>
-              <a:rPr lang="en-US" dirty="0" smtClean="0"/>
-              <a:t>Cool video introduction: </a:t>
-            </a:r>
-          </a:p>
-          <a:p>
-            <a:pPr lvl="2"/>
-            <a:r>
-              <a:rPr lang="en-US" dirty="0">
-                <a:hlinkClick r:id="rId5"/>
-              </a:rPr>
-              <a:t>http://www.youtube.com/watch?v=</a:t>
-            </a:r>
-            <a:r>
-              <a:rPr lang="en-US" dirty="0" smtClean="0">
-                <a:hlinkClick r:id="rId5"/>
-              </a:rPr>
-              <a:t>b9FagOVqxmI</a:t>
-            </a:r>
-            <a:endParaRPr lang="en-US" dirty="0" smtClean="0"/>
-          </a:p>
-          <a:p>
-            <a:pPr lvl="1"/>
             <a:endParaRPr lang="en-US" dirty="0"/>
           </a:p>
-          <a:p>
-            <a:pPr lvl="1"/>
-            <a:endParaRPr lang="en-US" dirty="0" smtClean="0"/>
-          </a:p>
-          <a:p>
-            <a:endParaRPr lang="en-US" dirty="0"/>
-          </a:p>
         </p:txBody>
       </p:sp>
     </p:spTree>
-    <p:extLst>
-      <p:ext uri="{BB962C8B-B14F-4D97-AF65-F5344CB8AC3E}">
-        <p14:creationId xmlns:p14="http://schemas.microsoft.com/office/powerpoint/2010/main" xmlns="" val="2526408885"/>
-      </p:ext>
-    </p:extLst>
   </p:cSld>
   <p:clrMapOvr>
     <a:masterClrMapping/>
   </p:clrMapOvr>
-  <p:timing>
-    <p:tnLst>
-      <p:par>
-        <p:cTn id="1" dur="indefinite" restart="never" nodeType="tmRoot"/>
-      </p:par>
-    </p:tnLst>
-  </p:timing>
 </p:sld>
 </file>
 
@@ -5674,6 +5477,486 @@
           <a:p>
             <a:r>
               <a:rPr lang="en-US" dirty="0" smtClean="0"/>
+              <a:t>Want to try Haskell?</a:t>
+            </a:r>
+            <a:endParaRPr lang="en-US" dirty="0"/>
+          </a:p>
+        </p:txBody>
+      </p:sp>
+      <p:sp>
+        <p:nvSpPr>
+          <p:cNvPr id="3" name="Content Placeholder 2"/>
+          <p:cNvSpPr>
+            <a:spLocks noGrp="1"/>
+          </p:cNvSpPr>
+          <p:nvPr>
+            <p:ph idx="1"/>
+          </p:nvPr>
+        </p:nvSpPr>
+        <p:spPr/>
+        <p:txBody>
+          <a:bodyPr>
+            <a:normAutofit/>
+          </a:bodyPr>
+          <a:lstStyle/>
+          <a:p>
+            <a:r>
+              <a:rPr lang="en-US" dirty="0" smtClean="0"/>
+              <a:t>Free eBooks!</a:t>
+            </a:r>
+          </a:p>
+          <a:p>
+            <a:pPr lvl="1"/>
+            <a:r>
+              <a:rPr lang="en-US" dirty="0" smtClean="0"/>
+              <a:t>Learn you a Haskell for Great Good!</a:t>
+            </a:r>
+          </a:p>
+          <a:p>
+            <a:pPr lvl="2"/>
+            <a:r>
+              <a:rPr lang="en-US" dirty="0">
+                <a:solidFill>
+                  <a:srgbClr val="FF0000"/>
+                </a:solidFill>
+                <a:hlinkClick r:id="rId2"/>
+              </a:rPr>
+              <a:t>http://learnyouahaskell.com/</a:t>
+            </a:r>
+            <a:r>
+              <a:rPr lang="en-US" dirty="0" smtClean="0">
+                <a:solidFill>
+                  <a:srgbClr val="FF0000"/>
+                </a:solidFill>
+                <a:hlinkClick r:id="rId2"/>
+              </a:rPr>
+              <a:t>chapters</a:t>
+            </a:r>
+            <a:endParaRPr lang="en-US" dirty="0" smtClean="0">
+              <a:solidFill>
+                <a:srgbClr val="FF0000"/>
+              </a:solidFill>
+            </a:endParaRPr>
+          </a:p>
+          <a:p>
+            <a:pPr lvl="1"/>
+            <a:r>
+              <a:rPr lang="en-US" dirty="0" smtClean="0"/>
+              <a:t>Real World Haskell</a:t>
+            </a:r>
+          </a:p>
+          <a:p>
+            <a:pPr lvl="2"/>
+            <a:r>
+              <a:rPr lang="en-US" dirty="0">
+                <a:hlinkClick r:id="rId3"/>
+              </a:rPr>
+              <a:t>http://book.realworldhaskell.org/read</a:t>
+            </a:r>
+            <a:r>
+              <a:rPr lang="en-US" dirty="0" smtClean="0">
+                <a:hlinkClick r:id="rId3"/>
+              </a:rPr>
+              <a:t>/</a:t>
+            </a:r>
+            <a:endParaRPr lang="en-US" dirty="0" smtClean="0"/>
+          </a:p>
+          <a:p>
+            <a:r>
+              <a:rPr lang="en-US" dirty="0" smtClean="0"/>
+              <a:t>Cool video introduction (Google Tech Talk): </a:t>
+            </a:r>
+          </a:p>
+          <a:p>
+            <a:pPr lvl="2"/>
+            <a:r>
+              <a:rPr lang="en-US" dirty="0" smtClean="0">
+                <a:hlinkClick r:id="rId4"/>
+              </a:rPr>
+              <a:t>http</a:t>
+            </a:r>
+            <a:r>
+              <a:rPr lang="en-US" dirty="0">
+                <a:hlinkClick r:id="rId4"/>
+              </a:rPr>
+              <a:t>://</a:t>
+            </a:r>
+            <a:r>
+              <a:rPr lang="en-US" dirty="0" smtClean="0">
+                <a:hlinkClick r:id="rId4"/>
+              </a:rPr>
+              <a:t>www.youtube.com/watch?v=b9FagOVqxmI</a:t>
+            </a:r>
+            <a:endParaRPr lang="en-US" dirty="0" smtClean="0"/>
+          </a:p>
+        </p:txBody>
+      </p:sp>
+      <p:pic>
+        <p:nvPicPr>
+          <p:cNvPr id="5" name="Picture 4" descr="lrg.jpg"/>
+          <p:cNvPicPr>
+            <a:picLocks noChangeAspect="1"/>
+          </p:cNvPicPr>
+          <p:nvPr/>
+        </p:nvPicPr>
+        <p:blipFill>
+          <a:blip r:embed="rId5" cstate="print"/>
+          <a:stretch>
+            <a:fillRect/>
+          </a:stretch>
+        </p:blipFill>
+        <p:spPr>
+          <a:xfrm>
+            <a:off x="6749687" y="2729702"/>
+            <a:ext cx="1524000" cy="1999488"/>
+          </a:xfrm>
+          <a:prstGeom prst="rect">
+            <a:avLst/>
+          </a:prstGeom>
+          <a:ln w="6350">
+            <a:solidFill>
+              <a:schemeClr val="tx1"/>
+            </a:solidFill>
+          </a:ln>
+        </p:spPr>
+      </p:pic>
+      <p:pic>
+        <p:nvPicPr>
+          <p:cNvPr id="6" name="Picture 5" descr="lyah.png"/>
+          <p:cNvPicPr>
+            <a:picLocks noChangeAspect="1"/>
+          </p:cNvPicPr>
+          <p:nvPr/>
+        </p:nvPicPr>
+        <p:blipFill>
+          <a:blip r:embed="rId6" cstate="print"/>
+          <a:stretch>
+            <a:fillRect/>
+          </a:stretch>
+        </p:blipFill>
+        <p:spPr>
+          <a:xfrm>
+            <a:off x="6749687" y="393677"/>
+            <a:ext cx="1524000" cy="2011881"/>
+          </a:xfrm>
+          <a:prstGeom prst="rect">
+            <a:avLst/>
+          </a:prstGeom>
+          <a:ln w="6350">
+            <a:solidFill>
+              <a:schemeClr val="tx1"/>
+            </a:solidFill>
+          </a:ln>
+        </p:spPr>
+      </p:pic>
+    </p:spTree>
+    <p:extLst>
+      <p:ext uri="{BB962C8B-B14F-4D97-AF65-F5344CB8AC3E}">
+        <p14:creationId xmlns="" xmlns:p14="http://schemas.microsoft.com/office/powerpoint/2010/main" val="2526408885"/>
+      </p:ext>
+    </p:extLst>
+  </p:cSld>
+  <p:clrMapOvr>
+    <a:masterClrMapping/>
+  </p:clrMapOvr>
+  <p:timing>
+    <p:tnLst>
+      <p:par>
+        <p:cTn id="1" dur="indefinite" restart="never" nodeType="tmRoot"/>
+      </p:par>
+    </p:tnLst>
+  </p:timing>
+</p:sld>
+</file>
+
+<file path=ppt/slides/slide12.xml><?xml version="1.0" encoding="utf-8"?>
+<p:sld xmlns:a="http://schemas.openxmlformats.org/drawingml/2006/main" xmlns:r="http://schemas.openxmlformats.org/officeDocument/2006/relationships" xmlns:p="http://schemas.openxmlformats.org/presentationml/2006/main">
+  <p:cSld>
+    <p:spTree>
+      <p:nvGrpSpPr>
+        <p:cNvPr id="1" name=""/>
+        <p:cNvGrpSpPr/>
+        <p:nvPr/>
+      </p:nvGrpSpPr>
+      <p:grpSpPr>
+        <a:xfrm>
+          <a:off x="0" y="0"/>
+          <a:ext cx="0" cy="0"/>
+          <a:chOff x="0" y="0"/>
+          <a:chExt cx="0" cy="0"/>
+        </a:xfrm>
+      </p:grpSpPr>
+      <p:sp>
+        <p:nvSpPr>
+          <p:cNvPr id="2" name="Title 1"/>
+          <p:cNvSpPr>
+            <a:spLocks noGrp="1"/>
+          </p:cNvSpPr>
+          <p:nvPr>
+            <p:ph type="title"/>
+          </p:nvPr>
+        </p:nvSpPr>
+        <p:spPr/>
+        <p:txBody>
+          <a:bodyPr/>
+          <a:lstStyle/>
+          <a:p>
+            <a:r>
+              <a:rPr lang="en-US" dirty="0" smtClean="0"/>
+              <a:t>Want to try Haskell?</a:t>
+            </a:r>
+            <a:endParaRPr lang="en-US" dirty="0"/>
+          </a:p>
+        </p:txBody>
+      </p:sp>
+      <p:sp>
+        <p:nvSpPr>
+          <p:cNvPr id="3" name="Content Placeholder 2"/>
+          <p:cNvSpPr>
+            <a:spLocks noGrp="1"/>
+          </p:cNvSpPr>
+          <p:nvPr>
+            <p:ph idx="1"/>
+          </p:nvPr>
+        </p:nvSpPr>
+        <p:spPr/>
+        <p:txBody>
+          <a:bodyPr>
+            <a:normAutofit/>
+          </a:bodyPr>
+          <a:lstStyle/>
+          <a:p>
+            <a:r>
+              <a:rPr lang="en-US" dirty="0" smtClean="0"/>
+              <a:t>Get Haskell Platform easily for your machine</a:t>
+            </a:r>
+          </a:p>
+          <a:p>
+            <a:pPr lvl="2"/>
+            <a:r>
+              <a:rPr lang="en-US" dirty="0" smtClean="0"/>
+              <a:t>Linux (Fedora or </a:t>
+            </a:r>
+            <a:r>
+              <a:rPr lang="en-US" dirty="0" err="1" smtClean="0"/>
+              <a:t>Ubuntu</a:t>
+            </a:r>
+            <a:r>
+              <a:rPr lang="en-US" dirty="0" smtClean="0"/>
+              <a:t>):</a:t>
+            </a:r>
+            <a:endParaRPr lang="en-US" dirty="0" smtClean="0"/>
+          </a:p>
+          <a:p>
+            <a:pPr lvl="3"/>
+            <a:r>
+              <a:rPr lang="en-US" sz="1600" dirty="0" smtClean="0">
+                <a:latin typeface="Consolas"/>
+                <a:cs typeface="Consolas"/>
+              </a:rPr>
+              <a:t>$ </a:t>
+            </a:r>
+            <a:r>
+              <a:rPr lang="en-US" sz="1600" dirty="0" err="1" smtClean="0">
+                <a:latin typeface="Consolas"/>
+                <a:cs typeface="Consolas"/>
+              </a:rPr>
+              <a:t>sudo</a:t>
+            </a:r>
+            <a:r>
+              <a:rPr lang="en-US" sz="1600" dirty="0" smtClean="0">
+                <a:latin typeface="Consolas"/>
+                <a:cs typeface="Consolas"/>
+              </a:rPr>
+              <a:t> apt-get install </a:t>
+            </a:r>
+            <a:r>
+              <a:rPr lang="en-US" sz="1600" dirty="0" err="1" smtClean="0">
+                <a:latin typeface="Consolas"/>
+                <a:cs typeface="Consolas"/>
+              </a:rPr>
+              <a:t>haskell</a:t>
+            </a:r>
+            <a:r>
+              <a:rPr lang="en-US" sz="1600" dirty="0" smtClean="0">
+                <a:latin typeface="Consolas"/>
+                <a:cs typeface="Consolas"/>
+              </a:rPr>
+              <a:t>-platform</a:t>
+            </a:r>
+          </a:p>
+          <a:p>
+            <a:pPr lvl="3"/>
+            <a:r>
+              <a:rPr lang="en-US" sz="1600" dirty="0" smtClean="0">
+                <a:latin typeface="Consolas"/>
+                <a:cs typeface="Consolas"/>
+              </a:rPr>
+              <a:t>$ </a:t>
+            </a:r>
+            <a:r>
+              <a:rPr lang="en-US" sz="1600" dirty="0" err="1" smtClean="0">
+                <a:latin typeface="Consolas"/>
+                <a:cs typeface="Consolas"/>
+              </a:rPr>
+              <a:t>sudo</a:t>
+            </a:r>
+            <a:r>
+              <a:rPr lang="en-US" sz="1600" dirty="0" smtClean="0">
+                <a:latin typeface="Consolas"/>
+                <a:cs typeface="Consolas"/>
+              </a:rPr>
+              <a:t> yum install </a:t>
+            </a:r>
+            <a:r>
+              <a:rPr lang="en-US" sz="1600" dirty="0" err="1" smtClean="0">
+                <a:latin typeface="Consolas"/>
+                <a:cs typeface="Consolas"/>
+              </a:rPr>
+              <a:t>haskell</a:t>
+            </a:r>
+            <a:r>
+              <a:rPr lang="en-US" sz="1600" dirty="0" smtClean="0">
+                <a:latin typeface="Consolas"/>
+                <a:cs typeface="Consolas"/>
+              </a:rPr>
+              <a:t>-platform</a:t>
+            </a:r>
+          </a:p>
+          <a:p>
+            <a:pPr lvl="2"/>
+            <a:r>
+              <a:rPr lang="en-US" dirty="0" smtClean="0"/>
+              <a:t>Windows or </a:t>
+            </a:r>
+            <a:r>
+              <a:rPr lang="en-US" dirty="0" smtClean="0"/>
+              <a:t>Mac (or Linux):</a:t>
+            </a:r>
+            <a:endParaRPr lang="en-US" dirty="0" smtClean="0"/>
+          </a:p>
+          <a:p>
+            <a:pPr lvl="3"/>
+            <a:r>
+              <a:rPr lang="en-US" dirty="0" smtClean="0"/>
+              <a:t>Get the platform here: </a:t>
+            </a:r>
+            <a:r>
+              <a:rPr lang="en-US" dirty="0" smtClean="0">
+                <a:hlinkClick r:id="rId2"/>
+              </a:rPr>
+              <a:t>http://www.haskell.org/platform</a:t>
+            </a:r>
+            <a:r>
+              <a:rPr lang="en-US" dirty="0" smtClean="0">
+                <a:hlinkClick r:id="rId2"/>
+              </a:rPr>
+              <a:t>/</a:t>
+            </a:r>
+            <a:endParaRPr lang="en-US" dirty="0" smtClean="0"/>
+          </a:p>
+          <a:p>
+            <a:r>
+              <a:rPr lang="en-US" dirty="0" smtClean="0"/>
+              <a:t>Yes, there is an Eclipse plug-in:</a:t>
+            </a:r>
+          </a:p>
+          <a:p>
+            <a:pPr lvl="2"/>
+            <a:r>
+              <a:rPr lang="en-US" dirty="0" smtClean="0">
+                <a:hlinkClick r:id="rId3"/>
+              </a:rPr>
+              <a:t>http://eclipsefp.github.com</a:t>
+            </a:r>
+            <a:r>
+              <a:rPr lang="en-US" dirty="0" smtClean="0">
+                <a:hlinkClick r:id="rId3"/>
+              </a:rPr>
+              <a:t>/</a:t>
+            </a:r>
+            <a:endParaRPr lang="en-US" dirty="0" smtClean="0"/>
+          </a:p>
+        </p:txBody>
+      </p:sp>
+      <p:pic>
+        <p:nvPicPr>
+          <p:cNvPr id="7" name="Picture 6" descr="download-summer.png"/>
+          <p:cNvPicPr>
+            <a:picLocks noChangeAspect="1"/>
+          </p:cNvPicPr>
+          <p:nvPr/>
+        </p:nvPicPr>
+        <p:blipFill>
+          <a:blip r:embed="rId4" cstate="print"/>
+          <a:stretch>
+            <a:fillRect/>
+          </a:stretch>
+        </p:blipFill>
+        <p:spPr>
+          <a:xfrm>
+            <a:off x="6650170" y="0"/>
+            <a:ext cx="2074730" cy="2074730"/>
+          </a:xfrm>
+          <a:prstGeom prst="rect">
+            <a:avLst/>
+          </a:prstGeom>
+        </p:spPr>
+      </p:pic>
+    </p:spTree>
+    <p:extLst>
+      <p:ext uri="{BB962C8B-B14F-4D97-AF65-F5344CB8AC3E}">
+        <p14:creationId xmlns="" xmlns:p14="http://schemas.microsoft.com/office/powerpoint/2010/main" val="2526408885"/>
+      </p:ext>
+    </p:extLst>
+  </p:cSld>
+  <p:clrMapOvr>
+    <a:masterClrMapping/>
+  </p:clrMapOvr>
+  <p:timing>
+    <p:tnLst>
+      <p:par>
+        <p:cTn id="1" dur="indefinite" restart="never" nodeType="tmRoot"/>
+      </p:par>
+    </p:tnLst>
+  </p:timing>
+</p:sld>
+</file>
+
+<file path=ppt/slides/slide13.xml><?xml version="1.0" encoding="utf-8"?>
+<p:sld xmlns:a="http://schemas.openxmlformats.org/drawingml/2006/main" xmlns:r="http://schemas.openxmlformats.org/officeDocument/2006/relationships" xmlns:p="http://schemas.openxmlformats.org/presentationml/2006/main">
+  <p:cSld>
+    <p:spTree>
+      <p:nvGrpSpPr>
+        <p:cNvPr id="1" name=""/>
+        <p:cNvGrpSpPr/>
+        <p:nvPr/>
+      </p:nvGrpSpPr>
+      <p:grpSpPr>
+        <a:xfrm>
+          <a:off x="0" y="0"/>
+          <a:ext cx="0" cy="0"/>
+          <a:chOff x="0" y="0"/>
+          <a:chExt cx="0" cy="0"/>
+        </a:xfrm>
+      </p:grpSpPr>
+      <p:sp>
+        <p:nvSpPr>
+          <p:cNvPr id="2" name="Title 1"/>
+          <p:cNvSpPr>
+            <a:spLocks noGrp="1"/>
+          </p:cNvSpPr>
+          <p:nvPr>
+            <p:ph type="title"/>
+          </p:nvPr>
+        </p:nvSpPr>
+        <p:spPr/>
+        <p:txBody>
+          <a:bodyPr/>
+          <a:lstStyle/>
+          <a:p>
+            <a:r>
+              <a:rPr lang="en-US" dirty="0" smtClean="0"/>
               <a:t>Questions?</a:t>
             </a:r>
             <a:endParaRPr lang="en-US" dirty="0"/>
@@ -5721,7 +6004,30 @@
           <a:p>
             <a:r>
               <a:rPr lang="en-US" dirty="0" smtClean="0"/>
-              <a:t>Thanks for coming.  We hope to see you again next month!</a:t>
+              <a:t>New distribution list for Outlook called </a:t>
+            </a:r>
+            <a:r>
+              <a:rPr lang="en-US" i="1" dirty="0" smtClean="0">
+                <a:solidFill>
+                  <a:srgbClr val="002060"/>
+                </a:solidFill>
+              </a:rPr>
+              <a:t>Shaw Functional Programmers </a:t>
+            </a:r>
+            <a:r>
+              <a:rPr lang="en-US" dirty="0" smtClean="0"/>
+              <a:t>is coming.  We will be able to post information relating to the sessions there.</a:t>
+            </a:r>
+            <a:endParaRPr lang="en-US" dirty="0" smtClean="0"/>
+          </a:p>
+          <a:p>
+            <a:r>
+              <a:rPr lang="en-US" dirty="0" smtClean="0"/>
+              <a:t>Thanks </a:t>
+            </a:r>
+            <a:r>
+              <a:rPr lang="en-US" dirty="0" smtClean="0"/>
+              <a:t>for coming.  We hope to see you again next month!</a:t>
             </a:r>
             <a:endParaRPr lang="en-US" dirty="0"/>
           </a:p>
@@ -5756,7 +6062,7 @@
     </p:spTree>
     <p:extLst>
       <p:ext uri="{BB962C8B-B14F-4D97-AF65-F5344CB8AC3E}">
-        <p14:creationId xmlns:p14="http://schemas.microsoft.com/office/powerpoint/2010/main" xmlns="" val="1090242725"/>
+        <p14:creationId xmlns="" xmlns:p14="http://schemas.microsoft.com/office/powerpoint/2010/main" val="1090242725"/>
       </p:ext>
     </p:extLst>
   </p:cSld>
@@ -5865,7 +6171,7 @@
     </p:spTree>
     <p:extLst>
       <p:ext uri="{BB962C8B-B14F-4D97-AF65-F5344CB8AC3E}">
-        <p14:creationId xmlns:p14="http://schemas.microsoft.com/office/powerpoint/2010/main" xmlns="" val="3206459144"/>
+        <p14:creationId xmlns="" xmlns:p14="http://schemas.microsoft.com/office/powerpoint/2010/main" val="3206459144"/>
       </p:ext>
     </p:extLst>
   </p:cSld>
@@ -6043,7 +6349,7 @@
           <a:blip r:embed="rId2" cstate="print">
             <a:extLst>
               <a:ext uri="{28A0092B-C50C-407E-A947-70E740481C1C}">
-                <a14:useLocalDpi xmlns:a14="http://schemas.microsoft.com/office/drawing/2010/main" xmlns="" val="0"/>
+                <a14:useLocalDpi xmlns="" xmlns:a14="http://schemas.microsoft.com/office/drawing/2010/main" val="0"/>
               </a:ext>
             </a:extLst>
           </a:blip>
@@ -6064,7 +6370,7 @@
     </p:spTree>
     <p:extLst>
       <p:ext uri="{BB962C8B-B14F-4D97-AF65-F5344CB8AC3E}">
-        <p14:creationId xmlns:p14="http://schemas.microsoft.com/office/powerpoint/2010/main" xmlns="" val="885906404"/>
+        <p14:creationId xmlns="" xmlns:p14="http://schemas.microsoft.com/office/powerpoint/2010/main" val="885906404"/>
       </p:ext>
     </p:extLst>
   </p:cSld>
@@ -6593,7 +6899,7 @@
     </p:spTree>
     <p:extLst>
       <p:ext uri="{BB962C8B-B14F-4D97-AF65-F5344CB8AC3E}">
-        <p14:creationId xmlns:p14="http://schemas.microsoft.com/office/powerpoint/2010/main" xmlns="" val="2190666559"/>
+        <p14:creationId xmlns="" xmlns:p14="http://schemas.microsoft.com/office/powerpoint/2010/main" val="2190666559"/>
       </p:ext>
     </p:extLst>
   </p:cSld>
@@ -6694,7 +7000,7 @@
     </p:spTree>
     <p:extLst>
       <p:ext uri="{BB962C8B-B14F-4D97-AF65-F5344CB8AC3E}">
-        <p14:creationId xmlns:p14="http://schemas.microsoft.com/office/powerpoint/2010/main" xmlns="" val="311778715"/>
+        <p14:creationId xmlns="" xmlns:p14="http://schemas.microsoft.com/office/powerpoint/2010/main" val="311778715"/>
       </p:ext>
     </p:extLst>
   </p:cSld>
@@ -6988,7 +7294,6 @@
               <a:rPr lang="en-US" b="1" dirty="0" smtClean="0"/>
               <a:t>Concurrency</a:t>
             </a:r>
-            <a:endParaRPr lang="en-US" b="1" dirty="0" smtClean="0"/>
           </a:p>
           <a:p>
             <a:pPr lvl="1"/>
@@ -7002,7 +7307,6 @@
               <a:rPr lang="en-US" b="1" dirty="0" smtClean="0"/>
               <a:t>Conciseness</a:t>
             </a:r>
-            <a:endParaRPr lang="en-US" b="1" dirty="0" smtClean="0"/>
           </a:p>
           <a:p>
             <a:pPr lvl="1"/>
@@ -7016,7 +7320,6 @@
               <a:rPr lang="en-US" b="1" dirty="0" smtClean="0"/>
               <a:t>Correctness</a:t>
             </a:r>
-            <a:endParaRPr lang="en-US" b="1" dirty="0" smtClean="0"/>
           </a:p>
           <a:p>
             <a:pPr lvl="1"/>
@@ -7028,23 +7331,14 @@
           <a:p>
             <a:r>
               <a:rPr lang="en-US" b="1" dirty="0" smtClean="0"/>
-              <a:t>It’s </a:t>
-            </a:r>
-            <a:r>
-              <a:rPr lang="en-US" b="1" dirty="0" smtClean="0"/>
-              <a:t>Different</a:t>
-            </a:r>
-            <a:endParaRPr lang="en-US" b="1" dirty="0" smtClean="0"/>
+              <a:t>It’s Different</a:t>
+            </a:r>
           </a:p>
           <a:p>
             <a:pPr lvl="1"/>
             <a:r>
               <a:rPr lang="en-US" dirty="0" smtClean="0"/>
-              <a:t>If you are like me, you’ll like the fact that programming with FP is very different.  You have to approach things very differently.  This stretches your mind and helps you to approach your craft from a fresh angle</a:t>
-            </a:r>
-            <a:r>
-              <a:rPr lang="en-US" dirty="0" smtClean="0"/>
-              <a:t>.</a:t>
+              <a:t>If you are like me, you’ll like the fact that programming with FP is very different.  You have to approach things very differently.  This stretches your mind and helps you to approach your craft from a fresh angle.</a:t>
             </a:r>
           </a:p>
           <a:p>
@@ -7092,7 +7386,7 @@
     </p:spTree>
     <p:extLst>
       <p:ext uri="{BB962C8B-B14F-4D97-AF65-F5344CB8AC3E}">
-        <p14:creationId xmlns:p14="http://schemas.microsoft.com/office/powerpoint/2010/main" xmlns="" val="67570856"/>
+        <p14:creationId xmlns="" xmlns:p14="http://schemas.microsoft.com/office/powerpoint/2010/main" val="67570856"/>
       </p:ext>
     </p:extLst>
   </p:cSld>
@@ -7161,7 +7455,7 @@
           <a:blip r:embed="rId2" cstate="print">
             <a:extLst>
               <a:ext uri="{28A0092B-C50C-407E-A947-70E740481C1C}">
-                <a14:useLocalDpi xmlns:a14="http://schemas.microsoft.com/office/drawing/2010/main" xmlns="" val="0"/>
+                <a14:useLocalDpi xmlns="" xmlns:a14="http://schemas.microsoft.com/office/drawing/2010/main" val="0"/>
               </a:ext>
             </a:extLst>
           </a:blip>
@@ -7191,7 +7485,7 @@
           <a:blip r:embed="rId3" cstate="print">
             <a:extLst>
               <a:ext uri="{28A0092B-C50C-407E-A947-70E740481C1C}">
-                <a14:useLocalDpi xmlns:a14="http://schemas.microsoft.com/office/drawing/2010/main" xmlns="" val="0"/>
+                <a14:useLocalDpi xmlns="" xmlns:a14="http://schemas.microsoft.com/office/drawing/2010/main" val="0"/>
               </a:ext>
             </a:extLst>
           </a:blip>
@@ -7221,7 +7515,7 @@
           <a:blip r:embed="rId4" cstate="print">
             <a:extLst>
               <a:ext uri="{28A0092B-C50C-407E-A947-70E740481C1C}">
-                <a14:useLocalDpi xmlns:a14="http://schemas.microsoft.com/office/drawing/2010/main" xmlns="" val="0"/>
+                <a14:useLocalDpi xmlns="" xmlns:a14="http://schemas.microsoft.com/office/drawing/2010/main" val="0"/>
               </a:ext>
             </a:extLst>
           </a:blip>
@@ -7251,7 +7545,7 @@
           <a:blip r:embed="rId5" cstate="print">
             <a:extLst>
               <a:ext uri="{28A0092B-C50C-407E-A947-70E740481C1C}">
-                <a14:useLocalDpi xmlns:a14="http://schemas.microsoft.com/office/drawing/2010/main" xmlns="" val="0"/>
+                <a14:useLocalDpi xmlns="" xmlns:a14="http://schemas.microsoft.com/office/drawing/2010/main" val="0"/>
               </a:ext>
             </a:extLst>
           </a:blip>
@@ -7281,7 +7575,7 @@
           <a:blip r:embed="rId6" cstate="print">
             <a:extLst>
               <a:ext uri="{28A0092B-C50C-407E-A947-70E740481C1C}">
-                <a14:useLocalDpi xmlns:a14="http://schemas.microsoft.com/office/drawing/2010/main" xmlns="" val="0"/>
+                <a14:useLocalDpi xmlns="" xmlns:a14="http://schemas.microsoft.com/office/drawing/2010/main" val="0"/>
               </a:ext>
             </a:extLst>
           </a:blip>
@@ -7403,7 +7697,7 @@
     </p:spTree>
     <p:extLst>
       <p:ext uri="{BB962C8B-B14F-4D97-AF65-F5344CB8AC3E}">
-        <p14:creationId xmlns:p14="http://schemas.microsoft.com/office/powerpoint/2010/main" xmlns="" val="3380746537"/>
+        <p14:creationId xmlns="" xmlns:p14="http://schemas.microsoft.com/office/powerpoint/2010/main" val="3380746537"/>
       </p:ext>
     </p:extLst>
   </p:cSld>
@@ -7583,7 +7877,7 @@
     </p:spTree>
     <p:extLst>
       <p:ext uri="{BB962C8B-B14F-4D97-AF65-F5344CB8AC3E}">
-        <p14:creationId xmlns:p14="http://schemas.microsoft.com/office/powerpoint/2010/main" xmlns="" val="3380746537"/>
+        <p14:creationId xmlns="" xmlns:p14="http://schemas.microsoft.com/office/powerpoint/2010/main" val="3380746537"/>
       </p:ext>
     </p:extLst>
   </p:cSld>
@@ -7634,7 +7928,11 @@
           <a:p>
             <a:r>
               <a:rPr lang="en-US" dirty="0" smtClean="0"/>
-              <a:t>Quick Overview of FP</a:t>
+              <a:t>Quick Overview of </a:t>
+            </a:r>
+            <a:r>
+              <a:rPr lang="en-US" dirty="0" smtClean="0"/>
+              <a:t>FP Using Haskell</a:t>
             </a:r>
             <a:endParaRPr lang="en-US" dirty="0"/>
           </a:p>
@@ -7685,6 +7983,10 @@
             </a:r>
           </a:p>
           <a:p>
+            <a:r>
+              <a:rPr lang="en-US" dirty="0" smtClean="0"/>
+              <a:t>Working with immutable lists.</a:t>
+            </a:r>
             <a:endParaRPr lang="en-US" dirty="0" smtClean="0"/>
           </a:p>
           <a:p>
@@ -7698,7 +8000,7 @@
     </p:spTree>
     <p:extLst>
       <p:ext uri="{BB962C8B-B14F-4D97-AF65-F5344CB8AC3E}">
-        <p14:creationId xmlns:p14="http://schemas.microsoft.com/office/powerpoint/2010/main" xmlns="" val="1963701257"/>
+        <p14:creationId xmlns="" xmlns:p14="http://schemas.microsoft.com/office/powerpoint/2010/main" val="1963701257"/>
       </p:ext>
     </p:extLst>
   </p:cSld>
@@ -8228,6 +8530,109 @@
                       </p:childTnLst>
                     </p:cTn>
                   </p:par>
+                  <p:par>
+                    <p:cTn id="33" fill="hold">
+                      <p:stCondLst>
+                        <p:cond delay="indefinite"/>
+                      </p:stCondLst>
+                      <p:childTnLst>
+                        <p:par>
+                          <p:cTn id="34" fill="hold">
+                            <p:stCondLst>
+                              <p:cond delay="0"/>
+                            </p:stCondLst>
+                            <p:childTnLst>
+                              <p:par>
+                                <p:cTn id="35" presetID="2" presetClass="entr" presetSubtype="4" fill="hold" grpId="0" nodeType="clickEffect">
+                                  <p:stCondLst>
+                                    <p:cond delay="0"/>
+                                  </p:stCondLst>
+                                  <p:childTnLst>
+                                    <p:set>
+                                      <p:cBhvr>
+                                        <p:cTn id="36" dur="1" fill="hold">
+                                          <p:stCondLst>
+                                            <p:cond delay="0"/>
+                                          </p:stCondLst>
+                                        </p:cTn>
+                                        <p:tgtEl>
+                                          <p:spTgt spid="3">
+                                            <p:txEl>
+                                              <p:pRg st="5" end="5"/>
+                                            </p:txEl>
+                                          </p:spTgt>
+                                        </p:tgtEl>
+                                        <p:attrNameLst>
+                                          <p:attrName>style.visibility</p:attrName>
+                                        </p:attrNameLst>
+                                      </p:cBhvr>
+                                      <p:to>
+                                        <p:strVal val="visible"/>
+                                      </p:to>
+                                    </p:set>
+                                    <p:anim calcmode="lin" valueType="num">
+                                      <p:cBhvr additive="base">
+                                        <p:cTn id="37" dur="500" fill="hold"/>
+                                        <p:tgtEl>
+                                          <p:spTgt spid="3">
+                                            <p:txEl>
+                                              <p:pRg st="5" end="5"/>
+                                            </p:txEl>
+                                          </p:spTgt>
+                                        </p:tgtEl>
+                                        <p:attrNameLst>
+                                          <p:attrName>ppt_x</p:attrName>
+                                        </p:attrNameLst>
+                                      </p:cBhvr>
+                                      <p:tavLst>
+                                        <p:tav tm="0">
+                                          <p:val>
+                                            <p:strVal val="#ppt_x"/>
+                                          </p:val>
+                                        </p:tav>
+                                        <p:tav tm="100000">
+                                          <p:val>
+                                            <p:strVal val="#ppt_x"/>
+                                          </p:val>
+                                        </p:tav>
+                                      </p:tavLst>
+                                    </p:anim>
+                                    <p:anim calcmode="lin" valueType="num">
+                                      <p:cBhvr additive="base">
+                                        <p:cTn id="38" dur="500" fill="hold"/>
+                                        <p:tgtEl>
+                                          <p:spTgt spid="3">
+                                            <p:txEl>
+                                              <p:pRg st="5" end="5"/>
+                                            </p:txEl>
+                                          </p:spTgt>
+                                        </p:tgtEl>
+                                        <p:attrNameLst>
+                                          <p:attrName>ppt_y</p:attrName>
+                                        </p:attrNameLst>
+                                      </p:cBhvr>
+                                      <p:tavLst>
+                                        <p:tav tm="0">
+                                          <p:val>
+                                            <p:strVal val="1+#ppt_h/2"/>
+                                          </p:val>
+                                        </p:tav>
+                                        <p:tav tm="100000">
+                                          <p:val>
+                                            <p:strVal val="#ppt_y"/>
+                                          </p:val>
+                                        </p:tav>
+                                      </p:tavLst>
+                                    </p:anim>
+                                  </p:childTnLst>
+                                </p:cTn>
+                              </p:par>
+                            </p:childTnLst>
+                          </p:cTn>
+                        </p:par>
+                      </p:childTnLst>
+                    </p:cTn>
+                  </p:par>
                 </p:childTnLst>
               </p:cTn>
               <p:prevCondLst>

</xml_diff>

<commit_message>
Fixed a bug in Immutability.hs and updated the slide deck
</commit_message>
<xml_diff>
--- a/fnprogfun1.pptx
+++ b/fnprogfun1.pptx
@@ -4,20 +4,22 @@
   <p:sldMasterIdLst>
     <p:sldMasterId id="2147483660" r:id="rId1"/>
   </p:sldMasterIdLst>
+  <p:notesMasterIdLst>
+    <p:notesMasterId r:id="rId14"/>
+  </p:notesMasterIdLst>
   <p:sldIdLst>
     <p:sldId id="256" r:id="rId2"/>
     <p:sldId id="257" r:id="rId3"/>
-    <p:sldId id="265" r:id="rId4"/>
-    <p:sldId id="266" r:id="rId5"/>
-    <p:sldId id="258" r:id="rId6"/>
-    <p:sldId id="268" r:id="rId7"/>
-    <p:sldId id="259" r:id="rId8"/>
-    <p:sldId id="269" r:id="rId9"/>
-    <p:sldId id="260" r:id="rId10"/>
-    <p:sldId id="270" r:id="rId11"/>
-    <p:sldId id="263" r:id="rId12"/>
-    <p:sldId id="271" r:id="rId13"/>
-    <p:sldId id="267" r:id="rId14"/>
+    <p:sldId id="258" r:id="rId4"/>
+    <p:sldId id="268" r:id="rId5"/>
+    <p:sldId id="259" r:id="rId6"/>
+    <p:sldId id="269" r:id="rId7"/>
+    <p:sldId id="260" r:id="rId8"/>
+    <p:sldId id="270" r:id="rId9"/>
+    <p:sldId id="263" r:id="rId10"/>
+    <p:sldId id="271" r:id="rId11"/>
+    <p:sldId id="266" r:id="rId12"/>
+    <p:sldId id="267" r:id="rId13"/>
   </p:sldIdLst>
   <p:sldSz cx="9144000" cy="6858000" type="screen4x3"/>
   <p:notesSz cx="6858000" cy="9144000"/>
@@ -119,6 +121,440 @@
 </p:presentation>
 </file>
 
+<file path=ppt/notesMasters/notesMaster1.xml><?xml version="1.0" encoding="utf-8"?>
+<p:notesMaster xmlns:a="http://schemas.openxmlformats.org/drawingml/2006/main" xmlns:r="http://schemas.openxmlformats.org/officeDocument/2006/relationships" xmlns:p="http://schemas.openxmlformats.org/presentationml/2006/main">
+  <p:cSld>
+    <p:bg>
+      <p:bgRef idx="1001">
+        <a:schemeClr val="bg1"/>
+      </p:bgRef>
+    </p:bg>
+    <p:spTree>
+      <p:nvGrpSpPr>
+        <p:cNvPr id="1" name=""/>
+        <p:cNvGrpSpPr/>
+        <p:nvPr/>
+      </p:nvGrpSpPr>
+      <p:grpSpPr>
+        <a:xfrm>
+          <a:off x="0" y="0"/>
+          <a:ext cx="0" cy="0"/>
+          <a:chOff x="0" y="0"/>
+          <a:chExt cx="0" cy="0"/>
+        </a:xfrm>
+      </p:grpSpPr>
+      <p:sp>
+        <p:nvSpPr>
+          <p:cNvPr id="2" name="Header Placeholder 1"/>
+          <p:cNvSpPr>
+            <a:spLocks noGrp="1"/>
+          </p:cNvSpPr>
+          <p:nvPr>
+            <p:ph type="hdr" sz="quarter"/>
+          </p:nvPr>
+        </p:nvSpPr>
+        <p:spPr>
+          <a:xfrm>
+            <a:off x="0" y="0"/>
+            <a:ext cx="2971800" cy="457200"/>
+          </a:xfrm>
+          <a:prstGeom prst="rect">
+            <a:avLst/>
+          </a:prstGeom>
+        </p:spPr>
+        <p:txBody>
+          <a:bodyPr vert="horz" lIns="91440" tIns="45720" rIns="91440" bIns="45720" rtlCol="0"/>
+          <a:lstStyle>
+            <a:lvl1pPr algn="l">
+              <a:defRPr sz="1200"/>
+            </a:lvl1pPr>
+          </a:lstStyle>
+          <a:p>
+            <a:endParaRPr lang="en-US"/>
+          </a:p>
+        </p:txBody>
+      </p:sp>
+      <p:sp>
+        <p:nvSpPr>
+          <p:cNvPr id="3" name="Date Placeholder 2"/>
+          <p:cNvSpPr>
+            <a:spLocks noGrp="1"/>
+          </p:cNvSpPr>
+          <p:nvPr>
+            <p:ph type="dt" idx="1"/>
+          </p:nvPr>
+        </p:nvSpPr>
+        <p:spPr>
+          <a:xfrm>
+            <a:off x="3884613" y="0"/>
+            <a:ext cx="2971800" cy="457200"/>
+          </a:xfrm>
+          <a:prstGeom prst="rect">
+            <a:avLst/>
+          </a:prstGeom>
+        </p:spPr>
+        <p:txBody>
+          <a:bodyPr vert="horz" lIns="91440" tIns="45720" rIns="91440" bIns="45720" rtlCol="0"/>
+          <a:lstStyle>
+            <a:lvl1pPr algn="r">
+              <a:defRPr sz="1200"/>
+            </a:lvl1pPr>
+          </a:lstStyle>
+          <a:p>
+            <a:fld id="{37B2C892-CB1B-0A45-9685-EA6FEE3F6F86}" type="datetimeFigureOut">
+              <a:rPr lang="en-US" smtClean="0"/>
+              <a:t>2012-10-16</a:t>
+            </a:fld>
+            <a:endParaRPr lang="en-US"/>
+          </a:p>
+        </p:txBody>
+      </p:sp>
+      <p:sp>
+        <p:nvSpPr>
+          <p:cNvPr id="4" name="Slide Image Placeholder 3"/>
+          <p:cNvSpPr>
+            <a:spLocks noGrp="1" noRot="1" noChangeAspect="1"/>
+          </p:cNvSpPr>
+          <p:nvPr>
+            <p:ph type="sldImg" idx="2"/>
+          </p:nvPr>
+        </p:nvSpPr>
+        <p:spPr>
+          <a:xfrm>
+            <a:off x="1143000" y="685800"/>
+            <a:ext cx="4572000" cy="3429000"/>
+          </a:xfrm>
+          <a:prstGeom prst="rect">
+            <a:avLst/>
+          </a:prstGeom>
+          <a:noFill/>
+          <a:ln w="12700">
+            <a:solidFill>
+              <a:prstClr val="black"/>
+            </a:solidFill>
+          </a:ln>
+        </p:spPr>
+        <p:txBody>
+          <a:bodyPr vert="horz" lIns="91440" tIns="45720" rIns="91440" bIns="45720" rtlCol="0" anchor="ctr"/>
+          <a:lstStyle/>
+          <a:p>
+            <a:endParaRPr lang="en-US"/>
+          </a:p>
+        </p:txBody>
+      </p:sp>
+      <p:sp>
+        <p:nvSpPr>
+          <p:cNvPr id="5" name="Notes Placeholder 4"/>
+          <p:cNvSpPr>
+            <a:spLocks noGrp="1"/>
+          </p:cNvSpPr>
+          <p:nvPr>
+            <p:ph type="body" sz="quarter" idx="3"/>
+          </p:nvPr>
+        </p:nvSpPr>
+        <p:spPr>
+          <a:xfrm>
+            <a:off x="685800" y="4343400"/>
+            <a:ext cx="5486400" cy="4114800"/>
+          </a:xfrm>
+          <a:prstGeom prst="rect">
+            <a:avLst/>
+          </a:prstGeom>
+        </p:spPr>
+        <p:txBody>
+          <a:bodyPr vert="horz" lIns="91440" tIns="45720" rIns="91440" bIns="45720" rtlCol="0"/>
+          <a:lstStyle/>
+          <a:p>
+            <a:pPr lvl="0"/>
+            <a:r>
+              <a:rPr lang="en-US" smtClean="0"/>
+              <a:t>Click to edit Master text styles</a:t>
+            </a:r>
+          </a:p>
+          <a:p>
+            <a:pPr lvl="1"/>
+            <a:r>
+              <a:rPr lang="en-US" smtClean="0"/>
+              <a:t>Second level</a:t>
+            </a:r>
+          </a:p>
+          <a:p>
+            <a:pPr lvl="2"/>
+            <a:r>
+              <a:rPr lang="en-US" smtClean="0"/>
+              <a:t>Third level</a:t>
+            </a:r>
+          </a:p>
+          <a:p>
+            <a:pPr lvl="3"/>
+            <a:r>
+              <a:rPr lang="en-US" smtClean="0"/>
+              <a:t>Fourth level</a:t>
+            </a:r>
+          </a:p>
+          <a:p>
+            <a:pPr lvl="4"/>
+            <a:r>
+              <a:rPr lang="en-US" smtClean="0"/>
+              <a:t>Fifth level</a:t>
+            </a:r>
+            <a:endParaRPr lang="en-US"/>
+          </a:p>
+        </p:txBody>
+      </p:sp>
+      <p:sp>
+        <p:nvSpPr>
+          <p:cNvPr id="6" name="Footer Placeholder 5"/>
+          <p:cNvSpPr>
+            <a:spLocks noGrp="1"/>
+          </p:cNvSpPr>
+          <p:nvPr>
+            <p:ph type="ftr" sz="quarter" idx="4"/>
+          </p:nvPr>
+        </p:nvSpPr>
+        <p:spPr>
+          <a:xfrm>
+            <a:off x="0" y="8685213"/>
+            <a:ext cx="2971800" cy="457200"/>
+          </a:xfrm>
+          <a:prstGeom prst="rect">
+            <a:avLst/>
+          </a:prstGeom>
+        </p:spPr>
+        <p:txBody>
+          <a:bodyPr vert="horz" lIns="91440" tIns="45720" rIns="91440" bIns="45720" rtlCol="0" anchor="b"/>
+          <a:lstStyle>
+            <a:lvl1pPr algn="l">
+              <a:defRPr sz="1200"/>
+            </a:lvl1pPr>
+          </a:lstStyle>
+          <a:p>
+            <a:endParaRPr lang="en-US"/>
+          </a:p>
+        </p:txBody>
+      </p:sp>
+      <p:sp>
+        <p:nvSpPr>
+          <p:cNvPr id="7" name="Slide Number Placeholder 6"/>
+          <p:cNvSpPr>
+            <a:spLocks noGrp="1"/>
+          </p:cNvSpPr>
+          <p:nvPr>
+            <p:ph type="sldNum" sz="quarter" idx="5"/>
+          </p:nvPr>
+        </p:nvSpPr>
+        <p:spPr>
+          <a:xfrm>
+            <a:off x="3884613" y="8685213"/>
+            <a:ext cx="2971800" cy="457200"/>
+          </a:xfrm>
+          <a:prstGeom prst="rect">
+            <a:avLst/>
+          </a:prstGeom>
+        </p:spPr>
+        <p:txBody>
+          <a:bodyPr vert="horz" lIns="91440" tIns="45720" rIns="91440" bIns="45720" rtlCol="0" anchor="b"/>
+          <a:lstStyle>
+            <a:lvl1pPr algn="r">
+              <a:defRPr sz="1200"/>
+            </a:lvl1pPr>
+          </a:lstStyle>
+          <a:p>
+            <a:fld id="{87EA0053-D92F-1C4D-A77E-3BE2A133A7E8}" type="slidenum">
+              <a:rPr lang="en-US" smtClean="0"/>
+              <a:t>‹#›</a:t>
+            </a:fld>
+            <a:endParaRPr lang="en-US"/>
+          </a:p>
+        </p:txBody>
+      </p:sp>
+    </p:spTree>
+    <p:extLst>
+      <p:ext uri="{BB962C8B-B14F-4D97-AF65-F5344CB8AC3E}">
+        <p14:creationId xmlns:p14="http://schemas.microsoft.com/office/powerpoint/2010/main" val="1315931"/>
+      </p:ext>
+    </p:extLst>
+  </p:cSld>
+  <p:clrMap bg1="lt1" tx1="dk1" bg2="lt2" tx2="dk2" accent1="accent1" accent2="accent2" accent3="accent3" accent4="accent4" accent5="accent5" accent6="accent6" hlink="hlink" folHlink="folHlink"/>
+  <p:notesStyle>
+    <a:lvl1pPr marL="0" algn="l" defTabSz="457200" rtl="0" eaLnBrk="1" latinLnBrk="0" hangingPunct="1">
+      <a:defRPr sz="1200" kern="1200">
+        <a:solidFill>
+          <a:schemeClr val="tx1"/>
+        </a:solidFill>
+        <a:latin typeface="+mn-lt"/>
+        <a:ea typeface="+mn-ea"/>
+        <a:cs typeface="+mn-cs"/>
+      </a:defRPr>
+    </a:lvl1pPr>
+    <a:lvl2pPr marL="457200" algn="l" defTabSz="457200" rtl="0" eaLnBrk="1" latinLnBrk="0" hangingPunct="1">
+      <a:defRPr sz="1200" kern="1200">
+        <a:solidFill>
+          <a:schemeClr val="tx1"/>
+        </a:solidFill>
+        <a:latin typeface="+mn-lt"/>
+        <a:ea typeface="+mn-ea"/>
+        <a:cs typeface="+mn-cs"/>
+      </a:defRPr>
+    </a:lvl2pPr>
+    <a:lvl3pPr marL="914400" algn="l" defTabSz="457200" rtl="0" eaLnBrk="1" latinLnBrk="0" hangingPunct="1">
+      <a:defRPr sz="1200" kern="1200">
+        <a:solidFill>
+          <a:schemeClr val="tx1"/>
+        </a:solidFill>
+        <a:latin typeface="+mn-lt"/>
+        <a:ea typeface="+mn-ea"/>
+        <a:cs typeface="+mn-cs"/>
+      </a:defRPr>
+    </a:lvl3pPr>
+    <a:lvl4pPr marL="1371600" algn="l" defTabSz="457200" rtl="0" eaLnBrk="1" latinLnBrk="0" hangingPunct="1">
+      <a:defRPr sz="1200" kern="1200">
+        <a:solidFill>
+          <a:schemeClr val="tx1"/>
+        </a:solidFill>
+        <a:latin typeface="+mn-lt"/>
+        <a:ea typeface="+mn-ea"/>
+        <a:cs typeface="+mn-cs"/>
+      </a:defRPr>
+    </a:lvl4pPr>
+    <a:lvl5pPr marL="1828800" algn="l" defTabSz="457200" rtl="0" eaLnBrk="1" latinLnBrk="0" hangingPunct="1">
+      <a:defRPr sz="1200" kern="1200">
+        <a:solidFill>
+          <a:schemeClr val="tx1"/>
+        </a:solidFill>
+        <a:latin typeface="+mn-lt"/>
+        <a:ea typeface="+mn-ea"/>
+        <a:cs typeface="+mn-cs"/>
+      </a:defRPr>
+    </a:lvl5pPr>
+    <a:lvl6pPr marL="2286000" algn="l" defTabSz="457200" rtl="0" eaLnBrk="1" latinLnBrk="0" hangingPunct="1">
+      <a:defRPr sz="1200" kern="1200">
+        <a:solidFill>
+          <a:schemeClr val="tx1"/>
+        </a:solidFill>
+        <a:latin typeface="+mn-lt"/>
+        <a:ea typeface="+mn-ea"/>
+        <a:cs typeface="+mn-cs"/>
+      </a:defRPr>
+    </a:lvl6pPr>
+    <a:lvl7pPr marL="2743200" algn="l" defTabSz="457200" rtl="0" eaLnBrk="1" latinLnBrk="0" hangingPunct="1">
+      <a:defRPr sz="1200" kern="1200">
+        <a:solidFill>
+          <a:schemeClr val="tx1"/>
+        </a:solidFill>
+        <a:latin typeface="+mn-lt"/>
+        <a:ea typeface="+mn-ea"/>
+        <a:cs typeface="+mn-cs"/>
+      </a:defRPr>
+    </a:lvl7pPr>
+    <a:lvl8pPr marL="3200400" algn="l" defTabSz="457200" rtl="0" eaLnBrk="1" latinLnBrk="0" hangingPunct="1">
+      <a:defRPr sz="1200" kern="1200">
+        <a:solidFill>
+          <a:schemeClr val="tx1"/>
+        </a:solidFill>
+        <a:latin typeface="+mn-lt"/>
+        <a:ea typeface="+mn-ea"/>
+        <a:cs typeface="+mn-cs"/>
+      </a:defRPr>
+    </a:lvl8pPr>
+    <a:lvl9pPr marL="3657600" algn="l" defTabSz="457200" rtl="0" eaLnBrk="1" latinLnBrk="0" hangingPunct="1">
+      <a:defRPr sz="1200" kern="1200">
+        <a:solidFill>
+          <a:schemeClr val="tx1"/>
+        </a:solidFill>
+        <a:latin typeface="+mn-lt"/>
+        <a:ea typeface="+mn-ea"/>
+        <a:cs typeface="+mn-cs"/>
+      </a:defRPr>
+    </a:lvl9pPr>
+  </p:notesStyle>
+</p:notesMaster>
+</file>
+
+<file path=ppt/notesSlides/notesSlide1.xml><?xml version="1.0" encoding="utf-8"?>
+<p:notes xmlns:a="http://schemas.openxmlformats.org/drawingml/2006/main" xmlns:r="http://schemas.openxmlformats.org/officeDocument/2006/relationships" xmlns:p="http://schemas.openxmlformats.org/presentationml/2006/main">
+  <p:cSld>
+    <p:spTree>
+      <p:nvGrpSpPr>
+        <p:cNvPr id="1" name=""/>
+        <p:cNvGrpSpPr/>
+        <p:nvPr/>
+      </p:nvGrpSpPr>
+      <p:grpSpPr>
+        <a:xfrm>
+          <a:off x="0" y="0"/>
+          <a:ext cx="0" cy="0"/>
+          <a:chOff x="0" y="0"/>
+          <a:chExt cx="0" cy="0"/>
+        </a:xfrm>
+      </p:grpSpPr>
+      <p:sp>
+        <p:nvSpPr>
+          <p:cNvPr id="2" name="Slide Image Placeholder 1"/>
+          <p:cNvSpPr>
+            <a:spLocks noGrp="1" noRot="1" noChangeAspect="1"/>
+          </p:cNvSpPr>
+          <p:nvPr>
+            <p:ph type="sldImg"/>
+          </p:nvPr>
+        </p:nvSpPr>
+        <p:spPr/>
+      </p:sp>
+      <p:sp>
+        <p:nvSpPr>
+          <p:cNvPr id="3" name="Notes Placeholder 2"/>
+          <p:cNvSpPr>
+            <a:spLocks noGrp="1"/>
+          </p:cNvSpPr>
+          <p:nvPr>
+            <p:ph type="body" idx="1"/>
+          </p:nvPr>
+        </p:nvSpPr>
+        <p:spPr/>
+        <p:txBody>
+          <a:bodyPr/>
+          <a:lstStyle/>
+          <a:p>
+            <a:endParaRPr lang="en-US" dirty="0"/>
+          </a:p>
+        </p:txBody>
+      </p:sp>
+      <p:sp>
+        <p:nvSpPr>
+          <p:cNvPr id="4" name="Slide Number Placeholder 3"/>
+          <p:cNvSpPr>
+            <a:spLocks noGrp="1"/>
+          </p:cNvSpPr>
+          <p:nvPr>
+            <p:ph type="sldNum" sz="quarter" idx="10"/>
+          </p:nvPr>
+        </p:nvSpPr>
+        <p:spPr/>
+        <p:txBody>
+          <a:bodyPr/>
+          <a:lstStyle/>
+          <a:p>
+            <a:fld id="{87EA0053-D92F-1C4D-A77E-3BE2A133A7E8}" type="slidenum">
+              <a:rPr lang="en-US" smtClean="0"/>
+              <a:t>7</a:t>
+            </a:fld>
+            <a:endParaRPr lang="en-US"/>
+          </a:p>
+        </p:txBody>
+      </p:sp>
+    </p:spTree>
+    <p:extLst>
+      <p:ext uri="{BB962C8B-B14F-4D97-AF65-F5344CB8AC3E}">
+        <p14:creationId xmlns:p14="http://schemas.microsoft.com/office/powerpoint/2010/main" val="897774701"/>
+      </p:ext>
+    </p:extLst>
+  </p:cSld>
+  <p:clrMapOvr>
+    <a:masterClrMapping/>
+  </p:clrMapOvr>
+</p:notes>
+</file>
+
 <file path=ppt/slideLayouts/slideLayout1.xml><?xml version="1.0" encoding="utf-8"?>
 <p:sldLayout xmlns:a="http://schemas.openxmlformats.org/drawingml/2006/main" xmlns:r="http://schemas.openxmlformats.org/officeDocument/2006/relationships" xmlns:p="http://schemas.openxmlformats.org/presentationml/2006/main" type="title" preserve="1">
   <p:cSld name="Title Slide">
@@ -344,7 +780,7 @@
             <a:fld id="{7CE38E4D-051A-41E1-86A4-E56916468FD0}" type="datetimeFigureOut">
               <a:rPr lang="en-US" smtClean="0"/>
               <a:pPr/>
-              <a:t>10/16/2012</a:t>
+              <a:t>2012-10-16</a:t>
             </a:fld>
             <a:endParaRPr lang="en-US"/>
           </a:p>
@@ -656,7 +1092,7 @@
             <a:fld id="{7CE38E4D-051A-41E1-86A4-E56916468FD0}" type="datetimeFigureOut">
               <a:rPr lang="en-US" smtClean="0"/>
               <a:pPr/>
-              <a:t>10/16/2012</a:t>
+              <a:t>2012-10-16</a:t>
             </a:fld>
             <a:endParaRPr lang="en-US"/>
           </a:p>
@@ -897,7 +1333,7 @@
             <a:fld id="{7CE38E4D-051A-41E1-86A4-E56916468FD0}" type="datetimeFigureOut">
               <a:rPr lang="en-US" smtClean="0"/>
               <a:pPr/>
-              <a:t>10/16/2012</a:t>
+              <a:t>2012-10-16</a:t>
             </a:fld>
             <a:endParaRPr lang="en-US"/>
           </a:p>
@@ -1198,7 +1634,7 @@
             <a:fld id="{7CE38E4D-051A-41E1-86A4-E56916468FD0}" type="datetimeFigureOut">
               <a:rPr lang="en-US" smtClean="0"/>
               <a:pPr/>
-              <a:t>10/16/2012</a:t>
+              <a:t>2012-10-16</a:t>
             </a:fld>
             <a:endParaRPr lang="en-US"/>
           </a:p>
@@ -1415,7 +1851,7 @@
             <a:fld id="{7CE38E4D-051A-41E1-86A4-E56916468FD0}" type="datetimeFigureOut">
               <a:rPr lang="en-US" smtClean="0"/>
               <a:pPr/>
-              <a:t>10/16/2012</a:t>
+              <a:t>2012-10-16</a:t>
             </a:fld>
             <a:endParaRPr lang="en-US"/>
           </a:p>
@@ -1777,7 +2213,7 @@
             <a:fld id="{7CE38E4D-051A-41E1-86A4-E56916468FD0}" type="datetimeFigureOut">
               <a:rPr lang="en-US" smtClean="0"/>
               <a:pPr/>
-              <a:t>10/16/2012</a:t>
+              <a:t>2012-10-16</a:t>
             </a:fld>
             <a:endParaRPr lang="en-US"/>
           </a:p>
@@ -2046,7 +2482,7 @@
             <a:fld id="{7CE38E4D-051A-41E1-86A4-E56916468FD0}" type="datetimeFigureOut">
               <a:rPr lang="en-US" smtClean="0"/>
               <a:pPr/>
-              <a:t>10/16/2012</a:t>
+              <a:t>2012-10-16</a:t>
             </a:fld>
             <a:endParaRPr lang="en-US"/>
           </a:p>
@@ -2138,7 +2574,7 @@
             <a:fld id="{7CE38E4D-051A-41E1-86A4-E56916468FD0}" type="datetimeFigureOut">
               <a:rPr lang="en-US" smtClean="0"/>
               <a:pPr/>
-              <a:t>10/16/2012</a:t>
+              <a:t>2012-10-16</a:t>
             </a:fld>
             <a:endParaRPr lang="en-US"/>
           </a:p>
@@ -2459,7 +2895,7 @@
           <a:blip r:embed="rId3" cstate="print">
             <a:extLst>
               <a:ext uri="{28A0092B-C50C-407E-A947-70E740481C1C}">
-                <a14:useLocalDpi xmlns="" xmlns:a14="http://schemas.microsoft.com/office/drawing/2010/main" val="0"/>
+                <a14:useLocalDpi xmlns:a14="http://schemas.microsoft.com/office/drawing/2010/main" val="0"/>
               </a:ext>
             </a:extLst>
           </a:blip>
@@ -2736,7 +3172,7 @@
             <a:fld id="{7CE38E4D-051A-41E1-86A4-E56916468FD0}" type="datetimeFigureOut">
               <a:rPr lang="en-US" smtClean="0"/>
               <a:pPr/>
-              <a:t>10/16/2012</a:t>
+              <a:t>2012-10-16</a:t>
             </a:fld>
             <a:endParaRPr lang="en-US"/>
           </a:p>
@@ -3018,7 +3454,7 @@
             <a:fld id="{7CE38E4D-051A-41E1-86A4-E56916468FD0}" type="datetimeFigureOut">
               <a:rPr lang="en-US" smtClean="0"/>
               <a:pPr/>
-              <a:t>10/16/2012</a:t>
+              <a:t>2012-10-16</a:t>
             </a:fld>
             <a:endParaRPr lang="en-US"/>
           </a:p>
@@ -3428,7 +3864,7 @@
             <a:fld id="{7CE38E4D-051A-41E1-86A4-E56916468FD0}" type="datetimeFigureOut">
               <a:rPr lang="en-US" smtClean="0"/>
               <a:pPr/>
-              <a:t>10/16/2012</a:t>
+              <a:t>2012-10-16</a:t>
             </a:fld>
             <a:endParaRPr lang="en-US"/>
           </a:p>
@@ -3990,7 +4426,7 @@
             <a:fld id="{7CE38E4D-051A-41E1-86A4-E56916468FD0}" type="datetimeFigureOut">
               <a:rPr lang="en-US" smtClean="0"/>
               <a:pPr/>
-              <a:t>10/16/2012</a:t>
+              <a:t>2012-10-16</a:t>
             </a:fld>
             <a:endParaRPr lang="en-US"/>
           </a:p>
@@ -4140,7 +4576,7 @@
             <a:fld id="{7CE38E4D-051A-41E1-86A4-E56916468FD0}" type="datetimeFigureOut">
               <a:rPr lang="en-US" smtClean="0"/>
               <a:pPr/>
-              <a:t>10/16/2012</a:t>
+              <a:t>2012-10-16</a:t>
             </a:fld>
             <a:endParaRPr lang="en-US"/>
           </a:p>
@@ -4232,7 +4668,7 @@
             <a:fld id="{7CE38E4D-051A-41E1-86A4-E56916468FD0}" type="datetimeFigureOut">
               <a:rPr lang="en-US" smtClean="0"/>
               <a:pPr/>
-              <a:t>10/16/2012</a:t>
+              <a:t>2012-10-16</a:t>
             </a:fld>
             <a:endParaRPr lang="en-US"/>
           </a:p>
@@ -4576,7 +5012,7 @@
             <a:fld id="{7CE38E4D-051A-41E1-86A4-E56916468FD0}" type="datetimeFigureOut">
               <a:rPr lang="en-US" smtClean="0"/>
               <a:pPr/>
-              <a:t>10/16/2012</a:t>
+              <a:t>2012-10-16</a:t>
             </a:fld>
             <a:endParaRPr lang="en-US"/>
           </a:p>
@@ -4787,7 +5223,7 @@
             <a:fld id="{7CE38E4D-051A-41E1-86A4-E56916468FD0}" type="datetimeFigureOut">
               <a:rPr lang="en-US" smtClean="0"/>
               <a:pPr/>
-              <a:t>10/16/2012</a:t>
+              <a:t>2012-10-16</a:t>
             </a:fld>
             <a:endParaRPr lang="en-US"/>
           </a:p>
@@ -5309,7 +5745,7 @@
           <a:blip r:embed="rId2" cstate="print">
             <a:extLst>
               <a:ext uri="{28A0092B-C50C-407E-A947-70E740481C1C}">
-                <a14:useLocalDpi xmlns="" xmlns:a14="http://schemas.microsoft.com/office/drawing/2010/main" val="0"/>
+                <a14:useLocalDpi xmlns:a14="http://schemas.microsoft.com/office/drawing/2010/main" val="0"/>
               </a:ext>
             </a:extLst>
           </a:blip>
@@ -5330,7 +5766,7 @@
     </p:spTree>
     <p:extLst>
       <p:ext uri="{BB962C8B-B14F-4D97-AF65-F5344CB8AC3E}">
-        <p14:creationId xmlns="" xmlns:p14="http://schemas.microsoft.com/office/powerpoint/2010/main" val="1873691422"/>
+        <p14:creationId xmlns:p14="http://schemas.microsoft.com/office/powerpoint/2010/main" val="1873691422"/>
       </p:ext>
     </p:extLst>
   </p:cSld>
@@ -5340,7 +5776,7 @@
   <p:timing>
     <p:tnLst>
       <p:par>
-        <p:cTn id="1" dur="indefinite" restart="never" nodeType="tmRoot"/>
+        <p:cTn xmlns:p14="http://schemas.microsoft.com/office/powerpoint/2010/main" id="1" dur="indefinite" restart="never" nodeType="tmRoot"/>
       </p:par>
     </p:tnLst>
   </p:timing>
@@ -5381,7 +5817,7 @@
           <a:p>
             <a:r>
               <a:rPr lang="en-US" dirty="0" smtClean="0"/>
-              <a:t>Interesting facts about Haskell</a:t>
+              <a:t>Want to try Haskell?</a:t>
             </a:r>
             <a:endParaRPr lang="en-US" dirty="0"/>
           </a:p>
@@ -5406,328 +5842,6 @@
           <a:p>
             <a:r>
               <a:rPr lang="en-US" dirty="0" smtClean="0"/>
-              <a:t>Haskell is statically typed, but because its type inference is so powerful you almost never have to type the types!</a:t>
-            </a:r>
-          </a:p>
-          <a:p>
-            <a:r>
-              <a:rPr lang="en-US" dirty="0" smtClean="0"/>
-              <a:t>Haskell has lazy evaluation which is really neat (e.g. give me the first 10 elements of an infinite list)</a:t>
-            </a:r>
-          </a:p>
-          <a:p>
-            <a:r>
-              <a:rPr lang="en-US" dirty="0" smtClean="0"/>
-              <a:t>Haskell is pretty fast.  Close to Java, certainly faster than dynamic languages like Python or Ruby.  It compiles to machine code like C or C++.  The compiler is seeing a lot of improvements lately as interest grows.</a:t>
-            </a:r>
-          </a:p>
-          <a:p>
-            <a:r>
-              <a:rPr lang="en-US" dirty="0" smtClean="0"/>
-              <a:t>Haskell also has a REPL that allows you to play with the language easily and try new things.</a:t>
-            </a:r>
-          </a:p>
-          <a:p>
-            <a:endParaRPr lang="en-US" dirty="0" smtClean="0"/>
-          </a:p>
-          <a:p>
-            <a:endParaRPr lang="en-US" dirty="0"/>
-          </a:p>
-        </p:txBody>
-      </p:sp>
-    </p:spTree>
-  </p:cSld>
-  <p:clrMapOvr>
-    <a:masterClrMapping/>
-  </p:clrMapOvr>
-</p:sld>
-</file>
-
-<file path=ppt/slides/slide11.xml><?xml version="1.0" encoding="utf-8"?>
-<p:sld xmlns:a="http://schemas.openxmlformats.org/drawingml/2006/main" xmlns:r="http://schemas.openxmlformats.org/officeDocument/2006/relationships" xmlns:p="http://schemas.openxmlformats.org/presentationml/2006/main">
-  <p:cSld>
-    <p:spTree>
-      <p:nvGrpSpPr>
-        <p:cNvPr id="1" name=""/>
-        <p:cNvGrpSpPr/>
-        <p:nvPr/>
-      </p:nvGrpSpPr>
-      <p:grpSpPr>
-        <a:xfrm>
-          <a:off x="0" y="0"/>
-          <a:ext cx="0" cy="0"/>
-          <a:chOff x="0" y="0"/>
-          <a:chExt cx="0" cy="0"/>
-        </a:xfrm>
-      </p:grpSpPr>
-      <p:sp>
-        <p:nvSpPr>
-          <p:cNvPr id="2" name="Title 1"/>
-          <p:cNvSpPr>
-            <a:spLocks noGrp="1"/>
-          </p:cNvSpPr>
-          <p:nvPr>
-            <p:ph type="title"/>
-          </p:nvPr>
-        </p:nvSpPr>
-        <p:spPr/>
-        <p:txBody>
-          <a:bodyPr/>
-          <a:lstStyle/>
-          <a:p>
-            <a:r>
-              <a:rPr lang="en-US" dirty="0" smtClean="0"/>
-              <a:t>Want to try Haskell?</a:t>
-            </a:r>
-            <a:endParaRPr lang="en-US" dirty="0"/>
-          </a:p>
-        </p:txBody>
-      </p:sp>
-      <p:sp>
-        <p:nvSpPr>
-          <p:cNvPr id="3" name="Content Placeholder 2"/>
-          <p:cNvSpPr>
-            <a:spLocks noGrp="1"/>
-          </p:cNvSpPr>
-          <p:nvPr>
-            <p:ph idx="1"/>
-          </p:nvPr>
-        </p:nvSpPr>
-        <p:spPr/>
-        <p:txBody>
-          <a:bodyPr>
-            <a:normAutofit/>
-          </a:bodyPr>
-          <a:lstStyle/>
-          <a:p>
-            <a:r>
-              <a:rPr lang="en-US" dirty="0" smtClean="0"/>
-              <a:t>Free eBooks!</a:t>
-            </a:r>
-          </a:p>
-          <a:p>
-            <a:pPr lvl="1"/>
-            <a:r>
-              <a:rPr lang="en-US" dirty="0" smtClean="0"/>
-              <a:t>Learn you a Haskell for Great Good!</a:t>
-            </a:r>
-          </a:p>
-          <a:p>
-            <a:pPr lvl="2"/>
-            <a:r>
-              <a:rPr lang="en-US" dirty="0">
-                <a:solidFill>
-                  <a:srgbClr val="FF0000"/>
-                </a:solidFill>
-                <a:hlinkClick r:id="rId2"/>
-              </a:rPr>
-              <a:t>http://learnyouahaskell.com/</a:t>
-            </a:r>
-            <a:r>
-              <a:rPr lang="en-US" dirty="0" smtClean="0">
-                <a:solidFill>
-                  <a:srgbClr val="FF0000"/>
-                </a:solidFill>
-                <a:hlinkClick r:id="rId2"/>
-              </a:rPr>
-              <a:t>chapters</a:t>
-            </a:r>
-            <a:endParaRPr lang="en-US" dirty="0" smtClean="0">
-              <a:solidFill>
-                <a:srgbClr val="FF0000"/>
-              </a:solidFill>
-            </a:endParaRPr>
-          </a:p>
-          <a:p>
-            <a:pPr lvl="1"/>
-            <a:r>
-              <a:rPr lang="en-US" dirty="0" smtClean="0"/>
-              <a:t>Real World Haskell</a:t>
-            </a:r>
-          </a:p>
-          <a:p>
-            <a:pPr lvl="2"/>
-            <a:r>
-              <a:rPr lang="en-US" dirty="0">
-                <a:hlinkClick r:id="rId3"/>
-              </a:rPr>
-              <a:t>http://book.realworldhaskell.org/read</a:t>
-            </a:r>
-            <a:r>
-              <a:rPr lang="en-US" dirty="0" smtClean="0">
-                <a:hlinkClick r:id="rId3"/>
-              </a:rPr>
-              <a:t>/</a:t>
-            </a:r>
-            <a:endParaRPr lang="en-US" dirty="0" smtClean="0"/>
-          </a:p>
-          <a:p>
-            <a:r>
-              <a:rPr lang="en-US" dirty="0" smtClean="0"/>
-              <a:t>Cool video introduction (Google Tech Talk): </a:t>
-            </a:r>
-          </a:p>
-          <a:p>
-            <a:pPr lvl="2"/>
-            <a:r>
-              <a:rPr lang="en-US" dirty="0" smtClean="0">
-                <a:hlinkClick r:id="rId4"/>
-              </a:rPr>
-              <a:t>http</a:t>
-            </a:r>
-            <a:r>
-              <a:rPr lang="en-US" dirty="0">
-                <a:hlinkClick r:id="rId4"/>
-              </a:rPr>
-              <a:t>://</a:t>
-            </a:r>
-            <a:r>
-              <a:rPr lang="en-US" dirty="0" smtClean="0">
-                <a:hlinkClick r:id="rId4"/>
-              </a:rPr>
-              <a:t>www.youtube.com/watch?v=b9FagOVqxmI</a:t>
-            </a:r>
-            <a:endParaRPr lang="en-US" dirty="0" smtClean="0"/>
-          </a:p>
-        </p:txBody>
-      </p:sp>
-      <p:pic>
-        <p:nvPicPr>
-          <p:cNvPr id="5" name="Picture 4" descr="lrg.jpg"/>
-          <p:cNvPicPr>
-            <a:picLocks noChangeAspect="1"/>
-          </p:cNvPicPr>
-          <p:nvPr/>
-        </p:nvPicPr>
-        <p:blipFill>
-          <a:blip r:embed="rId5" cstate="print"/>
-          <a:stretch>
-            <a:fillRect/>
-          </a:stretch>
-        </p:blipFill>
-        <p:spPr>
-          <a:xfrm>
-            <a:off x="6749687" y="2729702"/>
-            <a:ext cx="1524000" cy="1999488"/>
-          </a:xfrm>
-          <a:prstGeom prst="rect">
-            <a:avLst/>
-          </a:prstGeom>
-          <a:ln w="6350">
-            <a:solidFill>
-              <a:schemeClr val="tx1"/>
-            </a:solidFill>
-          </a:ln>
-        </p:spPr>
-      </p:pic>
-      <p:pic>
-        <p:nvPicPr>
-          <p:cNvPr id="6" name="Picture 5" descr="lyah.png"/>
-          <p:cNvPicPr>
-            <a:picLocks noChangeAspect="1"/>
-          </p:cNvPicPr>
-          <p:nvPr/>
-        </p:nvPicPr>
-        <p:blipFill>
-          <a:blip r:embed="rId6" cstate="print"/>
-          <a:stretch>
-            <a:fillRect/>
-          </a:stretch>
-        </p:blipFill>
-        <p:spPr>
-          <a:xfrm>
-            <a:off x="6749687" y="393677"/>
-            <a:ext cx="1524000" cy="2011881"/>
-          </a:xfrm>
-          <a:prstGeom prst="rect">
-            <a:avLst/>
-          </a:prstGeom>
-          <a:ln w="6350">
-            <a:solidFill>
-              <a:schemeClr val="tx1"/>
-            </a:solidFill>
-          </a:ln>
-        </p:spPr>
-      </p:pic>
-    </p:spTree>
-    <p:extLst>
-      <p:ext uri="{BB962C8B-B14F-4D97-AF65-F5344CB8AC3E}">
-        <p14:creationId xmlns="" xmlns:p14="http://schemas.microsoft.com/office/powerpoint/2010/main" val="2526408885"/>
-      </p:ext>
-    </p:extLst>
-  </p:cSld>
-  <p:clrMapOvr>
-    <a:masterClrMapping/>
-  </p:clrMapOvr>
-  <p:timing>
-    <p:tnLst>
-      <p:par>
-        <p:cTn id="1" dur="indefinite" restart="never" nodeType="tmRoot"/>
-      </p:par>
-    </p:tnLst>
-  </p:timing>
-</p:sld>
-</file>
-
-<file path=ppt/slides/slide12.xml><?xml version="1.0" encoding="utf-8"?>
-<p:sld xmlns:a="http://schemas.openxmlformats.org/drawingml/2006/main" xmlns:r="http://schemas.openxmlformats.org/officeDocument/2006/relationships" xmlns:p="http://schemas.openxmlformats.org/presentationml/2006/main">
-  <p:cSld>
-    <p:spTree>
-      <p:nvGrpSpPr>
-        <p:cNvPr id="1" name=""/>
-        <p:cNvGrpSpPr/>
-        <p:nvPr/>
-      </p:nvGrpSpPr>
-      <p:grpSpPr>
-        <a:xfrm>
-          <a:off x="0" y="0"/>
-          <a:ext cx="0" cy="0"/>
-          <a:chOff x="0" y="0"/>
-          <a:chExt cx="0" cy="0"/>
-        </a:xfrm>
-      </p:grpSpPr>
-      <p:sp>
-        <p:nvSpPr>
-          <p:cNvPr id="2" name="Title 1"/>
-          <p:cNvSpPr>
-            <a:spLocks noGrp="1"/>
-          </p:cNvSpPr>
-          <p:nvPr>
-            <p:ph type="title"/>
-          </p:nvPr>
-        </p:nvSpPr>
-        <p:spPr/>
-        <p:txBody>
-          <a:bodyPr/>
-          <a:lstStyle/>
-          <a:p>
-            <a:r>
-              <a:rPr lang="en-US" dirty="0" smtClean="0"/>
-              <a:t>Want to try Haskell?</a:t>
-            </a:r>
-            <a:endParaRPr lang="en-US" dirty="0"/>
-          </a:p>
-        </p:txBody>
-      </p:sp>
-      <p:sp>
-        <p:nvSpPr>
-          <p:cNvPr id="3" name="Content Placeholder 2"/>
-          <p:cNvSpPr>
-            <a:spLocks noGrp="1"/>
-          </p:cNvSpPr>
-          <p:nvPr>
-            <p:ph idx="1"/>
-          </p:nvPr>
-        </p:nvSpPr>
-        <p:spPr/>
-        <p:txBody>
-          <a:bodyPr>
-            <a:normAutofit/>
-          </a:bodyPr>
-          <a:lstStyle/>
-          <a:p>
-            <a:r>
-              <a:rPr lang="en-US" dirty="0" smtClean="0"/>
               <a:t>Get Haskell Platform easily for your machine</a:t>
             </a:r>
           </a:p>
@@ -5745,7 +5859,6 @@
               <a:rPr lang="en-US" dirty="0" smtClean="0"/>
               <a:t>):</a:t>
             </a:r>
-            <a:endParaRPr lang="en-US" dirty="0" smtClean="0"/>
           </a:p>
           <a:p>
             <a:pPr lvl="3"/>
@@ -5827,13 +5940,8 @@
             <a:pPr lvl="2"/>
             <a:r>
               <a:rPr lang="en-US" dirty="0" smtClean="0"/>
-              <a:t>Windows or </a:t>
-            </a:r>
-            <a:r>
-              <a:rPr lang="en-US" dirty="0" smtClean="0"/>
-              <a:t>Mac (or Linux):</a:t>
-            </a:r>
-            <a:endParaRPr lang="en-US" dirty="0" smtClean="0"/>
+              <a:t>Windows or Mac (or Linux):</a:t>
+            </a:r>
           </a:p>
           <a:p>
             <a:pPr lvl="3"/>
@@ -5845,13 +5953,7 @@
               <a:rPr lang="en-US" dirty="0" smtClean="0">
                 <a:hlinkClick r:id="rId2"/>
               </a:rPr>
-              <a:t>http://www.haskell.org/platform</a:t>
-            </a:r>
-            <a:r>
-              <a:rPr lang="en-US" dirty="0" smtClean="0">
-                <a:hlinkClick r:id="rId2"/>
-              </a:rPr>
-              <a:t>/</a:t>
+              <a:t>http://www.haskell.org/platform/</a:t>
             </a:r>
             <a:endParaRPr lang="en-US" dirty="0" smtClean="0"/>
           </a:p>
@@ -5867,13 +5969,7 @@
               <a:rPr lang="en-US" dirty="0" smtClean="0">
                 <a:hlinkClick r:id="rId3"/>
               </a:rPr>
-              <a:t>http://eclipsefp.github.com</a:t>
-            </a:r>
-            <a:r>
-              <a:rPr lang="en-US" dirty="0" smtClean="0">
-                <a:hlinkClick r:id="rId3"/>
-              </a:rPr>
-              <a:t>/</a:t>
+              <a:t>http://eclipsefp.github.com/</a:t>
             </a:r>
             <a:endParaRPr lang="en-US" dirty="0" smtClean="0"/>
           </a:p>
@@ -5906,7 +6002,7 @@
     </p:spTree>
     <p:extLst>
       <p:ext uri="{BB962C8B-B14F-4D97-AF65-F5344CB8AC3E}">
-        <p14:creationId xmlns="" xmlns:p14="http://schemas.microsoft.com/office/powerpoint/2010/main" val="2526408885"/>
+        <p14:creationId xmlns:p14="http://schemas.microsoft.com/office/powerpoint/2010/main" val="2526408885"/>
       </p:ext>
     </p:extLst>
   </p:cSld>
@@ -5916,14 +6012,14 @@
   <p:timing>
     <p:tnLst>
       <p:par>
-        <p:cTn id="1" dur="indefinite" restart="never" nodeType="tmRoot"/>
+        <p:cTn xmlns:p14="http://schemas.microsoft.com/office/powerpoint/2010/main" id="1" dur="indefinite" restart="never" nodeType="tmRoot"/>
       </p:par>
     </p:tnLst>
   </p:timing>
 </p:sld>
 </file>
 
-<file path=ppt/slides/slide13.xml><?xml version="1.0" encoding="utf-8"?>
+<file path=ppt/slides/slide11.xml><?xml version="1.0" encoding="utf-8"?>
 <p:sld xmlns:a="http://schemas.openxmlformats.org/drawingml/2006/main" xmlns:r="http://schemas.openxmlformats.org/officeDocument/2006/relationships" xmlns:p="http://schemas.openxmlformats.org/presentationml/2006/main">
   <p:cSld>
     <p:spTree>
@@ -5957,6 +6053,212 @@
           <a:p>
             <a:r>
               <a:rPr lang="en-US" dirty="0" smtClean="0"/>
+              <a:t>Topics for Future Sessions</a:t>
+            </a:r>
+            <a:endParaRPr lang="en-US" dirty="0"/>
+          </a:p>
+        </p:txBody>
+      </p:sp>
+      <p:sp>
+        <p:nvSpPr>
+          <p:cNvPr id="3" name="Content Placeholder 2"/>
+          <p:cNvSpPr>
+            <a:spLocks noGrp="1"/>
+          </p:cNvSpPr>
+          <p:nvPr>
+            <p:ph idx="1"/>
+          </p:nvPr>
+        </p:nvSpPr>
+        <p:spPr/>
+        <p:txBody>
+          <a:bodyPr>
+            <a:normAutofit fontScale="85000" lnSpcReduction="10000"/>
+          </a:bodyPr>
+          <a:lstStyle/>
+          <a:p>
+            <a:r>
+              <a:rPr lang="en-US" dirty="0"/>
+              <a:t>How you can help by presenting your ideas and experiences with FP</a:t>
+            </a:r>
+            <a:r>
+              <a:rPr lang="en-US" dirty="0" smtClean="0"/>
+              <a:t>.</a:t>
+            </a:r>
+            <a:endParaRPr lang="en-US" dirty="0"/>
+          </a:p>
+          <a:p>
+            <a:pPr lvl="1"/>
+            <a:r>
+              <a:rPr lang="en-US" dirty="0"/>
+              <a:t>If you wish to present at a future session contact me:</a:t>
+            </a:r>
+          </a:p>
+          <a:p>
+            <a:pPr lvl="3"/>
+            <a:r>
+              <a:rPr lang="en-US" i="1" dirty="0">
+                <a:solidFill>
+                  <a:schemeClr val="bg2">
+                    <a:lumMod val="50000"/>
+                  </a:schemeClr>
+                </a:solidFill>
+              </a:rPr>
+              <a:t>&lt;</a:t>
+            </a:r>
+            <a:r>
+              <a:rPr lang="en-US" i="1" dirty="0" err="1">
+                <a:solidFill>
+                  <a:schemeClr val="bg2">
+                    <a:lumMod val="50000"/>
+                  </a:schemeClr>
+                </a:solidFill>
+              </a:rPr>
+              <a:t>chris.dunphy@sjrb.ca</a:t>
+            </a:r>
+            <a:r>
+              <a:rPr lang="en-US" i="1" dirty="0" smtClean="0">
+                <a:solidFill>
+                  <a:schemeClr val="bg2">
+                    <a:lumMod val="50000"/>
+                  </a:schemeClr>
+                </a:solidFill>
+              </a:rPr>
+              <a:t>&gt;</a:t>
+            </a:r>
+            <a:endParaRPr lang="en-US" dirty="0" smtClean="0"/>
+          </a:p>
+          <a:p>
+            <a:r>
+              <a:rPr lang="en-US" dirty="0" smtClean="0"/>
+              <a:t>Functional </a:t>
+            </a:r>
+            <a:r>
+              <a:rPr lang="en-US" dirty="0" smtClean="0"/>
+              <a:t>programming concepts and idioms</a:t>
+            </a:r>
+          </a:p>
+          <a:p>
+            <a:pPr lvl="1"/>
+            <a:r>
+              <a:rPr lang="en-US" dirty="0" smtClean="0"/>
+              <a:t>Higher order functions, currying, pattern matching, functional algorithms, monads, etc.</a:t>
+            </a:r>
+          </a:p>
+          <a:p>
+            <a:pPr lvl="1"/>
+            <a:r>
+              <a:rPr lang="en-US" dirty="0" smtClean="0"/>
+              <a:t>Actors and other functional approaches to concurrency.</a:t>
+            </a:r>
+          </a:p>
+          <a:p>
+            <a:r>
+              <a:rPr lang="en-US" dirty="0" smtClean="0"/>
+              <a:t>Functional programming languages</a:t>
+            </a:r>
+          </a:p>
+          <a:p>
+            <a:pPr lvl="1"/>
+            <a:r>
+              <a:rPr lang="en-US" dirty="0" smtClean="0"/>
+              <a:t>Any functional language!</a:t>
+            </a:r>
+          </a:p>
+          <a:p>
+            <a:pPr lvl="1"/>
+            <a:r>
+              <a:rPr lang="en-US" dirty="0" smtClean="0"/>
+              <a:t>Also, how functional concepts can help us write better programs in imperative languages like C#, C++, or Java.</a:t>
+            </a:r>
+          </a:p>
+          <a:p>
+            <a:r>
+              <a:rPr lang="en-US" dirty="0" smtClean="0"/>
+              <a:t>Demos, talks, or relevant videos on YouTube are all welcome!</a:t>
+            </a:r>
+          </a:p>
+        </p:txBody>
+      </p:sp>
+      <p:pic>
+        <p:nvPicPr>
+          <p:cNvPr id="3074" name="Picture 2" descr="C:\Users\cdunphy\AppData\Local\Microsoft\Windows\Temporary Internet Files\Content.IE5\5YFOUQSJ\MC900279226[1].wmf"/>
+          <p:cNvPicPr>
+            <a:picLocks noChangeAspect="1" noChangeArrowheads="1"/>
+          </p:cNvPicPr>
+          <p:nvPr/>
+        </p:nvPicPr>
+        <p:blipFill>
+          <a:blip r:embed="rId2" cstate="print"/>
+          <a:srcRect/>
+          <a:stretch>
+            <a:fillRect/>
+          </a:stretch>
+        </p:blipFill>
+        <p:spPr bwMode="auto">
+          <a:xfrm>
+            <a:off x="6859588" y="298450"/>
+            <a:ext cx="1520825" cy="1817688"/>
+          </a:xfrm>
+          <a:prstGeom prst="rect">
+            <a:avLst/>
+          </a:prstGeom>
+          <a:noFill/>
+        </p:spPr>
+      </p:pic>
+    </p:spTree>
+    <p:extLst>
+      <p:ext uri="{BB962C8B-B14F-4D97-AF65-F5344CB8AC3E}">
+        <p14:creationId xmlns:p14="http://schemas.microsoft.com/office/powerpoint/2010/main" val="2190666559"/>
+      </p:ext>
+    </p:extLst>
+  </p:cSld>
+  <p:clrMapOvr>
+    <a:masterClrMapping/>
+  </p:clrMapOvr>
+  <p:timing>
+    <p:tnLst>
+      <p:par>
+        <p:cTn xmlns:p14="http://schemas.microsoft.com/office/powerpoint/2010/main" id="1" dur="indefinite" restart="never" nodeType="tmRoot"/>
+      </p:par>
+    </p:tnLst>
+  </p:timing>
+</p:sld>
+</file>
+
+<file path=ppt/slides/slide12.xml><?xml version="1.0" encoding="utf-8"?>
+<p:sld xmlns:a="http://schemas.openxmlformats.org/drawingml/2006/main" xmlns:r="http://schemas.openxmlformats.org/officeDocument/2006/relationships" xmlns:p="http://schemas.openxmlformats.org/presentationml/2006/main">
+  <p:cSld>
+    <p:spTree>
+      <p:nvGrpSpPr>
+        <p:cNvPr id="1" name=""/>
+        <p:cNvGrpSpPr/>
+        <p:nvPr/>
+      </p:nvGrpSpPr>
+      <p:grpSpPr>
+        <a:xfrm>
+          <a:off x="0" y="0"/>
+          <a:ext cx="0" cy="0"/>
+          <a:chOff x="0" y="0"/>
+          <a:chExt cx="0" cy="0"/>
+        </a:xfrm>
+      </p:grpSpPr>
+      <p:sp>
+        <p:nvSpPr>
+          <p:cNvPr id="2" name="Title 1"/>
+          <p:cNvSpPr>
+            <a:spLocks noGrp="1"/>
+          </p:cNvSpPr>
+          <p:nvPr>
+            <p:ph type="title"/>
+          </p:nvPr>
+        </p:nvSpPr>
+        <p:spPr/>
+        <p:txBody>
+          <a:bodyPr/>
+          <a:lstStyle/>
+          <a:p>
+            <a:r>
+              <a:rPr lang="en-US" dirty="0" smtClean="0"/>
               <a:t>Questions?</a:t>
             </a:r>
             <a:endParaRPr lang="en-US" dirty="0"/>
@@ -6018,16 +6320,11 @@
               <a:rPr lang="en-US" dirty="0" smtClean="0"/>
               <a:t>is coming.  We will be able to post information relating to the sessions there.</a:t>
             </a:r>
-            <a:endParaRPr lang="en-US" dirty="0" smtClean="0"/>
           </a:p>
           <a:p>
             <a:r>
               <a:rPr lang="en-US" dirty="0" smtClean="0"/>
-              <a:t>Thanks </a:t>
-            </a:r>
-            <a:r>
-              <a:rPr lang="en-US" dirty="0" smtClean="0"/>
-              <a:t>for coming.  We hope to see you again next month!</a:t>
+              <a:t>Thanks for coming.  We hope to see you again next month!</a:t>
             </a:r>
             <a:endParaRPr lang="en-US" dirty="0"/>
           </a:p>
@@ -6062,7 +6359,7 @@
     </p:spTree>
     <p:extLst>
       <p:ext uri="{BB962C8B-B14F-4D97-AF65-F5344CB8AC3E}">
-        <p14:creationId xmlns="" xmlns:p14="http://schemas.microsoft.com/office/powerpoint/2010/main" val="1090242725"/>
+        <p14:creationId xmlns:p14="http://schemas.microsoft.com/office/powerpoint/2010/main" val="1090242725"/>
       </p:ext>
     </p:extLst>
   </p:cSld>
@@ -6072,7 +6369,7 @@
   <p:timing>
     <p:tnLst>
       <p:par>
-        <p:cTn id="1" dur="indefinite" restart="never" nodeType="tmRoot"/>
+        <p:cTn xmlns:p14="http://schemas.microsoft.com/office/powerpoint/2010/main" id="1" dur="indefinite" restart="never" nodeType="tmRoot"/>
       </p:par>
     </p:tnLst>
   </p:timing>
@@ -6129,49 +6426,114 @@
             <p:ph idx="1"/>
           </p:nvPr>
         </p:nvSpPr>
-        <p:spPr/>
+        <p:spPr>
+          <a:xfrm>
+            <a:off x="539189" y="2338499"/>
+            <a:ext cx="8185711" cy="3556060"/>
+          </a:xfrm>
+        </p:spPr>
         <p:txBody>
           <a:bodyPr>
-            <a:normAutofit fontScale="92500"/>
+            <a:normAutofit/>
           </a:bodyPr>
           <a:lstStyle/>
           <a:p>
             <a:r>
               <a:rPr lang="en-US" dirty="0" smtClean="0"/>
-              <a:t>One of the most enjoyable aspects of working as a software developer is learning new things.</a:t>
-            </a:r>
+              <a:t>This is the first of a series of lunch and learn sessions on Functional Programming (FP)</a:t>
+            </a:r>
+            <a:endParaRPr lang="en-US" dirty="0" smtClean="0"/>
           </a:p>
           <a:p>
             <a:r>
               <a:rPr lang="en-US" dirty="0" smtClean="0"/>
-              <a:t>Functional programming, which has been popular in academia for a very long time, is becoming more popular in mainstream circles for a variety of reasons.</a:t>
-            </a:r>
-          </a:p>
-          <a:p>
+              <a:t>Functional </a:t>
+            </a:r>
             <a:r>
               <a:rPr lang="en-US" dirty="0" smtClean="0"/>
-              <a:t>I am new to FP, but what I am learning is very exciting.  It is just awesome to write programs in FP!</a:t>
-            </a:r>
-          </a:p>
-          <a:p>
+              <a:t>programming</a:t>
+            </a:r>
+            <a:r>
+              <a:rPr lang="en-US" dirty="0"/>
+              <a:t> </a:t>
+            </a:r>
             <a:r>
               <a:rPr lang="en-US" dirty="0" smtClean="0"/>
-              <a:t>My hope for these lunch and learns is to share knowledge on this subject and perhaps learn something from one of you in the audience!</a:t>
+              <a:t>is becoming mainstream.</a:t>
             </a:r>
           </a:p>
           <a:p>
             <a:r>
               <a:rPr lang="en-US" dirty="0" smtClean="0"/>
-              <a:t>I want to get you excited about Functional Programming!</a:t>
+              <a:t>I </a:t>
+            </a:r>
+            <a:r>
+              <a:rPr lang="en-US" dirty="0" smtClean="0"/>
+              <a:t>am new to </a:t>
+            </a:r>
+            <a:r>
+              <a:rPr lang="en-US" dirty="0" smtClean="0"/>
+              <a:t>FP</a:t>
+            </a:r>
+            <a:r>
+              <a:rPr lang="en-US" dirty="0" smtClean="0"/>
+              <a:t>.  I am excited about what I am learning.</a:t>
+            </a:r>
+          </a:p>
+          <a:p>
+            <a:r>
+              <a:rPr lang="en-US" dirty="0" smtClean="0"/>
+              <a:t>I hope to share knowledge and learn something from some of you.</a:t>
             </a:r>
             <a:endParaRPr lang="en-US" dirty="0"/>
           </a:p>
-        </p:txBody>
-      </p:sp>
+          <a:p>
+            <a:r>
+              <a:rPr lang="en-US" dirty="0" smtClean="0"/>
+              <a:t>I want </a:t>
+            </a:r>
+            <a:r>
+              <a:rPr lang="en-US" dirty="0" smtClean="0"/>
+              <a:t>to get you excited about Functional Programming!</a:t>
+            </a:r>
+            <a:endParaRPr lang="en-US" dirty="0"/>
+          </a:p>
+        </p:txBody>
+      </p:sp>
+      <p:pic>
+        <p:nvPicPr>
+          <p:cNvPr id="4" name="Picture 3" descr="AA042190.png"/>
+          <p:cNvPicPr>
+            <a:picLocks noChangeAspect="1"/>
+          </p:cNvPicPr>
+          <p:nvPr/>
+        </p:nvPicPr>
+        <p:blipFill>
+          <a:blip r:embed="rId2" cstate="print">
+            <a:extLst>
+              <a:ext uri="{28A0092B-C50C-407E-A947-70E740481C1C}">
+                <a14:useLocalDpi xmlns:a14="http://schemas.microsoft.com/office/drawing/2010/main" val="0"/>
+              </a:ext>
+            </a:extLst>
+          </a:blip>
+          <a:stretch>
+            <a:fillRect/>
+          </a:stretch>
+        </p:blipFill>
+        <p:spPr>
+          <a:xfrm>
+            <a:off x="7217834" y="349251"/>
+            <a:ext cx="1218522" cy="1854036"/>
+          </a:xfrm>
+          <a:prstGeom prst="rect">
+            <a:avLst/>
+          </a:prstGeom>
+        </p:spPr>
+      </p:pic>
     </p:spTree>
     <p:extLst>
       <p:ext uri="{BB962C8B-B14F-4D97-AF65-F5344CB8AC3E}">
-        <p14:creationId xmlns="" xmlns:p14="http://schemas.microsoft.com/office/powerpoint/2010/main" val="3206459144"/>
+        <p14:creationId xmlns:p14="http://schemas.microsoft.com/office/powerpoint/2010/main" val="3206459144"/>
       </p:ext>
     </p:extLst>
   </p:cSld>
@@ -6181,7 +6543,7 @@
   <p:timing>
     <p:tnLst>
       <p:par>
-        <p:cTn id="1" dur="indefinite" restart="never" nodeType="tmRoot"/>
+        <p:cTn xmlns:p14="http://schemas.microsoft.com/office/powerpoint/2010/main" id="1" dur="indefinite" restart="never" nodeType="tmRoot"/>
       </p:par>
     </p:tnLst>
   </p:timing>
@@ -6222,9 +6584,13 @@
           <a:p>
             <a:r>
               <a:rPr lang="en-US" dirty="0" smtClean="0"/>
-              <a:t>Lunch and Learn Series</a:t>
-            </a:r>
-            <a:endParaRPr lang="en-US" dirty="0"/>
+              <a:t>Introduction to Functional </a:t>
+            </a:r>
+            <a:r>
+              <a:rPr lang="en-US" sz="3200" dirty="0" smtClean="0"/>
+              <a:t>Programming</a:t>
+            </a:r>
+            <a:endParaRPr lang="en-US" sz="3200" dirty="0"/>
           </a:p>
         </p:txBody>
       </p:sp>
@@ -6240,137 +6606,35 @@
         </p:nvSpPr>
         <p:spPr/>
         <p:txBody>
-          <a:bodyPr/>
+          <a:bodyPr>
+            <a:normAutofit/>
+          </a:bodyPr>
           <a:lstStyle/>
           <a:p>
             <a:r>
               <a:rPr lang="en-US" dirty="0" smtClean="0"/>
-              <a:t>Today’s Agenda</a:t>
+              <a:t>How many in the audience today are familiar with functional programming?</a:t>
+            </a:r>
+          </a:p>
+          <a:p>
+            <a:r>
+              <a:rPr lang="en-US" dirty="0" smtClean="0"/>
+              <a:t>My definition:</a:t>
             </a:r>
           </a:p>
           <a:p>
             <a:pPr lvl="1"/>
             <a:r>
-              <a:rPr lang="en-US" dirty="0"/>
-              <a:t>A brief overview of functional programming with some basic examples in the Haskell programming language</a:t>
-            </a:r>
-            <a:r>
-              <a:rPr lang="en-US" dirty="0" smtClean="0"/>
-              <a:t>.</a:t>
-            </a:r>
-          </a:p>
-          <a:p>
-            <a:pPr lvl="1"/>
-            <a:r>
-              <a:rPr lang="en-US" dirty="0"/>
-              <a:t>Why FP is worth learning and how these lunch and learns are going to be a lot of fun</a:t>
-            </a:r>
-            <a:r>
-              <a:rPr lang="en-US" dirty="0" smtClean="0"/>
-              <a:t>!</a:t>
-            </a:r>
-          </a:p>
-          <a:p>
-            <a:pPr lvl="1"/>
-            <a:r>
-              <a:rPr lang="en-US" dirty="0" smtClean="0"/>
-              <a:t>But First!</a:t>
-            </a:r>
-          </a:p>
-          <a:p>
-            <a:pPr lvl="2"/>
-            <a:r>
-              <a:rPr lang="en-US" dirty="0" smtClean="0"/>
-              <a:t>How you can help by presenting your ideas and experiences with FP.</a:t>
-            </a:r>
-          </a:p>
-          <a:p>
-            <a:pPr lvl="2"/>
-            <a:endParaRPr lang="en-US" dirty="0"/>
-          </a:p>
-          <a:p>
-            <a:pPr lvl="2"/>
-            <a:r>
-              <a:rPr lang="en-US" dirty="0" smtClean="0"/>
-              <a:t>If you wish to present at a future session contact me:</a:t>
-            </a:r>
-          </a:p>
-          <a:p>
-            <a:pPr lvl="3"/>
-            <a:r>
-              <a:rPr lang="en-US" i="1" dirty="0" smtClean="0">
-                <a:solidFill>
-                  <a:schemeClr val="bg2">
-                    <a:lumMod val="50000"/>
-                  </a:schemeClr>
-                </a:solidFill>
-              </a:rPr>
-              <a:t>&lt;</a:t>
-            </a:r>
-            <a:r>
-              <a:rPr lang="en-US" i="1" dirty="0" err="1" smtClean="0">
-                <a:solidFill>
-                  <a:schemeClr val="bg2">
-                    <a:lumMod val="50000"/>
-                  </a:schemeClr>
-                </a:solidFill>
-              </a:rPr>
-              <a:t>chris.dunphy@sjrb.ca</a:t>
-            </a:r>
-            <a:r>
-              <a:rPr lang="en-US" i="1" dirty="0" smtClean="0">
-                <a:solidFill>
-                  <a:schemeClr val="bg2">
-                    <a:lumMod val="50000"/>
-                  </a:schemeClr>
-                </a:solidFill>
-              </a:rPr>
-              <a:t>&gt;</a:t>
-            </a:r>
-            <a:endParaRPr lang="en-US" i="1" dirty="0">
-              <a:solidFill>
-                <a:schemeClr val="bg2">
-                  <a:lumMod val="50000"/>
-                </a:schemeClr>
-              </a:solidFill>
-            </a:endParaRPr>
-          </a:p>
-        </p:txBody>
-      </p:sp>
-      <p:pic>
-        <p:nvPicPr>
-          <p:cNvPr id="8" name="Picture 7" descr="AA042190.png"/>
-          <p:cNvPicPr>
-            <a:picLocks noChangeAspect="1"/>
-          </p:cNvPicPr>
-          <p:nvPr/>
-        </p:nvPicPr>
-        <p:blipFill>
-          <a:blip r:embed="rId2" cstate="print">
-            <a:extLst>
-              <a:ext uri="{28A0092B-C50C-407E-A947-70E740481C1C}">
-                <a14:useLocalDpi xmlns="" xmlns:a14="http://schemas.microsoft.com/office/drawing/2010/main" val="0"/>
-              </a:ext>
-            </a:extLst>
-          </a:blip>
-          <a:stretch>
-            <a:fillRect/>
-          </a:stretch>
-        </p:blipFill>
-        <p:spPr>
-          <a:xfrm>
-            <a:off x="7217834" y="349251"/>
-            <a:ext cx="1218522" cy="1854036"/>
-          </a:xfrm>
-          <a:prstGeom prst="rect">
-            <a:avLst/>
-          </a:prstGeom>
-        </p:spPr>
-      </p:pic>
+              <a:rPr lang="en-US" i="1" dirty="0" smtClean="0"/>
+              <a:t>Functional programming is a method of software development that separates (and minimizes) the parts of the program that use side effects and mutable state (I/O for example) from pure functions which do not use mutable state at all.  FP also emphasizes the use of higher order functions to solve complex problems by building complex functions out of much simpler ones.</a:t>
+            </a:r>
+          </a:p>
+        </p:txBody>
+      </p:sp>
     </p:spTree>
     <p:extLst>
       <p:ext uri="{BB962C8B-B14F-4D97-AF65-F5344CB8AC3E}">
-        <p14:creationId xmlns="" xmlns:p14="http://schemas.microsoft.com/office/powerpoint/2010/main" val="885906404"/>
+        <p14:creationId xmlns:p14="http://schemas.microsoft.com/office/powerpoint/2010/main" val="311778715"/>
       </p:ext>
     </p:extLst>
   </p:cSld>
@@ -6380,637 +6644,7 @@
   <p:timing>
     <p:tnLst>
       <p:par>
-        <p:cTn id="1" dur="indefinite" restart="never" nodeType="tmRoot">
-          <p:childTnLst>
-            <p:seq concurrent="1" nextAc="seek">
-              <p:cTn id="2" dur="indefinite" nodeType="mainSeq">
-                <p:childTnLst>
-                  <p:par>
-                    <p:cTn id="3" fill="hold">
-                      <p:stCondLst>
-                        <p:cond delay="indefinite"/>
-                      </p:stCondLst>
-                      <p:childTnLst>
-                        <p:par>
-                          <p:cTn id="4" fill="hold">
-                            <p:stCondLst>
-                              <p:cond delay="0"/>
-                            </p:stCondLst>
-                            <p:childTnLst>
-                              <p:par>
-                                <p:cTn id="5" presetID="2" presetClass="entr" presetSubtype="8" fill="hold" nodeType="clickEffect">
-                                  <p:stCondLst>
-                                    <p:cond delay="0"/>
-                                  </p:stCondLst>
-                                  <p:childTnLst>
-                                    <p:set>
-                                      <p:cBhvr>
-                                        <p:cTn id="6" dur="1" fill="hold">
-                                          <p:stCondLst>
-                                            <p:cond delay="0"/>
-                                          </p:stCondLst>
-                                        </p:cTn>
-                                        <p:tgtEl>
-                                          <p:spTgt spid="3">
-                                            <p:txEl>
-                                              <p:pRg st="3" end="3"/>
-                                            </p:txEl>
-                                          </p:spTgt>
-                                        </p:tgtEl>
-                                        <p:attrNameLst>
-                                          <p:attrName>style.visibility</p:attrName>
-                                        </p:attrNameLst>
-                                      </p:cBhvr>
-                                      <p:to>
-                                        <p:strVal val="visible"/>
-                                      </p:to>
-                                    </p:set>
-                                    <p:anim calcmode="lin" valueType="num">
-                                      <p:cBhvr additive="base">
-                                        <p:cTn id="7" dur="500" fill="hold"/>
-                                        <p:tgtEl>
-                                          <p:spTgt spid="3">
-                                            <p:txEl>
-                                              <p:pRg st="3" end="3"/>
-                                            </p:txEl>
-                                          </p:spTgt>
-                                        </p:tgtEl>
-                                        <p:attrNameLst>
-                                          <p:attrName>ppt_x</p:attrName>
-                                        </p:attrNameLst>
-                                      </p:cBhvr>
-                                      <p:tavLst>
-                                        <p:tav tm="0">
-                                          <p:val>
-                                            <p:strVal val="0-#ppt_w/2"/>
-                                          </p:val>
-                                        </p:tav>
-                                        <p:tav tm="100000">
-                                          <p:val>
-                                            <p:strVal val="#ppt_x"/>
-                                          </p:val>
-                                        </p:tav>
-                                      </p:tavLst>
-                                    </p:anim>
-                                    <p:anim calcmode="lin" valueType="num">
-                                      <p:cBhvr additive="base">
-                                        <p:cTn id="8" dur="500" fill="hold"/>
-                                        <p:tgtEl>
-                                          <p:spTgt spid="3">
-                                            <p:txEl>
-                                              <p:pRg st="3" end="3"/>
-                                            </p:txEl>
-                                          </p:spTgt>
-                                        </p:tgtEl>
-                                        <p:attrNameLst>
-                                          <p:attrName>ppt_y</p:attrName>
-                                        </p:attrNameLst>
-                                      </p:cBhvr>
-                                      <p:tavLst>
-                                        <p:tav tm="0">
-                                          <p:val>
-                                            <p:strVal val="#ppt_y"/>
-                                          </p:val>
-                                        </p:tav>
-                                        <p:tav tm="100000">
-                                          <p:val>
-                                            <p:strVal val="#ppt_y"/>
-                                          </p:val>
-                                        </p:tav>
-                                      </p:tavLst>
-                                    </p:anim>
-                                  </p:childTnLst>
-                                </p:cTn>
-                              </p:par>
-                              <p:par>
-                                <p:cTn id="9" presetID="2" presetClass="entr" presetSubtype="8" fill="hold" nodeType="withEffect">
-                                  <p:stCondLst>
-                                    <p:cond delay="0"/>
-                                  </p:stCondLst>
-                                  <p:childTnLst>
-                                    <p:set>
-                                      <p:cBhvr>
-                                        <p:cTn id="10" dur="1" fill="hold">
-                                          <p:stCondLst>
-                                            <p:cond delay="0"/>
-                                          </p:stCondLst>
-                                        </p:cTn>
-                                        <p:tgtEl>
-                                          <p:spTgt spid="3">
-                                            <p:txEl>
-                                              <p:pRg st="4" end="4"/>
-                                            </p:txEl>
-                                          </p:spTgt>
-                                        </p:tgtEl>
-                                        <p:attrNameLst>
-                                          <p:attrName>style.visibility</p:attrName>
-                                        </p:attrNameLst>
-                                      </p:cBhvr>
-                                      <p:to>
-                                        <p:strVal val="visible"/>
-                                      </p:to>
-                                    </p:set>
-                                    <p:anim calcmode="lin" valueType="num">
-                                      <p:cBhvr additive="base">
-                                        <p:cTn id="11" dur="500" fill="hold"/>
-                                        <p:tgtEl>
-                                          <p:spTgt spid="3">
-                                            <p:txEl>
-                                              <p:pRg st="4" end="4"/>
-                                            </p:txEl>
-                                          </p:spTgt>
-                                        </p:tgtEl>
-                                        <p:attrNameLst>
-                                          <p:attrName>ppt_x</p:attrName>
-                                        </p:attrNameLst>
-                                      </p:cBhvr>
-                                      <p:tavLst>
-                                        <p:tav tm="0">
-                                          <p:val>
-                                            <p:strVal val="0-#ppt_w/2"/>
-                                          </p:val>
-                                        </p:tav>
-                                        <p:tav tm="100000">
-                                          <p:val>
-                                            <p:strVal val="#ppt_x"/>
-                                          </p:val>
-                                        </p:tav>
-                                      </p:tavLst>
-                                    </p:anim>
-                                    <p:anim calcmode="lin" valueType="num">
-                                      <p:cBhvr additive="base">
-                                        <p:cTn id="12" dur="500" fill="hold"/>
-                                        <p:tgtEl>
-                                          <p:spTgt spid="3">
-                                            <p:txEl>
-                                              <p:pRg st="4" end="4"/>
-                                            </p:txEl>
-                                          </p:spTgt>
-                                        </p:tgtEl>
-                                        <p:attrNameLst>
-                                          <p:attrName>ppt_y</p:attrName>
-                                        </p:attrNameLst>
-                                      </p:cBhvr>
-                                      <p:tavLst>
-                                        <p:tav tm="0">
-                                          <p:val>
-                                            <p:strVal val="#ppt_y"/>
-                                          </p:val>
-                                        </p:tav>
-                                        <p:tav tm="100000">
-                                          <p:val>
-                                            <p:strVal val="#ppt_y"/>
-                                          </p:val>
-                                        </p:tav>
-                                      </p:tavLst>
-                                    </p:anim>
-                                  </p:childTnLst>
-                                </p:cTn>
-                              </p:par>
-                              <p:par>
-                                <p:cTn id="13" presetID="2" presetClass="entr" presetSubtype="8" fill="hold" nodeType="withEffect">
-                                  <p:stCondLst>
-                                    <p:cond delay="0"/>
-                                  </p:stCondLst>
-                                  <p:childTnLst>
-                                    <p:set>
-                                      <p:cBhvr>
-                                        <p:cTn id="14" dur="1" fill="hold">
-                                          <p:stCondLst>
-                                            <p:cond delay="0"/>
-                                          </p:stCondLst>
-                                        </p:cTn>
-                                        <p:tgtEl>
-                                          <p:spTgt spid="3">
-                                            <p:txEl>
-                                              <p:pRg st="6" end="6"/>
-                                            </p:txEl>
-                                          </p:spTgt>
-                                        </p:tgtEl>
-                                        <p:attrNameLst>
-                                          <p:attrName>style.visibility</p:attrName>
-                                        </p:attrNameLst>
-                                      </p:cBhvr>
-                                      <p:to>
-                                        <p:strVal val="visible"/>
-                                      </p:to>
-                                    </p:set>
-                                    <p:anim calcmode="lin" valueType="num">
-                                      <p:cBhvr additive="base">
-                                        <p:cTn id="15" dur="500" fill="hold"/>
-                                        <p:tgtEl>
-                                          <p:spTgt spid="3">
-                                            <p:txEl>
-                                              <p:pRg st="6" end="6"/>
-                                            </p:txEl>
-                                          </p:spTgt>
-                                        </p:tgtEl>
-                                        <p:attrNameLst>
-                                          <p:attrName>ppt_x</p:attrName>
-                                        </p:attrNameLst>
-                                      </p:cBhvr>
-                                      <p:tavLst>
-                                        <p:tav tm="0">
-                                          <p:val>
-                                            <p:strVal val="0-#ppt_w/2"/>
-                                          </p:val>
-                                        </p:tav>
-                                        <p:tav tm="100000">
-                                          <p:val>
-                                            <p:strVal val="#ppt_x"/>
-                                          </p:val>
-                                        </p:tav>
-                                      </p:tavLst>
-                                    </p:anim>
-                                    <p:anim calcmode="lin" valueType="num">
-                                      <p:cBhvr additive="base">
-                                        <p:cTn id="16" dur="500" fill="hold"/>
-                                        <p:tgtEl>
-                                          <p:spTgt spid="3">
-                                            <p:txEl>
-                                              <p:pRg st="6" end="6"/>
-                                            </p:txEl>
-                                          </p:spTgt>
-                                        </p:tgtEl>
-                                        <p:attrNameLst>
-                                          <p:attrName>ppt_y</p:attrName>
-                                        </p:attrNameLst>
-                                      </p:cBhvr>
-                                      <p:tavLst>
-                                        <p:tav tm="0">
-                                          <p:val>
-                                            <p:strVal val="#ppt_y"/>
-                                          </p:val>
-                                        </p:tav>
-                                        <p:tav tm="100000">
-                                          <p:val>
-                                            <p:strVal val="#ppt_y"/>
-                                          </p:val>
-                                        </p:tav>
-                                      </p:tavLst>
-                                    </p:anim>
-                                  </p:childTnLst>
-                                </p:cTn>
-                              </p:par>
-                              <p:par>
-                                <p:cTn id="17" presetID="2" presetClass="entr" presetSubtype="8" fill="hold" nodeType="withEffect">
-                                  <p:stCondLst>
-                                    <p:cond delay="0"/>
-                                  </p:stCondLst>
-                                  <p:childTnLst>
-                                    <p:set>
-                                      <p:cBhvr>
-                                        <p:cTn id="18" dur="1" fill="hold">
-                                          <p:stCondLst>
-                                            <p:cond delay="0"/>
-                                          </p:stCondLst>
-                                        </p:cTn>
-                                        <p:tgtEl>
-                                          <p:spTgt spid="3">
-                                            <p:txEl>
-                                              <p:pRg st="7" end="7"/>
-                                            </p:txEl>
-                                          </p:spTgt>
-                                        </p:tgtEl>
-                                        <p:attrNameLst>
-                                          <p:attrName>style.visibility</p:attrName>
-                                        </p:attrNameLst>
-                                      </p:cBhvr>
-                                      <p:to>
-                                        <p:strVal val="visible"/>
-                                      </p:to>
-                                    </p:set>
-                                    <p:anim calcmode="lin" valueType="num">
-                                      <p:cBhvr additive="base">
-                                        <p:cTn id="19" dur="500" fill="hold"/>
-                                        <p:tgtEl>
-                                          <p:spTgt spid="3">
-                                            <p:txEl>
-                                              <p:pRg st="7" end="7"/>
-                                            </p:txEl>
-                                          </p:spTgt>
-                                        </p:tgtEl>
-                                        <p:attrNameLst>
-                                          <p:attrName>ppt_x</p:attrName>
-                                        </p:attrNameLst>
-                                      </p:cBhvr>
-                                      <p:tavLst>
-                                        <p:tav tm="0">
-                                          <p:val>
-                                            <p:strVal val="0-#ppt_w/2"/>
-                                          </p:val>
-                                        </p:tav>
-                                        <p:tav tm="100000">
-                                          <p:val>
-                                            <p:strVal val="#ppt_x"/>
-                                          </p:val>
-                                        </p:tav>
-                                      </p:tavLst>
-                                    </p:anim>
-                                    <p:anim calcmode="lin" valueType="num">
-                                      <p:cBhvr additive="base">
-                                        <p:cTn id="20" dur="500" fill="hold"/>
-                                        <p:tgtEl>
-                                          <p:spTgt spid="3">
-                                            <p:txEl>
-                                              <p:pRg st="7" end="7"/>
-                                            </p:txEl>
-                                          </p:spTgt>
-                                        </p:tgtEl>
-                                        <p:attrNameLst>
-                                          <p:attrName>ppt_y</p:attrName>
-                                        </p:attrNameLst>
-                                      </p:cBhvr>
-                                      <p:tavLst>
-                                        <p:tav tm="0">
-                                          <p:val>
-                                            <p:strVal val="#ppt_y"/>
-                                          </p:val>
-                                        </p:tav>
-                                        <p:tav tm="100000">
-                                          <p:val>
-                                            <p:strVal val="#ppt_y"/>
-                                          </p:val>
-                                        </p:tav>
-                                      </p:tavLst>
-                                    </p:anim>
-                                  </p:childTnLst>
-                                </p:cTn>
-                              </p:par>
-                            </p:childTnLst>
-                          </p:cTn>
-                        </p:par>
-                      </p:childTnLst>
-                    </p:cTn>
-                  </p:par>
-                </p:childTnLst>
-              </p:cTn>
-              <p:prevCondLst>
-                <p:cond evt="onPrev" delay="0">
-                  <p:tgtEl>
-                    <p:sldTgt/>
-                  </p:tgtEl>
-                </p:cond>
-              </p:prevCondLst>
-              <p:nextCondLst>
-                <p:cond evt="onNext" delay="0">
-                  <p:tgtEl>
-                    <p:sldTgt/>
-                  </p:tgtEl>
-                </p:cond>
-              </p:nextCondLst>
-            </p:seq>
-          </p:childTnLst>
-        </p:cTn>
-      </p:par>
-    </p:tnLst>
-  </p:timing>
-</p:sld>
-</file>
-
-<file path=ppt/slides/slide4.xml><?xml version="1.0" encoding="utf-8"?>
-<p:sld xmlns:a="http://schemas.openxmlformats.org/drawingml/2006/main" xmlns:r="http://schemas.openxmlformats.org/officeDocument/2006/relationships" xmlns:p="http://schemas.openxmlformats.org/presentationml/2006/main">
-  <p:cSld>
-    <p:spTree>
-      <p:nvGrpSpPr>
-        <p:cNvPr id="1" name=""/>
-        <p:cNvGrpSpPr/>
-        <p:nvPr/>
-      </p:nvGrpSpPr>
-      <p:grpSpPr>
-        <a:xfrm>
-          <a:off x="0" y="0"/>
-          <a:ext cx="0" cy="0"/>
-          <a:chOff x="0" y="0"/>
-          <a:chExt cx="0" cy="0"/>
-        </a:xfrm>
-      </p:grpSpPr>
-      <p:sp>
-        <p:nvSpPr>
-          <p:cNvPr id="2" name="Title 1"/>
-          <p:cNvSpPr>
-            <a:spLocks noGrp="1"/>
-          </p:cNvSpPr>
-          <p:nvPr>
-            <p:ph type="title"/>
-          </p:nvPr>
-        </p:nvSpPr>
-        <p:spPr/>
-        <p:txBody>
-          <a:bodyPr/>
-          <a:lstStyle/>
-          <a:p>
-            <a:r>
-              <a:rPr lang="en-US" dirty="0" smtClean="0"/>
-              <a:t>Topics for Future Sessions</a:t>
-            </a:r>
-            <a:endParaRPr lang="en-US" dirty="0"/>
-          </a:p>
-        </p:txBody>
-      </p:sp>
-      <p:sp>
-        <p:nvSpPr>
-          <p:cNvPr id="3" name="Content Placeholder 2"/>
-          <p:cNvSpPr>
-            <a:spLocks noGrp="1"/>
-          </p:cNvSpPr>
-          <p:nvPr>
-            <p:ph idx="1"/>
-          </p:nvPr>
-        </p:nvSpPr>
-        <p:spPr/>
-        <p:txBody>
-          <a:bodyPr/>
-          <a:lstStyle/>
-          <a:p>
-            <a:r>
-              <a:rPr lang="en-US" dirty="0" smtClean="0"/>
-              <a:t>Functional programming concepts and idioms</a:t>
-            </a:r>
-          </a:p>
-          <a:p>
-            <a:pPr lvl="1"/>
-            <a:r>
-              <a:rPr lang="en-US" dirty="0" smtClean="0"/>
-              <a:t>Higher order functions, currying, pattern matching, functional algorithms, monads, etc.</a:t>
-            </a:r>
-          </a:p>
-          <a:p>
-            <a:pPr lvl="1"/>
-            <a:r>
-              <a:rPr lang="en-US" dirty="0" smtClean="0"/>
-              <a:t>Actors and other functional approaches to concurrency.</a:t>
-            </a:r>
-          </a:p>
-          <a:p>
-            <a:r>
-              <a:rPr lang="en-US" dirty="0" smtClean="0"/>
-              <a:t>Functional programming languages</a:t>
-            </a:r>
-          </a:p>
-          <a:p>
-            <a:pPr lvl="1"/>
-            <a:r>
-              <a:rPr lang="en-US" dirty="0" smtClean="0"/>
-              <a:t>Any functional language!</a:t>
-            </a:r>
-          </a:p>
-          <a:p>
-            <a:pPr lvl="1"/>
-            <a:r>
-              <a:rPr lang="en-US" dirty="0" smtClean="0"/>
-              <a:t>Also, how functional concepts can help us write better programs in imperative languages like C#, C++, or Java.</a:t>
-            </a:r>
-          </a:p>
-          <a:p>
-            <a:r>
-              <a:rPr lang="en-US" dirty="0" smtClean="0"/>
-              <a:t>Demos, talks, or relevant videos on YouTube are all welcome!</a:t>
-            </a:r>
-          </a:p>
-        </p:txBody>
-      </p:sp>
-      <p:pic>
-        <p:nvPicPr>
-          <p:cNvPr id="3074" name="Picture 2" descr="C:\Users\cdunphy\AppData\Local\Microsoft\Windows\Temporary Internet Files\Content.IE5\5YFOUQSJ\MC900279226[1].wmf"/>
-          <p:cNvPicPr>
-            <a:picLocks noChangeAspect="1" noChangeArrowheads="1"/>
-          </p:cNvPicPr>
-          <p:nvPr/>
-        </p:nvPicPr>
-        <p:blipFill>
-          <a:blip r:embed="rId2" cstate="print"/>
-          <a:srcRect/>
-          <a:stretch>
-            <a:fillRect/>
-          </a:stretch>
-        </p:blipFill>
-        <p:spPr bwMode="auto">
-          <a:xfrm>
-            <a:off x="6859588" y="298450"/>
-            <a:ext cx="1520825" cy="1817688"/>
-          </a:xfrm>
-          <a:prstGeom prst="rect">
-            <a:avLst/>
-          </a:prstGeom>
-          <a:noFill/>
-        </p:spPr>
-      </p:pic>
-    </p:spTree>
-    <p:extLst>
-      <p:ext uri="{BB962C8B-B14F-4D97-AF65-F5344CB8AC3E}">
-        <p14:creationId xmlns="" xmlns:p14="http://schemas.microsoft.com/office/powerpoint/2010/main" val="2190666559"/>
-      </p:ext>
-    </p:extLst>
-  </p:cSld>
-  <p:clrMapOvr>
-    <a:masterClrMapping/>
-  </p:clrMapOvr>
-  <p:timing>
-    <p:tnLst>
-      <p:par>
-        <p:cTn id="1" dur="indefinite" restart="never" nodeType="tmRoot"/>
-      </p:par>
-    </p:tnLst>
-  </p:timing>
-</p:sld>
-</file>
-
-<file path=ppt/slides/slide5.xml><?xml version="1.0" encoding="utf-8"?>
-<p:sld xmlns:a="http://schemas.openxmlformats.org/drawingml/2006/main" xmlns:r="http://schemas.openxmlformats.org/officeDocument/2006/relationships" xmlns:p="http://schemas.openxmlformats.org/presentationml/2006/main">
-  <p:cSld>
-    <p:spTree>
-      <p:nvGrpSpPr>
-        <p:cNvPr id="1" name=""/>
-        <p:cNvGrpSpPr/>
-        <p:nvPr/>
-      </p:nvGrpSpPr>
-      <p:grpSpPr>
-        <a:xfrm>
-          <a:off x="0" y="0"/>
-          <a:ext cx="0" cy="0"/>
-          <a:chOff x="0" y="0"/>
-          <a:chExt cx="0" cy="0"/>
-        </a:xfrm>
-      </p:grpSpPr>
-      <p:sp>
-        <p:nvSpPr>
-          <p:cNvPr id="2" name="Title 1"/>
-          <p:cNvSpPr>
-            <a:spLocks noGrp="1"/>
-          </p:cNvSpPr>
-          <p:nvPr>
-            <p:ph type="title"/>
-          </p:nvPr>
-        </p:nvSpPr>
-        <p:spPr/>
-        <p:txBody>
-          <a:bodyPr/>
-          <a:lstStyle/>
-          <a:p>
-            <a:r>
-              <a:rPr lang="en-US" dirty="0" smtClean="0"/>
-              <a:t>Introduction to Functional </a:t>
-            </a:r>
-            <a:r>
-              <a:rPr lang="en-US" sz="3200" dirty="0" smtClean="0"/>
-              <a:t>Programming</a:t>
-            </a:r>
-            <a:endParaRPr lang="en-US" sz="3200" dirty="0"/>
-          </a:p>
-        </p:txBody>
-      </p:sp>
-      <p:sp>
-        <p:nvSpPr>
-          <p:cNvPr id="3" name="Content Placeholder 2"/>
-          <p:cNvSpPr>
-            <a:spLocks noGrp="1"/>
-          </p:cNvSpPr>
-          <p:nvPr>
-            <p:ph idx="1"/>
-          </p:nvPr>
-        </p:nvSpPr>
-        <p:spPr/>
-        <p:txBody>
-          <a:bodyPr>
-            <a:normAutofit/>
-          </a:bodyPr>
-          <a:lstStyle/>
-          <a:p>
-            <a:r>
-              <a:rPr lang="en-US" dirty="0" smtClean="0"/>
-              <a:t>How many in the audience today are familiar with functional programming?</a:t>
-            </a:r>
-          </a:p>
-          <a:p>
-            <a:r>
-              <a:rPr lang="en-US" dirty="0" smtClean="0"/>
-              <a:t>My definition:</a:t>
-            </a:r>
-          </a:p>
-          <a:p>
-            <a:pPr lvl="1"/>
-            <a:r>
-              <a:rPr lang="en-US" i="1" dirty="0" smtClean="0"/>
-              <a:t>Functional programming is a method of software development that separates (and minimizes) the parts of the program that use side effects and mutable state (I/O for example) from pure functions which do not use mutable state at all.  FP also emphasizes the use of higher order functions to solve complex problems by building complex functions out of much simpler ones.</a:t>
-            </a:r>
-          </a:p>
-        </p:txBody>
-      </p:sp>
-    </p:spTree>
-    <p:extLst>
-      <p:ext uri="{BB962C8B-B14F-4D97-AF65-F5344CB8AC3E}">
-        <p14:creationId xmlns="" xmlns:p14="http://schemas.microsoft.com/office/powerpoint/2010/main" val="311778715"/>
-      </p:ext>
-    </p:extLst>
-  </p:cSld>
-  <p:clrMapOvr>
-    <a:masterClrMapping/>
-  </p:clrMapOvr>
-  <p:timing>
-    <p:tnLst>
-      <p:par>
-        <p:cTn id="1" dur="indefinite" restart="never" nodeType="tmRoot">
+        <p:cTn xmlns:p14="http://schemas.microsoft.com/office/powerpoint/2010/main" id="1" dur="indefinite" restart="never" nodeType="tmRoot">
           <p:childTnLst>
             <p:seq concurrent="1" nextAc="seek">
               <p:cTn id="2" dur="indefinite" nodeType="mainSeq">
@@ -7228,7 +6862,7 @@
 </p:sld>
 </file>
 
-<file path=ppt/slides/slide6.xml><?xml version="1.0" encoding="utf-8"?>
+<file path=ppt/slides/slide4.xml><?xml version="1.0" encoding="utf-8"?>
 <p:sld xmlns:a="http://schemas.openxmlformats.org/drawingml/2006/main" xmlns:r="http://schemas.openxmlformats.org/officeDocument/2006/relationships" xmlns:p="http://schemas.openxmlformats.org/presentationml/2006/main">
   <p:cSld>
     <p:spTree>
@@ -7286,74 +6920,55 @@
         </p:spPr>
         <p:txBody>
           <a:bodyPr>
-            <a:normAutofit fontScale="70000" lnSpcReduction="20000"/>
+            <a:normAutofit/>
           </a:bodyPr>
           <a:lstStyle/>
           <a:p>
             <a:r>
-              <a:rPr lang="en-US" b="1" dirty="0" smtClean="0"/>
+              <a:rPr lang="en-US" sz="2800" b="1" dirty="0" smtClean="0"/>
               <a:t>Concurrency</a:t>
             </a:r>
           </a:p>
           <a:p>
-            <a:pPr lvl="1"/>
-            <a:r>
-              <a:rPr lang="en-US" dirty="0" smtClean="0"/>
-              <a:t>It turns out that eliminating mutable state from most of your program makes writing concurrent software much easier!</a:t>
-            </a:r>
-          </a:p>
-          <a:p>
-            <a:r>
-              <a:rPr lang="en-US" b="1" dirty="0" smtClean="0"/>
+            <a:r>
+              <a:rPr lang="en-US" sz="2800" b="1" dirty="0" smtClean="0"/>
               <a:t>Conciseness</a:t>
             </a:r>
-          </a:p>
-          <a:p>
-            <a:pPr lvl="1"/>
-            <a:r>
-              <a:rPr lang="en-US" dirty="0" smtClean="0"/>
-              <a:t>Functional programming tends to be very concise and extremely expressive.  Less code means less bugs and you often can often understand the programmer’s intent more easily.</a:t>
-            </a:r>
-          </a:p>
-          <a:p>
-            <a:r>
-              <a:rPr lang="en-US" b="1" dirty="0" smtClean="0"/>
+            <a:r>
+              <a:rPr lang="en-US" sz="2800" dirty="0" smtClean="0"/>
+              <a:t>.</a:t>
+            </a:r>
+            <a:endParaRPr lang="en-US" sz="2800" dirty="0" smtClean="0"/>
+          </a:p>
+          <a:p>
+            <a:r>
+              <a:rPr lang="en-US" sz="2800" b="1" dirty="0" smtClean="0"/>
               <a:t>Correctness</a:t>
             </a:r>
           </a:p>
           <a:p>
-            <a:pPr lvl="1"/>
-            <a:r>
-              <a:rPr lang="en-US" dirty="0" smtClean="0"/>
-              <a:t>Pure functions never change from underneath you.  They are easier to reason about and make your programs more predictable.  Pure functions have no side effects whatsoever.  FP separates the pure functions from the parts of the program which cannot be pure (I/O and stuff like that).</a:t>
-            </a:r>
-          </a:p>
-          <a:p>
-            <a:r>
-              <a:rPr lang="en-US" b="1" dirty="0" smtClean="0"/>
-              <a:t>It’s Different</a:t>
-            </a:r>
-          </a:p>
-          <a:p>
-            <a:pPr lvl="1"/>
-            <a:r>
-              <a:rPr lang="en-US" dirty="0" smtClean="0"/>
-              <a:t>If you are like me, you’ll like the fact that programming with FP is very different.  You have to approach things very differently.  This stretches your mind and helps you to approach your craft from a fresh angle.</a:t>
-            </a:r>
-          </a:p>
-          <a:p>
-            <a:r>
-              <a:rPr lang="en-US" b="1" dirty="0" smtClean="0"/>
-              <a:t>It’s Fun!</a:t>
-            </a:r>
-          </a:p>
-          <a:p>
-            <a:pPr lvl="1"/>
-            <a:r>
-              <a:rPr lang="en-US" dirty="0" smtClean="0"/>
-              <a:t>I haven’t had this much fun playing with code in a long time.</a:t>
-            </a:r>
-            <a:endParaRPr lang="en-US" dirty="0"/>
+            <a:r>
+              <a:rPr lang="en-US" sz="2800" b="1" dirty="0" smtClean="0"/>
+              <a:t>It’s </a:t>
+            </a:r>
+            <a:r>
+              <a:rPr lang="en-US" sz="2800" b="1" dirty="0" smtClean="0"/>
+              <a:t>Different</a:t>
+            </a:r>
+          </a:p>
+          <a:p>
+            <a:r>
+              <a:rPr lang="en-US" sz="2800" b="1" dirty="0" smtClean="0"/>
+              <a:t>It’s </a:t>
+            </a:r>
+            <a:r>
+              <a:rPr lang="en-US" sz="2800" b="1" dirty="0" smtClean="0"/>
+              <a:t>Fun</a:t>
+            </a:r>
+            <a:r>
+              <a:rPr lang="en-US" sz="2800" b="1" dirty="0" smtClean="0"/>
+              <a:t>!</a:t>
+            </a:r>
           </a:p>
         </p:txBody>
       </p:sp>
@@ -7386,7 +7001,7 @@
     </p:spTree>
     <p:extLst>
       <p:ext uri="{BB962C8B-B14F-4D97-AF65-F5344CB8AC3E}">
-        <p14:creationId xmlns="" xmlns:p14="http://schemas.microsoft.com/office/powerpoint/2010/main" val="67570856"/>
+        <p14:creationId xmlns:p14="http://schemas.microsoft.com/office/powerpoint/2010/main" val="67570856"/>
       </p:ext>
     </p:extLst>
   </p:cSld>
@@ -7396,14 +7011,14 @@
   <p:timing>
     <p:tnLst>
       <p:par>
-        <p:cTn id="1" dur="indefinite" restart="never" nodeType="tmRoot"/>
+        <p:cTn xmlns:p14="http://schemas.microsoft.com/office/powerpoint/2010/main" id="1" dur="indefinite" restart="never" nodeType="tmRoot"/>
       </p:par>
     </p:tnLst>
   </p:timing>
 </p:sld>
 </file>
 
-<file path=ppt/slides/slide7.xml><?xml version="1.0" encoding="utf-8"?>
+<file path=ppt/slides/slide5.xml><?xml version="1.0" encoding="utf-8"?>
 <p:sld xmlns:a="http://schemas.openxmlformats.org/drawingml/2006/main" xmlns:r="http://schemas.openxmlformats.org/officeDocument/2006/relationships" xmlns:p="http://schemas.openxmlformats.org/presentationml/2006/main">
   <p:cSld>
     <p:spTree>
@@ -7455,7 +7070,7 @@
           <a:blip r:embed="rId2" cstate="print">
             <a:extLst>
               <a:ext uri="{28A0092B-C50C-407E-A947-70E740481C1C}">
-                <a14:useLocalDpi xmlns="" xmlns:a14="http://schemas.microsoft.com/office/drawing/2010/main" val="0"/>
+                <a14:useLocalDpi xmlns:a14="http://schemas.microsoft.com/office/drawing/2010/main" val="0"/>
               </a:ext>
             </a:extLst>
           </a:blip>
@@ -7485,7 +7100,7 @@
           <a:blip r:embed="rId3" cstate="print">
             <a:extLst>
               <a:ext uri="{28A0092B-C50C-407E-A947-70E740481C1C}">
-                <a14:useLocalDpi xmlns="" xmlns:a14="http://schemas.microsoft.com/office/drawing/2010/main" val="0"/>
+                <a14:useLocalDpi xmlns:a14="http://schemas.microsoft.com/office/drawing/2010/main" val="0"/>
               </a:ext>
             </a:extLst>
           </a:blip>
@@ -7515,7 +7130,7 @@
           <a:blip r:embed="rId4" cstate="print">
             <a:extLst>
               <a:ext uri="{28A0092B-C50C-407E-A947-70E740481C1C}">
-                <a14:useLocalDpi xmlns="" xmlns:a14="http://schemas.microsoft.com/office/drawing/2010/main" val="0"/>
+                <a14:useLocalDpi xmlns:a14="http://schemas.microsoft.com/office/drawing/2010/main" val="0"/>
               </a:ext>
             </a:extLst>
           </a:blip>
@@ -7545,7 +7160,7 @@
           <a:blip r:embed="rId5" cstate="print">
             <a:extLst>
               <a:ext uri="{28A0092B-C50C-407E-A947-70E740481C1C}">
-                <a14:useLocalDpi xmlns="" xmlns:a14="http://schemas.microsoft.com/office/drawing/2010/main" val="0"/>
+                <a14:useLocalDpi xmlns:a14="http://schemas.microsoft.com/office/drawing/2010/main" val="0"/>
               </a:ext>
             </a:extLst>
           </a:blip>
@@ -7575,7 +7190,7 @@
           <a:blip r:embed="rId6" cstate="print">
             <a:extLst>
               <a:ext uri="{28A0092B-C50C-407E-A947-70E740481C1C}">
-                <a14:useLocalDpi xmlns="" xmlns:a14="http://schemas.microsoft.com/office/drawing/2010/main" val="0"/>
+                <a14:useLocalDpi xmlns:a14="http://schemas.microsoft.com/office/drawing/2010/main" val="0"/>
               </a:ext>
             </a:extLst>
           </a:blip>
@@ -7697,7 +7312,7 @@
     </p:spTree>
     <p:extLst>
       <p:ext uri="{BB962C8B-B14F-4D97-AF65-F5344CB8AC3E}">
-        <p14:creationId xmlns="" xmlns:p14="http://schemas.microsoft.com/office/powerpoint/2010/main" val="3380746537"/>
+        <p14:creationId xmlns:p14="http://schemas.microsoft.com/office/powerpoint/2010/main" val="3380746537"/>
       </p:ext>
     </p:extLst>
   </p:cSld>
@@ -7707,14 +7322,14 @@
   <p:timing>
     <p:tnLst>
       <p:par>
-        <p:cTn id="1" dur="indefinite" restart="never" nodeType="tmRoot"/>
+        <p:cTn xmlns:p14="http://schemas.microsoft.com/office/powerpoint/2010/main" id="1" dur="indefinite" restart="never" nodeType="tmRoot"/>
       </p:par>
     </p:tnLst>
   </p:timing>
 </p:sld>
 </file>
 
-<file path=ppt/slides/slide8.xml><?xml version="1.0" encoding="utf-8"?>
+<file path=ppt/slides/slide6.xml><?xml version="1.0" encoding="utf-8"?>
 <p:sld xmlns:a="http://schemas.openxmlformats.org/drawingml/2006/main" xmlns:r="http://schemas.openxmlformats.org/officeDocument/2006/relationships" xmlns:p="http://schemas.openxmlformats.org/presentationml/2006/main">
   <p:cSld>
     <p:spTree>
@@ -7877,7 +7492,7 @@
     </p:spTree>
     <p:extLst>
       <p:ext uri="{BB962C8B-B14F-4D97-AF65-F5344CB8AC3E}">
-        <p14:creationId xmlns="" xmlns:p14="http://schemas.microsoft.com/office/powerpoint/2010/main" val="3380746537"/>
+        <p14:creationId xmlns:p14="http://schemas.microsoft.com/office/powerpoint/2010/main" val="3380746537"/>
       </p:ext>
     </p:extLst>
   </p:cSld>
@@ -7887,7 +7502,228 @@
   <p:timing>
     <p:tnLst>
       <p:par>
-        <p:cTn id="1" dur="indefinite" restart="never" nodeType="tmRoot"/>
+        <p:cTn xmlns:p14="http://schemas.microsoft.com/office/powerpoint/2010/main" id="1" dur="indefinite" restart="never" nodeType="tmRoot"/>
+      </p:par>
+    </p:tnLst>
+  </p:timing>
+</p:sld>
+</file>
+
+<file path=ppt/slides/slide7.xml><?xml version="1.0" encoding="utf-8"?>
+<p:sld xmlns:a="http://schemas.openxmlformats.org/drawingml/2006/main" xmlns:r="http://schemas.openxmlformats.org/officeDocument/2006/relationships" xmlns:p="http://schemas.openxmlformats.org/presentationml/2006/main">
+  <p:cSld>
+    <p:spTree>
+      <p:nvGrpSpPr>
+        <p:cNvPr id="1" name=""/>
+        <p:cNvGrpSpPr/>
+        <p:nvPr/>
+      </p:nvGrpSpPr>
+      <p:grpSpPr>
+        <a:xfrm>
+          <a:off x="0" y="0"/>
+          <a:ext cx="0" cy="0"/>
+          <a:chOff x="0" y="0"/>
+          <a:chExt cx="0" cy="0"/>
+        </a:xfrm>
+      </p:grpSpPr>
+      <p:sp>
+        <p:nvSpPr>
+          <p:cNvPr id="2" name="Title 1"/>
+          <p:cNvSpPr>
+            <a:spLocks noGrp="1"/>
+          </p:cNvSpPr>
+          <p:nvPr>
+            <p:ph type="title"/>
+          </p:nvPr>
+        </p:nvSpPr>
+        <p:spPr/>
+        <p:txBody>
+          <a:bodyPr/>
+          <a:lstStyle/>
+          <a:p>
+            <a:r>
+              <a:rPr lang="en-US" dirty="0" smtClean="0"/>
+              <a:t>Quick Overview of FP Using Haskell</a:t>
+            </a:r>
+            <a:endParaRPr lang="en-US" dirty="0"/>
+          </a:p>
+        </p:txBody>
+      </p:sp>
+      <p:sp>
+        <p:nvSpPr>
+          <p:cNvPr id="3" name="Content Placeholder 2"/>
+          <p:cNvSpPr>
+            <a:spLocks noGrp="1"/>
+          </p:cNvSpPr>
+          <p:nvPr>
+            <p:ph idx="1"/>
+          </p:nvPr>
+        </p:nvSpPr>
+        <p:spPr/>
+        <p:txBody>
+          <a:bodyPr/>
+          <a:lstStyle/>
+          <a:p>
+            <a:r>
+              <a:rPr lang="en-US" dirty="0" smtClean="0"/>
+              <a:t>Immutable state</a:t>
+            </a:r>
+          </a:p>
+          <a:p>
+            <a:r>
+              <a:rPr lang="en-US" dirty="0" smtClean="0"/>
+              <a:t>Recursion</a:t>
+            </a:r>
+          </a:p>
+          <a:p>
+            <a:r>
+              <a:rPr lang="en-US" dirty="0" smtClean="0"/>
+              <a:t>Higher order functions</a:t>
+            </a:r>
+          </a:p>
+          <a:p>
+            <a:r>
+              <a:rPr lang="en-US" dirty="0" smtClean="0"/>
+              <a:t>Currying</a:t>
+            </a:r>
+          </a:p>
+          <a:p>
+            <a:r>
+              <a:rPr lang="en-US" dirty="0" smtClean="0"/>
+              <a:t>Pattern Matching</a:t>
+            </a:r>
+          </a:p>
+          <a:p>
+            <a:r>
+              <a:rPr lang="en-US" dirty="0" smtClean="0"/>
+              <a:t>Working with immutable lists.</a:t>
+            </a:r>
+          </a:p>
+          <a:p>
+            <a:endParaRPr lang="en-US" dirty="0" smtClean="0"/>
+          </a:p>
+          <a:p>
+            <a:endParaRPr lang="en-US" dirty="0"/>
+          </a:p>
+        </p:txBody>
+      </p:sp>
+    </p:spTree>
+    <p:extLst>
+      <p:ext uri="{BB962C8B-B14F-4D97-AF65-F5344CB8AC3E}">
+        <p14:creationId xmlns:p14="http://schemas.microsoft.com/office/powerpoint/2010/main" val="1963701257"/>
+      </p:ext>
+    </p:extLst>
+  </p:cSld>
+  <p:clrMapOvr>
+    <a:masterClrMapping/>
+  </p:clrMapOvr>
+  <p:timing>
+    <p:tnLst>
+      <p:par>
+        <p:cTn xmlns:p14="http://schemas.microsoft.com/office/powerpoint/2010/main" id="1" dur="indefinite" restart="never" nodeType="tmRoot"/>
+      </p:par>
+    </p:tnLst>
+  </p:timing>
+</p:sld>
+</file>
+
+<file path=ppt/slides/slide8.xml><?xml version="1.0" encoding="utf-8"?>
+<p:sld xmlns:a="http://schemas.openxmlformats.org/drawingml/2006/main" xmlns:r="http://schemas.openxmlformats.org/officeDocument/2006/relationships" xmlns:p="http://schemas.openxmlformats.org/presentationml/2006/main">
+  <p:cSld>
+    <p:spTree>
+      <p:nvGrpSpPr>
+        <p:cNvPr id="1" name=""/>
+        <p:cNvGrpSpPr/>
+        <p:nvPr/>
+      </p:nvGrpSpPr>
+      <p:grpSpPr>
+        <a:xfrm>
+          <a:off x="0" y="0"/>
+          <a:ext cx="0" cy="0"/>
+          <a:chOff x="0" y="0"/>
+          <a:chExt cx="0" cy="0"/>
+        </a:xfrm>
+      </p:grpSpPr>
+      <p:sp>
+        <p:nvSpPr>
+          <p:cNvPr id="2" name="Title 1"/>
+          <p:cNvSpPr>
+            <a:spLocks noGrp="1"/>
+          </p:cNvSpPr>
+          <p:nvPr>
+            <p:ph type="title"/>
+          </p:nvPr>
+        </p:nvSpPr>
+        <p:spPr/>
+        <p:txBody>
+          <a:bodyPr/>
+          <a:lstStyle/>
+          <a:p>
+            <a:r>
+              <a:rPr lang="en-US" dirty="0" smtClean="0"/>
+              <a:t>Interesting facts about Haskell</a:t>
+            </a:r>
+            <a:endParaRPr lang="en-US" dirty="0"/>
+          </a:p>
+        </p:txBody>
+      </p:sp>
+      <p:sp>
+        <p:nvSpPr>
+          <p:cNvPr id="3" name="Content Placeholder 2"/>
+          <p:cNvSpPr>
+            <a:spLocks noGrp="1"/>
+          </p:cNvSpPr>
+          <p:nvPr>
+            <p:ph idx="1"/>
+          </p:nvPr>
+        </p:nvSpPr>
+        <p:spPr/>
+        <p:txBody>
+          <a:bodyPr>
+            <a:normAutofit/>
+          </a:bodyPr>
+          <a:lstStyle/>
+          <a:p>
+            <a:r>
+              <a:rPr lang="en-US" dirty="0" smtClean="0"/>
+              <a:t>Haskell is statically typed, but because its type inference is so powerful you almost never have to type the types!</a:t>
+            </a:r>
+          </a:p>
+          <a:p>
+            <a:r>
+              <a:rPr lang="en-US" dirty="0" smtClean="0"/>
+              <a:t>Haskell has lazy evaluation which is really neat (e.g. give me the first 10 elements of an infinite list)</a:t>
+            </a:r>
+          </a:p>
+          <a:p>
+            <a:r>
+              <a:rPr lang="en-US" dirty="0" smtClean="0"/>
+              <a:t>Haskell is pretty fast.  Close to Java, certainly faster than dynamic languages like Python or Ruby.  It compiles to machine code like C or C++.  The compiler is seeing a lot of improvements lately as interest grows.</a:t>
+            </a:r>
+          </a:p>
+          <a:p>
+            <a:r>
+              <a:rPr lang="en-US" dirty="0" smtClean="0"/>
+              <a:t>Haskell also has a REPL that allows you to play with the language easily and try new things.</a:t>
+            </a:r>
+          </a:p>
+          <a:p>
+            <a:endParaRPr lang="en-US" dirty="0" smtClean="0"/>
+          </a:p>
+          <a:p>
+            <a:endParaRPr lang="en-US" dirty="0"/>
+          </a:p>
+        </p:txBody>
+      </p:sp>
+    </p:spTree>
+  </p:cSld>
+  <p:clrMapOvr>
+    <a:masterClrMapping/>
+  </p:clrMapOvr>
+  <p:timing>
+    <p:tnLst>
+      <p:par>
+        <p:cTn xmlns:p14="http://schemas.microsoft.com/office/powerpoint/2010/main" id="1" dur="indefinite" restart="never" nodeType="tmRoot"/>
       </p:par>
     </p:tnLst>
   </p:timing>
@@ -7928,79 +7764,182 @@
           <a:p>
             <a:r>
               <a:rPr lang="en-US" dirty="0" smtClean="0"/>
-              <a:t>Quick Overview of </a:t>
-            </a:r>
+              <a:t>Want to try Haskell?</a:t>
+            </a:r>
+            <a:endParaRPr lang="en-US" dirty="0"/>
+          </a:p>
+        </p:txBody>
+      </p:sp>
+      <p:sp>
+        <p:nvSpPr>
+          <p:cNvPr id="3" name="Content Placeholder 2"/>
+          <p:cNvSpPr>
+            <a:spLocks noGrp="1"/>
+          </p:cNvSpPr>
+          <p:nvPr>
+            <p:ph idx="1"/>
+          </p:nvPr>
+        </p:nvSpPr>
+        <p:spPr/>
+        <p:txBody>
+          <a:bodyPr>
+            <a:normAutofit/>
+          </a:bodyPr>
+          <a:lstStyle/>
+          <a:p>
             <a:r>
               <a:rPr lang="en-US" dirty="0" smtClean="0"/>
-              <a:t>FP Using Haskell</a:t>
-            </a:r>
-            <a:endParaRPr lang="en-US" dirty="0"/>
-          </a:p>
-        </p:txBody>
-      </p:sp>
-      <p:sp>
-        <p:nvSpPr>
-          <p:cNvPr id="3" name="Content Placeholder 2"/>
-          <p:cNvSpPr>
-            <a:spLocks noGrp="1"/>
-          </p:cNvSpPr>
-          <p:nvPr>
-            <p:ph idx="1"/>
-          </p:nvPr>
-        </p:nvSpPr>
-        <p:spPr/>
-        <p:txBody>
-          <a:bodyPr/>
-          <a:lstStyle/>
-          <a:p>
+              <a:t>Free eBooks!</a:t>
+            </a:r>
+          </a:p>
+          <a:p>
+            <a:pPr lvl="1"/>
             <a:r>
               <a:rPr lang="en-US" dirty="0" smtClean="0"/>
-              <a:t>Immutable state</a:t>
-            </a:r>
-          </a:p>
-          <a:p>
+              <a:t>Learn you a Haskell for Great Good!</a:t>
+            </a:r>
+          </a:p>
+          <a:p>
+            <a:pPr lvl="2"/>
+            <a:r>
+              <a:rPr lang="en-US" dirty="0">
+                <a:solidFill>
+                  <a:srgbClr val="FF0000"/>
+                </a:solidFill>
+                <a:hlinkClick r:id="rId2"/>
+              </a:rPr>
+              <a:t>http://learnyouahaskell.com/</a:t>
+            </a:r>
+            <a:r>
+              <a:rPr lang="en-US" dirty="0" smtClean="0">
+                <a:solidFill>
+                  <a:srgbClr val="FF0000"/>
+                </a:solidFill>
+                <a:hlinkClick r:id="rId2"/>
+              </a:rPr>
+              <a:t>chapters</a:t>
+            </a:r>
+            <a:endParaRPr lang="en-US" dirty="0" smtClean="0">
+              <a:solidFill>
+                <a:srgbClr val="FF0000"/>
+              </a:solidFill>
+            </a:endParaRPr>
+          </a:p>
+          <a:p>
+            <a:pPr lvl="1"/>
             <a:r>
               <a:rPr lang="en-US" dirty="0" smtClean="0"/>
-              <a:t>Recursion</a:t>
-            </a:r>
+              <a:t>Real World Haskell</a:t>
+            </a:r>
+          </a:p>
+          <a:p>
+            <a:pPr lvl="2"/>
+            <a:r>
+              <a:rPr lang="en-US" dirty="0">
+                <a:hlinkClick r:id="rId3"/>
+              </a:rPr>
+              <a:t>http://book.realworldhaskell.org/read</a:t>
+            </a:r>
+            <a:r>
+              <a:rPr lang="en-US" dirty="0" smtClean="0">
+                <a:hlinkClick r:id="rId3"/>
+              </a:rPr>
+              <a:t>/</a:t>
+            </a:r>
+            <a:endParaRPr lang="en-US" dirty="0" smtClean="0"/>
           </a:p>
           <a:p>
             <a:r>
               <a:rPr lang="en-US" dirty="0" smtClean="0"/>
-              <a:t>Higher order functions</a:t>
-            </a:r>
-          </a:p>
-          <a:p>
-            <a:r>
-              <a:rPr lang="en-US" dirty="0" smtClean="0"/>
-              <a:t>Currying</a:t>
-            </a:r>
-          </a:p>
-          <a:p>
-            <a:r>
-              <a:rPr lang="en-US" dirty="0" smtClean="0"/>
-              <a:t>Pattern Matching</a:t>
-            </a:r>
-          </a:p>
-          <a:p>
-            <a:r>
-              <a:rPr lang="en-US" dirty="0" smtClean="0"/>
-              <a:t>Working with immutable lists.</a:t>
+              <a:t>Cool video introduction (Google Tech Talk): </a:t>
+            </a:r>
+          </a:p>
+          <a:p>
+            <a:pPr lvl="2"/>
+            <a:r>
+              <a:rPr lang="en-US" dirty="0" smtClean="0">
+                <a:hlinkClick r:id="rId4"/>
+              </a:rPr>
+              <a:t>http</a:t>
+            </a:r>
+            <a:r>
+              <a:rPr lang="en-US" dirty="0">
+                <a:hlinkClick r:id="rId4"/>
+              </a:rPr>
+              <a:t>://</a:t>
+            </a:r>
+            <a:r>
+              <a:rPr lang="en-US" dirty="0" smtClean="0">
+                <a:hlinkClick r:id="rId4"/>
+              </a:rPr>
+              <a:t>www.youtube.com/watch?v=b9FagOVqxmI</a:t>
             </a:r>
             <a:endParaRPr lang="en-US" dirty="0" smtClean="0"/>
           </a:p>
-          <a:p>
-            <a:endParaRPr lang="en-US" dirty="0" smtClean="0"/>
-          </a:p>
-          <a:p>
-            <a:endParaRPr lang="en-US" dirty="0"/>
-          </a:p>
-        </p:txBody>
-      </p:sp>
+        </p:txBody>
+      </p:sp>
+      <p:pic>
+        <p:nvPicPr>
+          <p:cNvPr id="5" name="Picture 4" descr="lrg.jpg"/>
+          <p:cNvPicPr>
+            <a:picLocks noChangeAspect="1"/>
+          </p:cNvPicPr>
+          <p:nvPr/>
+        </p:nvPicPr>
+        <p:blipFill>
+          <a:blip r:embed="rId5" cstate="print"/>
+          <a:stretch>
+            <a:fillRect/>
+          </a:stretch>
+        </p:blipFill>
+        <p:spPr>
+          <a:xfrm>
+            <a:off x="6749687" y="2729702"/>
+            <a:ext cx="1524000" cy="1999488"/>
+          </a:xfrm>
+          <a:prstGeom prst="rect">
+            <a:avLst/>
+          </a:prstGeom>
+          <a:ln w="6350">
+            <a:solidFill>
+              <a:schemeClr val="tx1"/>
+            </a:solidFill>
+          </a:ln>
+        </p:spPr>
+      </p:pic>
+      <p:pic>
+        <p:nvPicPr>
+          <p:cNvPr id="6" name="Picture 5" descr="lyah.png"/>
+          <p:cNvPicPr>
+            <a:picLocks noChangeAspect="1"/>
+          </p:cNvPicPr>
+          <p:nvPr/>
+        </p:nvPicPr>
+        <p:blipFill>
+          <a:blip r:embed="rId6" cstate="print"/>
+          <a:stretch>
+            <a:fillRect/>
+          </a:stretch>
+        </p:blipFill>
+        <p:spPr>
+          <a:xfrm>
+            <a:off x="6749687" y="393677"/>
+            <a:ext cx="1524000" cy="2011881"/>
+          </a:xfrm>
+          <a:prstGeom prst="rect">
+            <a:avLst/>
+          </a:prstGeom>
+          <a:ln w="6350">
+            <a:solidFill>
+              <a:schemeClr val="tx1"/>
+            </a:solidFill>
+          </a:ln>
+        </p:spPr>
+      </p:pic>
     </p:spTree>
     <p:extLst>
       <p:ext uri="{BB962C8B-B14F-4D97-AF65-F5344CB8AC3E}">
-        <p14:creationId xmlns="" xmlns:p14="http://schemas.microsoft.com/office/powerpoint/2010/main" val="1963701257"/>
+        <p14:creationId xmlns:p14="http://schemas.microsoft.com/office/powerpoint/2010/main" val="2526408885"/>
       </p:ext>
     </p:extLst>
   </p:cSld>
@@ -8010,653 +7949,9 @@
   <p:timing>
     <p:tnLst>
       <p:par>
-        <p:cTn id="1" dur="indefinite" restart="never" nodeType="tmRoot">
-          <p:childTnLst>
-            <p:seq concurrent="1" nextAc="seek">
-              <p:cTn id="2" dur="indefinite" nodeType="mainSeq">
-                <p:childTnLst>
-                  <p:par>
-                    <p:cTn id="3" fill="hold">
-                      <p:stCondLst>
-                        <p:cond delay="indefinite"/>
-                      </p:stCondLst>
-                      <p:childTnLst>
-                        <p:par>
-                          <p:cTn id="4" fill="hold">
-                            <p:stCondLst>
-                              <p:cond delay="0"/>
-                            </p:stCondLst>
-                            <p:childTnLst>
-                              <p:par>
-                                <p:cTn id="5" presetID="2" presetClass="entr" presetSubtype="4" fill="hold" grpId="0" nodeType="clickEffect">
-                                  <p:stCondLst>
-                                    <p:cond delay="0"/>
-                                  </p:stCondLst>
-                                  <p:childTnLst>
-                                    <p:set>
-                                      <p:cBhvr>
-                                        <p:cTn id="6" dur="1" fill="hold">
-                                          <p:stCondLst>
-                                            <p:cond delay="0"/>
-                                          </p:stCondLst>
-                                        </p:cTn>
-                                        <p:tgtEl>
-                                          <p:spTgt spid="3">
-                                            <p:txEl>
-                                              <p:pRg st="0" end="0"/>
-                                            </p:txEl>
-                                          </p:spTgt>
-                                        </p:tgtEl>
-                                        <p:attrNameLst>
-                                          <p:attrName>style.visibility</p:attrName>
-                                        </p:attrNameLst>
-                                      </p:cBhvr>
-                                      <p:to>
-                                        <p:strVal val="visible"/>
-                                      </p:to>
-                                    </p:set>
-                                    <p:anim calcmode="lin" valueType="num">
-                                      <p:cBhvr additive="base">
-                                        <p:cTn id="7" dur="500" fill="hold"/>
-                                        <p:tgtEl>
-                                          <p:spTgt spid="3">
-                                            <p:txEl>
-                                              <p:pRg st="0" end="0"/>
-                                            </p:txEl>
-                                          </p:spTgt>
-                                        </p:tgtEl>
-                                        <p:attrNameLst>
-                                          <p:attrName>ppt_x</p:attrName>
-                                        </p:attrNameLst>
-                                      </p:cBhvr>
-                                      <p:tavLst>
-                                        <p:tav tm="0">
-                                          <p:val>
-                                            <p:strVal val="#ppt_x"/>
-                                          </p:val>
-                                        </p:tav>
-                                        <p:tav tm="100000">
-                                          <p:val>
-                                            <p:strVal val="#ppt_x"/>
-                                          </p:val>
-                                        </p:tav>
-                                      </p:tavLst>
-                                    </p:anim>
-                                    <p:anim calcmode="lin" valueType="num">
-                                      <p:cBhvr additive="base">
-                                        <p:cTn id="8" dur="500" fill="hold"/>
-                                        <p:tgtEl>
-                                          <p:spTgt spid="3">
-                                            <p:txEl>
-                                              <p:pRg st="0" end="0"/>
-                                            </p:txEl>
-                                          </p:spTgt>
-                                        </p:tgtEl>
-                                        <p:attrNameLst>
-                                          <p:attrName>ppt_y</p:attrName>
-                                        </p:attrNameLst>
-                                      </p:cBhvr>
-                                      <p:tavLst>
-                                        <p:tav tm="0">
-                                          <p:val>
-                                            <p:strVal val="1+#ppt_h/2"/>
-                                          </p:val>
-                                        </p:tav>
-                                        <p:tav tm="100000">
-                                          <p:val>
-                                            <p:strVal val="#ppt_y"/>
-                                          </p:val>
-                                        </p:tav>
-                                      </p:tavLst>
-                                    </p:anim>
-                                  </p:childTnLst>
-                                </p:cTn>
-                              </p:par>
-                            </p:childTnLst>
-                          </p:cTn>
-                        </p:par>
-                      </p:childTnLst>
-                    </p:cTn>
-                  </p:par>
-                  <p:par>
-                    <p:cTn id="9" fill="hold">
-                      <p:stCondLst>
-                        <p:cond delay="indefinite"/>
-                      </p:stCondLst>
-                      <p:childTnLst>
-                        <p:par>
-                          <p:cTn id="10" fill="hold">
-                            <p:stCondLst>
-                              <p:cond delay="0"/>
-                            </p:stCondLst>
-                            <p:childTnLst>
-                              <p:par>
-                                <p:cTn id="11" presetID="2" presetClass="entr" presetSubtype="4" fill="hold" grpId="0" nodeType="clickEffect">
-                                  <p:stCondLst>
-                                    <p:cond delay="0"/>
-                                  </p:stCondLst>
-                                  <p:childTnLst>
-                                    <p:set>
-                                      <p:cBhvr>
-                                        <p:cTn id="12" dur="1" fill="hold">
-                                          <p:stCondLst>
-                                            <p:cond delay="0"/>
-                                          </p:stCondLst>
-                                        </p:cTn>
-                                        <p:tgtEl>
-                                          <p:spTgt spid="3">
-                                            <p:txEl>
-                                              <p:pRg st="1" end="1"/>
-                                            </p:txEl>
-                                          </p:spTgt>
-                                        </p:tgtEl>
-                                        <p:attrNameLst>
-                                          <p:attrName>style.visibility</p:attrName>
-                                        </p:attrNameLst>
-                                      </p:cBhvr>
-                                      <p:to>
-                                        <p:strVal val="visible"/>
-                                      </p:to>
-                                    </p:set>
-                                    <p:anim calcmode="lin" valueType="num">
-                                      <p:cBhvr additive="base">
-                                        <p:cTn id="13" dur="500" fill="hold"/>
-                                        <p:tgtEl>
-                                          <p:spTgt spid="3">
-                                            <p:txEl>
-                                              <p:pRg st="1" end="1"/>
-                                            </p:txEl>
-                                          </p:spTgt>
-                                        </p:tgtEl>
-                                        <p:attrNameLst>
-                                          <p:attrName>ppt_x</p:attrName>
-                                        </p:attrNameLst>
-                                      </p:cBhvr>
-                                      <p:tavLst>
-                                        <p:tav tm="0">
-                                          <p:val>
-                                            <p:strVal val="#ppt_x"/>
-                                          </p:val>
-                                        </p:tav>
-                                        <p:tav tm="100000">
-                                          <p:val>
-                                            <p:strVal val="#ppt_x"/>
-                                          </p:val>
-                                        </p:tav>
-                                      </p:tavLst>
-                                    </p:anim>
-                                    <p:anim calcmode="lin" valueType="num">
-                                      <p:cBhvr additive="base">
-                                        <p:cTn id="14" dur="500" fill="hold"/>
-                                        <p:tgtEl>
-                                          <p:spTgt spid="3">
-                                            <p:txEl>
-                                              <p:pRg st="1" end="1"/>
-                                            </p:txEl>
-                                          </p:spTgt>
-                                        </p:tgtEl>
-                                        <p:attrNameLst>
-                                          <p:attrName>ppt_y</p:attrName>
-                                        </p:attrNameLst>
-                                      </p:cBhvr>
-                                      <p:tavLst>
-                                        <p:tav tm="0">
-                                          <p:val>
-                                            <p:strVal val="1+#ppt_h/2"/>
-                                          </p:val>
-                                        </p:tav>
-                                        <p:tav tm="100000">
-                                          <p:val>
-                                            <p:strVal val="#ppt_y"/>
-                                          </p:val>
-                                        </p:tav>
-                                      </p:tavLst>
-                                    </p:anim>
-                                  </p:childTnLst>
-                                </p:cTn>
-                              </p:par>
-                            </p:childTnLst>
-                          </p:cTn>
-                        </p:par>
-                      </p:childTnLst>
-                    </p:cTn>
-                  </p:par>
-                  <p:par>
-                    <p:cTn id="15" fill="hold">
-                      <p:stCondLst>
-                        <p:cond delay="indefinite"/>
-                      </p:stCondLst>
-                      <p:childTnLst>
-                        <p:par>
-                          <p:cTn id="16" fill="hold">
-                            <p:stCondLst>
-                              <p:cond delay="0"/>
-                            </p:stCondLst>
-                            <p:childTnLst>
-                              <p:par>
-                                <p:cTn id="17" presetID="2" presetClass="entr" presetSubtype="4" fill="hold" grpId="0" nodeType="clickEffect">
-                                  <p:stCondLst>
-                                    <p:cond delay="0"/>
-                                  </p:stCondLst>
-                                  <p:childTnLst>
-                                    <p:set>
-                                      <p:cBhvr>
-                                        <p:cTn id="18" dur="1" fill="hold">
-                                          <p:stCondLst>
-                                            <p:cond delay="0"/>
-                                          </p:stCondLst>
-                                        </p:cTn>
-                                        <p:tgtEl>
-                                          <p:spTgt spid="3">
-                                            <p:txEl>
-                                              <p:pRg st="2" end="2"/>
-                                            </p:txEl>
-                                          </p:spTgt>
-                                        </p:tgtEl>
-                                        <p:attrNameLst>
-                                          <p:attrName>style.visibility</p:attrName>
-                                        </p:attrNameLst>
-                                      </p:cBhvr>
-                                      <p:to>
-                                        <p:strVal val="visible"/>
-                                      </p:to>
-                                    </p:set>
-                                    <p:anim calcmode="lin" valueType="num">
-                                      <p:cBhvr additive="base">
-                                        <p:cTn id="19" dur="500" fill="hold"/>
-                                        <p:tgtEl>
-                                          <p:spTgt spid="3">
-                                            <p:txEl>
-                                              <p:pRg st="2" end="2"/>
-                                            </p:txEl>
-                                          </p:spTgt>
-                                        </p:tgtEl>
-                                        <p:attrNameLst>
-                                          <p:attrName>ppt_x</p:attrName>
-                                        </p:attrNameLst>
-                                      </p:cBhvr>
-                                      <p:tavLst>
-                                        <p:tav tm="0">
-                                          <p:val>
-                                            <p:strVal val="#ppt_x"/>
-                                          </p:val>
-                                        </p:tav>
-                                        <p:tav tm="100000">
-                                          <p:val>
-                                            <p:strVal val="#ppt_x"/>
-                                          </p:val>
-                                        </p:tav>
-                                      </p:tavLst>
-                                    </p:anim>
-                                    <p:anim calcmode="lin" valueType="num">
-                                      <p:cBhvr additive="base">
-                                        <p:cTn id="20" dur="500" fill="hold"/>
-                                        <p:tgtEl>
-                                          <p:spTgt spid="3">
-                                            <p:txEl>
-                                              <p:pRg st="2" end="2"/>
-                                            </p:txEl>
-                                          </p:spTgt>
-                                        </p:tgtEl>
-                                        <p:attrNameLst>
-                                          <p:attrName>ppt_y</p:attrName>
-                                        </p:attrNameLst>
-                                      </p:cBhvr>
-                                      <p:tavLst>
-                                        <p:tav tm="0">
-                                          <p:val>
-                                            <p:strVal val="1+#ppt_h/2"/>
-                                          </p:val>
-                                        </p:tav>
-                                        <p:tav tm="100000">
-                                          <p:val>
-                                            <p:strVal val="#ppt_y"/>
-                                          </p:val>
-                                        </p:tav>
-                                      </p:tavLst>
-                                    </p:anim>
-                                  </p:childTnLst>
-                                </p:cTn>
-                              </p:par>
-                            </p:childTnLst>
-                          </p:cTn>
-                        </p:par>
-                      </p:childTnLst>
-                    </p:cTn>
-                  </p:par>
-                  <p:par>
-                    <p:cTn id="21" fill="hold">
-                      <p:stCondLst>
-                        <p:cond delay="indefinite"/>
-                      </p:stCondLst>
-                      <p:childTnLst>
-                        <p:par>
-                          <p:cTn id="22" fill="hold">
-                            <p:stCondLst>
-                              <p:cond delay="0"/>
-                            </p:stCondLst>
-                            <p:childTnLst>
-                              <p:par>
-                                <p:cTn id="23" presetID="2" presetClass="entr" presetSubtype="4" fill="hold" grpId="0" nodeType="clickEffect">
-                                  <p:stCondLst>
-                                    <p:cond delay="0"/>
-                                  </p:stCondLst>
-                                  <p:childTnLst>
-                                    <p:set>
-                                      <p:cBhvr>
-                                        <p:cTn id="24" dur="1" fill="hold">
-                                          <p:stCondLst>
-                                            <p:cond delay="0"/>
-                                          </p:stCondLst>
-                                        </p:cTn>
-                                        <p:tgtEl>
-                                          <p:spTgt spid="3">
-                                            <p:txEl>
-                                              <p:pRg st="3" end="3"/>
-                                            </p:txEl>
-                                          </p:spTgt>
-                                        </p:tgtEl>
-                                        <p:attrNameLst>
-                                          <p:attrName>style.visibility</p:attrName>
-                                        </p:attrNameLst>
-                                      </p:cBhvr>
-                                      <p:to>
-                                        <p:strVal val="visible"/>
-                                      </p:to>
-                                    </p:set>
-                                    <p:anim calcmode="lin" valueType="num">
-                                      <p:cBhvr additive="base">
-                                        <p:cTn id="25" dur="500" fill="hold"/>
-                                        <p:tgtEl>
-                                          <p:spTgt spid="3">
-                                            <p:txEl>
-                                              <p:pRg st="3" end="3"/>
-                                            </p:txEl>
-                                          </p:spTgt>
-                                        </p:tgtEl>
-                                        <p:attrNameLst>
-                                          <p:attrName>ppt_x</p:attrName>
-                                        </p:attrNameLst>
-                                      </p:cBhvr>
-                                      <p:tavLst>
-                                        <p:tav tm="0">
-                                          <p:val>
-                                            <p:strVal val="#ppt_x"/>
-                                          </p:val>
-                                        </p:tav>
-                                        <p:tav tm="100000">
-                                          <p:val>
-                                            <p:strVal val="#ppt_x"/>
-                                          </p:val>
-                                        </p:tav>
-                                      </p:tavLst>
-                                    </p:anim>
-                                    <p:anim calcmode="lin" valueType="num">
-                                      <p:cBhvr additive="base">
-                                        <p:cTn id="26" dur="500" fill="hold"/>
-                                        <p:tgtEl>
-                                          <p:spTgt spid="3">
-                                            <p:txEl>
-                                              <p:pRg st="3" end="3"/>
-                                            </p:txEl>
-                                          </p:spTgt>
-                                        </p:tgtEl>
-                                        <p:attrNameLst>
-                                          <p:attrName>ppt_y</p:attrName>
-                                        </p:attrNameLst>
-                                      </p:cBhvr>
-                                      <p:tavLst>
-                                        <p:tav tm="0">
-                                          <p:val>
-                                            <p:strVal val="1+#ppt_h/2"/>
-                                          </p:val>
-                                        </p:tav>
-                                        <p:tav tm="100000">
-                                          <p:val>
-                                            <p:strVal val="#ppt_y"/>
-                                          </p:val>
-                                        </p:tav>
-                                      </p:tavLst>
-                                    </p:anim>
-                                  </p:childTnLst>
-                                </p:cTn>
-                              </p:par>
-                            </p:childTnLst>
-                          </p:cTn>
-                        </p:par>
-                      </p:childTnLst>
-                    </p:cTn>
-                  </p:par>
-                  <p:par>
-                    <p:cTn id="27" fill="hold">
-                      <p:stCondLst>
-                        <p:cond delay="indefinite"/>
-                      </p:stCondLst>
-                      <p:childTnLst>
-                        <p:par>
-                          <p:cTn id="28" fill="hold">
-                            <p:stCondLst>
-                              <p:cond delay="0"/>
-                            </p:stCondLst>
-                            <p:childTnLst>
-                              <p:par>
-                                <p:cTn id="29" presetID="2" presetClass="entr" presetSubtype="4" fill="hold" grpId="0" nodeType="clickEffect">
-                                  <p:stCondLst>
-                                    <p:cond delay="0"/>
-                                  </p:stCondLst>
-                                  <p:childTnLst>
-                                    <p:set>
-                                      <p:cBhvr>
-                                        <p:cTn id="30" dur="1" fill="hold">
-                                          <p:stCondLst>
-                                            <p:cond delay="0"/>
-                                          </p:stCondLst>
-                                        </p:cTn>
-                                        <p:tgtEl>
-                                          <p:spTgt spid="3">
-                                            <p:txEl>
-                                              <p:pRg st="4" end="4"/>
-                                            </p:txEl>
-                                          </p:spTgt>
-                                        </p:tgtEl>
-                                        <p:attrNameLst>
-                                          <p:attrName>style.visibility</p:attrName>
-                                        </p:attrNameLst>
-                                      </p:cBhvr>
-                                      <p:to>
-                                        <p:strVal val="visible"/>
-                                      </p:to>
-                                    </p:set>
-                                    <p:anim calcmode="lin" valueType="num">
-                                      <p:cBhvr additive="base">
-                                        <p:cTn id="31" dur="500" fill="hold"/>
-                                        <p:tgtEl>
-                                          <p:spTgt spid="3">
-                                            <p:txEl>
-                                              <p:pRg st="4" end="4"/>
-                                            </p:txEl>
-                                          </p:spTgt>
-                                        </p:tgtEl>
-                                        <p:attrNameLst>
-                                          <p:attrName>ppt_x</p:attrName>
-                                        </p:attrNameLst>
-                                      </p:cBhvr>
-                                      <p:tavLst>
-                                        <p:tav tm="0">
-                                          <p:val>
-                                            <p:strVal val="#ppt_x"/>
-                                          </p:val>
-                                        </p:tav>
-                                        <p:tav tm="100000">
-                                          <p:val>
-                                            <p:strVal val="#ppt_x"/>
-                                          </p:val>
-                                        </p:tav>
-                                      </p:tavLst>
-                                    </p:anim>
-                                    <p:anim calcmode="lin" valueType="num">
-                                      <p:cBhvr additive="base">
-                                        <p:cTn id="32" dur="500" fill="hold"/>
-                                        <p:tgtEl>
-                                          <p:spTgt spid="3">
-                                            <p:txEl>
-                                              <p:pRg st="4" end="4"/>
-                                            </p:txEl>
-                                          </p:spTgt>
-                                        </p:tgtEl>
-                                        <p:attrNameLst>
-                                          <p:attrName>ppt_y</p:attrName>
-                                        </p:attrNameLst>
-                                      </p:cBhvr>
-                                      <p:tavLst>
-                                        <p:tav tm="0">
-                                          <p:val>
-                                            <p:strVal val="1+#ppt_h/2"/>
-                                          </p:val>
-                                        </p:tav>
-                                        <p:tav tm="100000">
-                                          <p:val>
-                                            <p:strVal val="#ppt_y"/>
-                                          </p:val>
-                                        </p:tav>
-                                      </p:tavLst>
-                                    </p:anim>
-                                  </p:childTnLst>
-                                </p:cTn>
-                              </p:par>
-                            </p:childTnLst>
-                          </p:cTn>
-                        </p:par>
-                      </p:childTnLst>
-                    </p:cTn>
-                  </p:par>
-                  <p:par>
-                    <p:cTn id="33" fill="hold">
-                      <p:stCondLst>
-                        <p:cond delay="indefinite"/>
-                      </p:stCondLst>
-                      <p:childTnLst>
-                        <p:par>
-                          <p:cTn id="34" fill="hold">
-                            <p:stCondLst>
-                              <p:cond delay="0"/>
-                            </p:stCondLst>
-                            <p:childTnLst>
-                              <p:par>
-                                <p:cTn id="35" presetID="2" presetClass="entr" presetSubtype="4" fill="hold" grpId="0" nodeType="clickEffect">
-                                  <p:stCondLst>
-                                    <p:cond delay="0"/>
-                                  </p:stCondLst>
-                                  <p:childTnLst>
-                                    <p:set>
-                                      <p:cBhvr>
-                                        <p:cTn id="36" dur="1" fill="hold">
-                                          <p:stCondLst>
-                                            <p:cond delay="0"/>
-                                          </p:stCondLst>
-                                        </p:cTn>
-                                        <p:tgtEl>
-                                          <p:spTgt spid="3">
-                                            <p:txEl>
-                                              <p:pRg st="5" end="5"/>
-                                            </p:txEl>
-                                          </p:spTgt>
-                                        </p:tgtEl>
-                                        <p:attrNameLst>
-                                          <p:attrName>style.visibility</p:attrName>
-                                        </p:attrNameLst>
-                                      </p:cBhvr>
-                                      <p:to>
-                                        <p:strVal val="visible"/>
-                                      </p:to>
-                                    </p:set>
-                                    <p:anim calcmode="lin" valueType="num">
-                                      <p:cBhvr additive="base">
-                                        <p:cTn id="37" dur="500" fill="hold"/>
-                                        <p:tgtEl>
-                                          <p:spTgt spid="3">
-                                            <p:txEl>
-                                              <p:pRg st="5" end="5"/>
-                                            </p:txEl>
-                                          </p:spTgt>
-                                        </p:tgtEl>
-                                        <p:attrNameLst>
-                                          <p:attrName>ppt_x</p:attrName>
-                                        </p:attrNameLst>
-                                      </p:cBhvr>
-                                      <p:tavLst>
-                                        <p:tav tm="0">
-                                          <p:val>
-                                            <p:strVal val="#ppt_x"/>
-                                          </p:val>
-                                        </p:tav>
-                                        <p:tav tm="100000">
-                                          <p:val>
-                                            <p:strVal val="#ppt_x"/>
-                                          </p:val>
-                                        </p:tav>
-                                      </p:tavLst>
-                                    </p:anim>
-                                    <p:anim calcmode="lin" valueType="num">
-                                      <p:cBhvr additive="base">
-                                        <p:cTn id="38" dur="500" fill="hold"/>
-                                        <p:tgtEl>
-                                          <p:spTgt spid="3">
-                                            <p:txEl>
-                                              <p:pRg st="5" end="5"/>
-                                            </p:txEl>
-                                          </p:spTgt>
-                                        </p:tgtEl>
-                                        <p:attrNameLst>
-                                          <p:attrName>ppt_y</p:attrName>
-                                        </p:attrNameLst>
-                                      </p:cBhvr>
-                                      <p:tavLst>
-                                        <p:tav tm="0">
-                                          <p:val>
-                                            <p:strVal val="1+#ppt_h/2"/>
-                                          </p:val>
-                                        </p:tav>
-                                        <p:tav tm="100000">
-                                          <p:val>
-                                            <p:strVal val="#ppt_y"/>
-                                          </p:val>
-                                        </p:tav>
-                                      </p:tavLst>
-                                    </p:anim>
-                                  </p:childTnLst>
-                                </p:cTn>
-                              </p:par>
-                            </p:childTnLst>
-                          </p:cTn>
-                        </p:par>
-                      </p:childTnLst>
-                    </p:cTn>
-                  </p:par>
-                </p:childTnLst>
-              </p:cTn>
-              <p:prevCondLst>
-                <p:cond evt="onPrev" delay="0">
-                  <p:tgtEl>
-                    <p:sldTgt/>
-                  </p:tgtEl>
-                </p:cond>
-              </p:prevCondLst>
-              <p:nextCondLst>
-                <p:cond evt="onNext" delay="0">
-                  <p:tgtEl>
-                    <p:sldTgt/>
-                  </p:tgtEl>
-                </p:cond>
-              </p:nextCondLst>
-            </p:seq>
-          </p:childTnLst>
-        </p:cTn>
+        <p:cTn xmlns:p14="http://schemas.microsoft.com/office/powerpoint/2010/main" id="1" dur="indefinite" restart="never" nodeType="tmRoot"/>
       </p:par>
     </p:tnLst>
-    <p:bldLst>
-      <p:bldP spid="3" grpId="0" build="p"/>
-    </p:bldLst>
   </p:timing>
 </p:sld>
 </file>
@@ -8920,4 +8215,324 @@
   </a:objectDefaults>
   <a:extraClrSchemeLst/>
 </a:theme>
+</file>
+
+<file path=ppt/theme/theme2.xml><?xml version="1.0" encoding="utf-8"?>
+<a:theme xmlns:a="http://schemas.openxmlformats.org/drawingml/2006/main" name="Office Theme">
+  <a:themeElements>
+    <a:clrScheme name="Office">
+      <a:dk1>
+        <a:sysClr val="windowText" lastClr="000000"/>
+      </a:dk1>
+      <a:lt1>
+        <a:sysClr val="window" lastClr="FFFFFF"/>
+      </a:lt1>
+      <a:dk2>
+        <a:srgbClr val="1F497D"/>
+      </a:dk2>
+      <a:lt2>
+        <a:srgbClr val="EEECE1"/>
+      </a:lt2>
+      <a:accent1>
+        <a:srgbClr val="4F81BD"/>
+      </a:accent1>
+      <a:accent2>
+        <a:srgbClr val="C0504D"/>
+      </a:accent2>
+      <a:accent3>
+        <a:srgbClr val="9BBB59"/>
+      </a:accent3>
+      <a:accent4>
+        <a:srgbClr val="8064A2"/>
+      </a:accent4>
+      <a:accent5>
+        <a:srgbClr val="4BACC6"/>
+      </a:accent5>
+      <a:accent6>
+        <a:srgbClr val="F79646"/>
+      </a:accent6>
+      <a:hlink>
+        <a:srgbClr val="0000FF"/>
+      </a:hlink>
+      <a:folHlink>
+        <a:srgbClr val="800080"/>
+      </a:folHlink>
+    </a:clrScheme>
+    <a:fontScheme name="Office">
+      <a:majorFont>
+        <a:latin typeface="Calibri"/>
+        <a:ea typeface=""/>
+        <a:cs typeface=""/>
+        <a:font script="Jpan" typeface="ＭＳ Ｐゴシック"/>
+        <a:font script="Hang" typeface="맑은 고딕"/>
+        <a:font script="Hans" typeface="宋体"/>
+        <a:font script="Hant" typeface="新細明體"/>
+        <a:font script="Arab" typeface="Times New Roman"/>
+        <a:font script="Hebr" typeface="Times New Roman"/>
+        <a:font script="Thai" typeface="Angsana New"/>
+        <a:font script="Ethi" typeface="Nyala"/>
+        <a:font script="Beng" typeface="Vrinda"/>
+        <a:font script="Gujr" typeface="Shruti"/>
+        <a:font script="Khmr" typeface="MoolBoran"/>
+        <a:font script="Knda" typeface="Tunga"/>
+        <a:font script="Guru" typeface="Raavi"/>
+        <a:font script="Cans" typeface="Euphemia"/>
+        <a:font script="Cher" typeface="Plantagenet Cherokee"/>
+        <a:font script="Yiii" typeface="Microsoft Yi Baiti"/>
+        <a:font script="Tibt" typeface="Microsoft Himalaya"/>
+        <a:font script="Thaa" typeface="MV Boli"/>
+        <a:font script="Deva" typeface="Mangal"/>
+        <a:font script="Telu" typeface="Gautami"/>
+        <a:font script="Taml" typeface="Latha"/>
+        <a:font script="Syrc" typeface="Estrangelo Edessa"/>
+        <a:font script="Orya" typeface="Kalinga"/>
+        <a:font script="Mlym" typeface="Kartika"/>
+        <a:font script="Laoo" typeface="DokChampa"/>
+        <a:font script="Sinh" typeface="Iskoola Pota"/>
+        <a:font script="Mong" typeface="Mongolian Baiti"/>
+        <a:font script="Viet" typeface="Times New Roman"/>
+        <a:font script="Uigh" typeface="Microsoft Uighur"/>
+        <a:font script="Geor" typeface="Sylfaen"/>
+      </a:majorFont>
+      <a:minorFont>
+        <a:latin typeface="Calibri"/>
+        <a:ea typeface=""/>
+        <a:cs typeface=""/>
+        <a:font script="Jpan" typeface="ＭＳ Ｐゴシック"/>
+        <a:font script="Hang" typeface="맑은 고딕"/>
+        <a:font script="Hans" typeface="宋体"/>
+        <a:font script="Hant" typeface="新細明體"/>
+        <a:font script="Arab" typeface="Arial"/>
+        <a:font script="Hebr" typeface="Arial"/>
+        <a:font script="Thai" typeface="Cordia New"/>
+        <a:font script="Ethi" typeface="Nyala"/>
+        <a:font script="Beng" typeface="Vrinda"/>
+        <a:font script="Gujr" typeface="Shruti"/>
+        <a:font script="Khmr" typeface="DaunPenh"/>
+        <a:font script="Knda" typeface="Tunga"/>
+        <a:font script="Guru" typeface="Raavi"/>
+        <a:font script="Cans" typeface="Euphemia"/>
+        <a:font script="Cher" typeface="Plantagenet Cherokee"/>
+        <a:font script="Yiii" typeface="Microsoft Yi Baiti"/>
+        <a:font script="Tibt" typeface="Microsoft Himalaya"/>
+        <a:font script="Thaa" typeface="MV Boli"/>
+        <a:font script="Deva" typeface="Mangal"/>
+        <a:font script="Telu" typeface="Gautami"/>
+        <a:font script="Taml" typeface="Latha"/>
+        <a:font script="Syrc" typeface="Estrangelo Edessa"/>
+        <a:font script="Orya" typeface="Kalinga"/>
+        <a:font script="Mlym" typeface="Kartika"/>
+        <a:font script="Laoo" typeface="DokChampa"/>
+        <a:font script="Sinh" typeface="Iskoola Pota"/>
+        <a:font script="Mong" typeface="Mongolian Baiti"/>
+        <a:font script="Viet" typeface="Arial"/>
+        <a:font script="Uigh" typeface="Microsoft Uighur"/>
+        <a:font script="Geor" typeface="Sylfaen"/>
+      </a:minorFont>
+    </a:fontScheme>
+    <a:fmtScheme name="Office">
+      <a:fillStyleLst>
+        <a:solidFill>
+          <a:schemeClr val="phClr"/>
+        </a:solidFill>
+        <a:gradFill rotWithShape="1">
+          <a:gsLst>
+            <a:gs pos="0">
+              <a:schemeClr val="phClr">
+                <a:tint val="50000"/>
+                <a:satMod val="300000"/>
+              </a:schemeClr>
+            </a:gs>
+            <a:gs pos="35000">
+              <a:schemeClr val="phClr">
+                <a:tint val="37000"/>
+                <a:satMod val="300000"/>
+              </a:schemeClr>
+            </a:gs>
+            <a:gs pos="100000">
+              <a:schemeClr val="phClr">
+                <a:tint val="15000"/>
+                <a:satMod val="350000"/>
+              </a:schemeClr>
+            </a:gs>
+          </a:gsLst>
+          <a:lin ang="16200000" scaled="1"/>
+        </a:gradFill>
+        <a:gradFill rotWithShape="1">
+          <a:gsLst>
+            <a:gs pos="0">
+              <a:schemeClr val="phClr">
+                <a:tint val="100000"/>
+                <a:shade val="100000"/>
+                <a:satMod val="130000"/>
+              </a:schemeClr>
+            </a:gs>
+            <a:gs pos="100000">
+              <a:schemeClr val="phClr">
+                <a:tint val="50000"/>
+                <a:shade val="100000"/>
+                <a:satMod val="350000"/>
+              </a:schemeClr>
+            </a:gs>
+          </a:gsLst>
+          <a:lin ang="16200000" scaled="0"/>
+        </a:gradFill>
+      </a:fillStyleLst>
+      <a:lnStyleLst>
+        <a:ln w="9525" cap="flat" cmpd="sng" algn="ctr">
+          <a:solidFill>
+            <a:schemeClr val="phClr">
+              <a:shade val="95000"/>
+              <a:satMod val="105000"/>
+            </a:schemeClr>
+          </a:solidFill>
+          <a:prstDash val="solid"/>
+        </a:ln>
+        <a:ln w="25400" cap="flat" cmpd="sng" algn="ctr">
+          <a:solidFill>
+            <a:schemeClr val="phClr"/>
+          </a:solidFill>
+          <a:prstDash val="solid"/>
+        </a:ln>
+        <a:ln w="38100" cap="flat" cmpd="sng" algn="ctr">
+          <a:solidFill>
+            <a:schemeClr val="phClr"/>
+          </a:solidFill>
+          <a:prstDash val="solid"/>
+        </a:ln>
+      </a:lnStyleLst>
+      <a:effectStyleLst>
+        <a:effectStyle>
+          <a:effectLst>
+            <a:outerShdw blurRad="40000" dist="20000" dir="5400000" rotWithShape="0">
+              <a:srgbClr val="000000">
+                <a:alpha val="38000"/>
+              </a:srgbClr>
+            </a:outerShdw>
+          </a:effectLst>
+        </a:effectStyle>
+        <a:effectStyle>
+          <a:effectLst>
+            <a:outerShdw blurRad="40000" dist="23000" dir="5400000" rotWithShape="0">
+              <a:srgbClr val="000000">
+                <a:alpha val="35000"/>
+              </a:srgbClr>
+            </a:outerShdw>
+          </a:effectLst>
+        </a:effectStyle>
+        <a:effectStyle>
+          <a:effectLst>
+            <a:outerShdw blurRad="40000" dist="23000" dir="5400000" rotWithShape="0">
+              <a:srgbClr val="000000">
+                <a:alpha val="35000"/>
+              </a:srgbClr>
+            </a:outerShdw>
+          </a:effectLst>
+          <a:scene3d>
+            <a:camera prst="orthographicFront">
+              <a:rot lat="0" lon="0" rev="0"/>
+            </a:camera>
+            <a:lightRig rig="threePt" dir="t">
+              <a:rot lat="0" lon="0" rev="1200000"/>
+            </a:lightRig>
+          </a:scene3d>
+          <a:sp3d>
+            <a:bevelT w="63500" h="25400"/>
+          </a:sp3d>
+        </a:effectStyle>
+      </a:effectStyleLst>
+      <a:bgFillStyleLst>
+        <a:solidFill>
+          <a:schemeClr val="phClr"/>
+        </a:solidFill>
+        <a:gradFill rotWithShape="1">
+          <a:gsLst>
+            <a:gs pos="0">
+              <a:schemeClr val="phClr">
+                <a:tint val="40000"/>
+                <a:satMod val="350000"/>
+              </a:schemeClr>
+            </a:gs>
+            <a:gs pos="40000">
+              <a:schemeClr val="phClr">
+                <a:tint val="45000"/>
+                <a:shade val="99000"/>
+                <a:satMod val="350000"/>
+              </a:schemeClr>
+            </a:gs>
+            <a:gs pos="100000">
+              <a:schemeClr val="phClr">
+                <a:shade val="20000"/>
+                <a:satMod val="255000"/>
+              </a:schemeClr>
+            </a:gs>
+          </a:gsLst>
+          <a:path path="circle">
+            <a:fillToRect l="50000" t="-80000" r="50000" b="180000"/>
+          </a:path>
+        </a:gradFill>
+        <a:gradFill rotWithShape="1">
+          <a:gsLst>
+            <a:gs pos="0">
+              <a:schemeClr val="phClr">
+                <a:tint val="80000"/>
+                <a:satMod val="300000"/>
+              </a:schemeClr>
+            </a:gs>
+            <a:gs pos="100000">
+              <a:schemeClr val="phClr">
+                <a:shade val="30000"/>
+                <a:satMod val="200000"/>
+              </a:schemeClr>
+            </a:gs>
+          </a:gsLst>
+          <a:path path="circle">
+            <a:fillToRect l="50000" t="50000" r="50000" b="50000"/>
+          </a:path>
+        </a:gradFill>
+      </a:bgFillStyleLst>
+    </a:fmtScheme>
+  </a:themeElements>
+  <a:objectDefaults>
+    <a:spDef>
+      <a:spPr/>
+      <a:bodyPr/>
+      <a:lstStyle/>
+      <a:style>
+        <a:lnRef idx="1">
+          <a:schemeClr val="accent1"/>
+        </a:lnRef>
+        <a:fillRef idx="3">
+          <a:schemeClr val="accent1"/>
+        </a:fillRef>
+        <a:effectRef idx="2">
+          <a:schemeClr val="accent1"/>
+        </a:effectRef>
+        <a:fontRef idx="minor">
+          <a:schemeClr val="lt1"/>
+        </a:fontRef>
+      </a:style>
+    </a:spDef>
+    <a:lnDef>
+      <a:spPr/>
+      <a:bodyPr/>
+      <a:lstStyle/>
+      <a:style>
+        <a:lnRef idx="2">
+          <a:schemeClr val="accent1"/>
+        </a:lnRef>
+        <a:fillRef idx="0">
+          <a:schemeClr val="accent1"/>
+        </a:fillRef>
+        <a:effectRef idx="1">
+          <a:schemeClr val="accent1"/>
+        </a:effectRef>
+        <a:fontRef idx="minor">
+          <a:schemeClr val="tx1"/>
+        </a:fontRef>
+      </a:style>
+    </a:lnDef>
+  </a:objectDefaults>
+  <a:extraClrSchemeLst/>
+</a:theme>
 </file>
</xml_diff>